<commit_message>
08, 09, 10 styled
</commit_message>
<xml_diff>
--- a/final ppt/08-building-basic-pages.pptx
+++ b/final ppt/08-building-basic-pages.pptx
@@ -5,23 +5,19 @@
     <p:sldMasterId id="2147483660" r:id="rId1"/>
   </p:sldMasterIdLst>
   <p:notesMasterIdLst>
-    <p:notesMasterId r:id="rId16"/>
+    <p:notesMasterId r:id="rId12"/>
   </p:notesMasterIdLst>
   <p:sldIdLst>
     <p:sldId id="256" r:id="rId2"/>
     <p:sldId id="257" r:id="rId3"/>
     <p:sldId id="258" r:id="rId4"/>
     <p:sldId id="259" r:id="rId5"/>
-    <p:sldId id="265" r:id="rId6"/>
-    <p:sldId id="260" r:id="rId7"/>
-    <p:sldId id="266" r:id="rId8"/>
-    <p:sldId id="264" r:id="rId9"/>
-    <p:sldId id="261" r:id="rId10"/>
-    <p:sldId id="269" r:id="rId11"/>
-    <p:sldId id="268" r:id="rId12"/>
-    <p:sldId id="262" r:id="rId13"/>
-    <p:sldId id="267" r:id="rId14"/>
-    <p:sldId id="263" r:id="rId15"/>
+    <p:sldId id="260" r:id="rId6"/>
+    <p:sldId id="261" r:id="rId7"/>
+    <p:sldId id="262" r:id="rId8"/>
+    <p:sldId id="263" r:id="rId9"/>
+    <p:sldId id="264" r:id="rId10"/>
+    <p:sldId id="265" r:id="rId11"/>
   </p:sldIdLst>
   <p:sldSz cx="12192000" cy="6858000"/>
   <p:notesSz cx="6858000" cy="9144000"/>
@@ -328,7 +324,7 @@
           <a:p>
             <a:fld id="{0F9C1CCF-B725-44A7-AA57-5E433BD85C9F}" type="datetimeFigureOut">
               <a:rPr lang="en-US" smtClean="0"/>
-              <a:t>9/10/2021</a:t>
+              <a:t>9/13/2021</a:t>
             </a:fld>
             <a:endParaRPr lang="en-US"/>
           </a:p>
@@ -1382,11 +1378,6 @@
         </p:txBody>
       </p:sp>
     </p:spTree>
-    <p:extLst>
-      <p:ext uri="{BB962C8B-B14F-4D97-AF65-F5344CB8AC3E}">
-        <p14:creationId xmlns:p14="http://schemas.microsoft.com/office/powerpoint/2010/main" val="2399305582"/>
-      </p:ext>
-    </p:extLst>
   </p:cSld>
   <p:clrMapOvr>
     <a:masterClrMapping/>
@@ -1443,12 +1434,23 @@
           <a:bodyPr/>
           <a:lstStyle/>
           <a:p>
+            <a:pPr lvl="1"/>
+            <a:r>
+              <a:rPr/>
+              <a:t>: Have each learner take the notes from their story and review them– consider adding details, think of what you left out.</a:t>
+            </a:r>
+          </a:p>
+          <a:p>
             <a:pPr marL="0" lvl="0" indent="0">
               <a:buNone/>
             </a:pPr>
+            <a:endParaRPr/>
+          </a:p>
+          <a:p>
+            <a:pPr lvl="1"/>
             <a:r>
               <a:rPr/>
-              <a:t>[20 mins]</a:t>
+              <a:t>Organize, and Type Up: Have learners type up their stories in a basic text editor, being sure to use “plain text mode” (not Rich Text mode). As they type up the story, they might consider organizing and structuring the story into a beginning, middle, and end. Maybe they can think of titles for the sections: “Early Days” “These Days” “What’s Next” Or they can find ways other ways to organize the content, if they talked more about interest sections– “My favorite songs” “My favorite places” etc. Creating these sections will help structure the biography for easy reading as a web page.</a:t>
             </a:r>
           </a:p>
           <a:p>
@@ -1458,105 +1460,10 @@
             <a:endParaRPr/>
           </a:p>
           <a:p>
-            <a:pPr marL="1270000" lvl="0" indent="0">
-              <a:buNone/>
-            </a:pPr>
-            <a:r>
-              <a:rPr sz="2000"/>
-              <a:t>Tip! This next part is fun and interactive, and great for creating a friendly, positive classroom community. But if you’re short on time, and if giving learners a sense that they can have their own representation on the web is NOT a priority, you can provide canned pre-typed content as a .txt file and skip to the next section– “Get Tagging.”</a:t>
-            </a:r>
-          </a:p>
-          <a:p>
-            <a:pPr marL="0" lvl="0" indent="0">
-              <a:buNone/>
-            </a:pPr>
-            <a:endParaRPr sz="2000"/>
-          </a:p>
-          <a:p>
             <a:pPr lvl="1"/>
             <a:r>
               <a:rPr/>
-              <a:t>Interview: Ask participants to take 5 minutes to tell their story, or if they don’t want to share personal stuff, they can make up fictional character and tell that character’s story. Have the listener take notes, or possibly record on a device. Prompt users to talk about what is most important to them (or their fictional character). Offer this list of questions to get started:</a:t>
-            </a:r>
-          </a:p>
-          <a:p>
-            <a:pPr marL="0" lvl="0" indent="0">
-              <a:buNone/>
-            </a:pPr>
-            <a:endParaRPr/>
-          </a:p>
-          <a:p>
-            <a:pPr lvl="2"/>
-            <a:r>
-              <a:rPr/>
-              <a:t>What’s your name, age, other details?</a:t>
-            </a:r>
-          </a:p>
-          <a:p>
-            <a:pPr marL="0" lvl="0" indent="0">
-              <a:buNone/>
-            </a:pPr>
-            <a:endParaRPr/>
-          </a:p>
-          <a:p>
-            <a:pPr lvl="2"/>
-            <a:r>
-              <a:rPr/>
-              <a:t>Where were you born? Where did you grow up? What was that like?</a:t>
-            </a:r>
-          </a:p>
-          <a:p>
-            <a:pPr marL="0" lvl="0" indent="0">
-              <a:buNone/>
-            </a:pPr>
-            <a:endParaRPr/>
-          </a:p>
-          <a:p>
-            <a:pPr lvl="2"/>
-            <a:r>
-              <a:rPr/>
-              <a:t>What are you doing now? How do you spend your time? What are your favorite things to do, favorite places, foods, music, etc</a:t>
-            </a:r>
-          </a:p>
-          <a:p>
-            <a:pPr marL="0" lvl="0" indent="0">
-              <a:buNone/>
-            </a:pPr>
-            <a:endParaRPr/>
-          </a:p>
-          <a:p>
-            <a:pPr lvl="2"/>
-            <a:r>
-              <a:rPr/>
-              <a:t>Is there a favorite moment, proudest moment that stands out?</a:t>
-            </a:r>
-          </a:p>
-          <a:p>
-            <a:pPr marL="0" lvl="0" indent="0">
-              <a:buNone/>
-            </a:pPr>
-            <a:endParaRPr/>
-          </a:p>
-          <a:p>
-            <a:pPr lvl="2"/>
-            <a:r>
-              <a:rPr/>
-              <a:t>What are your plans and dreams for the future?</a:t>
-            </a:r>
-          </a:p>
-          <a:p>
-            <a:pPr marL="0" lvl="0" indent="0">
-              <a:buNone/>
-            </a:pPr>
-            <a:endParaRPr/>
-          </a:p>
-          <a:p>
-            <a:pPr marL="1270000" lvl="0" indent="0">
-              <a:buNone/>
-            </a:pPr>
-            <a:r>
-              <a:rPr sz="2000"/>
-              <a:t>Tip! The interviewer can ask follow-up questions to get at more details, or a fuller story. He or she can ask open-ended “why” questions about motivations, about preferences, about future plans, to help draw out more insights, or he or she can ask questions to clarify ideas in the story.</a:t>
+              <a:t>Title Your Story! Come up with a snappy title for your story or content or go with something basic.</a:t>
             </a:r>
           </a:p>
         </p:txBody>
@@ -1646,7 +1553,7 @@
             </a:pPr>
             <a:r>
               <a:rPr/>
-              <a:t>[20 mins]</a:t>
+              <a:t>[10 mins]</a:t>
             </a:r>
           </a:p>
           <a:p>
@@ -1656,12 +1563,25 @@
             <a:endParaRPr/>
           </a:p>
           <a:p>
+            <a:pPr lvl="1"/>
+            <a:r>
+              <a:rPr/>
+              <a:t>Explain to users that they’ll be marking up their story– the .html version– with HTML, to make it ready for display in the browser. Explain that since coding HTML and thinking of and writing content are two different ways of thinking, they should always have content written before they mark it up, rather than write and mark-up at the same time.</a:t>
+            </a:r>
+          </a:p>
+          <a:p>
+            <a:pPr marL="0" lvl="0" indent="0">
+              <a:buNone/>
+            </a:pPr>
+            <a:endParaRPr/>
+          </a:p>
+          <a:p>
             <a:pPr marL="1270000" lvl="0" indent="0">
               <a:buNone/>
             </a:pPr>
             <a:r>
               <a:rPr sz="2000"/>
-              <a:t>Tip! This next part is fun and interactive, and great for creating a friendly, positive classroom community. But if you’re short on time, and if giving learners a sense that they can have their own representation on the web is NOT a priority, you can provide canned pre-typed content as a .txt file and skip to the next section– “Get Tagging.”</a:t>
+              <a:t>Tip! A great way to help learners do this, if you have access to an instructor’s computer and projector, is to do the activity on your own content along with learners, and project the results so everyone can see what you’re doing.</a:t>
             </a:r>
           </a:p>
           <a:p>
@@ -1674,7 +1594,7 @@
             <a:pPr lvl="1"/>
             <a:r>
               <a:rPr/>
-              <a:t>Interview: Ask participants to take 5 minutes to tell their story, or if they don’t want to share personal stuff, they can make up fictional character and tell that character’s story. Have the listener take notes, or possibly record on a device. Prompt users to talk about what is most important to them (or their fictional character). Offer this list of questions to get started:</a:t>
+              <a:t>Start the file with a doctype tag– this is one of the only tags that doesn’t have content inside, and no closing tag– it’s a lonely single tag, reminding the browser, again that we’re writing html&lt;!DOCTYPE html&gt;</a:t>
             </a:r>
           </a:p>
           <a:p>
@@ -1684,10 +1604,66 @@
             <a:endParaRPr/>
           </a:p>
           <a:p>
+            <a:pPr lvl="1"/>
+            <a:r>
+              <a:rPr/>
+              <a:t>Add an </a:t>
+            </a:r>
+            <a:r>
+              <a:rPr>
+                <a:latin typeface="Courier"/>
+              </a:rPr>
+              <a:t>&lt;html&gt;</a:t>
+            </a:r>
+            <a:r>
+              <a:rPr/>
+              <a:t> and </a:t>
+            </a:r>
+            <a:r>
+              <a:rPr>
+                <a:latin typeface="Courier"/>
+              </a:rPr>
+              <a:t>&lt;/html&gt;</a:t>
+            </a:r>
+            <a:r>
+              <a:rPr/>
+              <a:t> tags that wrap around the ENTIRE page– so everything inside can get tagged with markup language.</a:t>
+            </a:r>
+          </a:p>
+          <a:p>
+            <a:pPr marL="0" lvl="0" indent="0">
+              <a:buNone/>
+            </a:pPr>
+            <a:endParaRPr/>
+          </a:p>
+          <a:p>
+            <a:pPr lvl="1"/>
+            <a:r>
+              <a:rPr/>
+              <a:t>After this, make a section with a set of tags called </a:t>
+            </a:r>
+            <a:r>
+              <a:rPr>
+                <a:latin typeface="Courier"/>
+              </a:rPr>
+              <a:t>&lt;head&gt; &lt;/head&gt;</a:t>
+            </a:r>
+            <a:r>
+              <a:rPr/>
+              <a:t> at the top of the page, before all your written content. We’ll put one bit of content in here for the browser, but we won’t see it appear on the main page itself. This is the page title, which:</a:t>
+            </a:r>
+          </a:p>
+          <a:p>
+            <a:pPr marL="0" lvl="0" indent="0">
+              <a:buNone/>
+            </a:pPr>
+            <a:endParaRPr/>
+          </a:p>
+          <a:p>
             <a:pPr lvl="2"/>
             <a:r>
               <a:rPr/>
-              <a:t>What’s your name, age, other details?</a:t>
+              <a:t>defines a title in the browser tab</a:t>
             </a:r>
           </a:p>
           <a:p>
@@ -1700,7 +1676,7 @@
             <a:pPr lvl="2"/>
             <a:r>
               <a:rPr/>
-              <a:t>Where were you born? Where did you grow up? What was that like?</a:t>
+              <a:t>provides a title for the page when it is added to favorites</a:t>
             </a:r>
           </a:p>
           <a:p>
@@ -1713,7 +1689,7 @@
             <a:pPr lvl="2"/>
             <a:r>
               <a:rPr/>
-              <a:t>What are you doing now? How do you spend your time? What are your favorite things to do, favorite places, foods, music, etc</a:t>
+              <a:t>displays a title for the page in search engine results.</a:t>
             </a:r>
           </a:p>
           <a:p>
@@ -1723,10 +1699,10 @@
             <a:endParaRPr/>
           </a:p>
           <a:p>
-            <a:pPr lvl="2"/>
+            <a:pPr lvl="1"/>
             <a:r>
               <a:rPr/>
-              <a:t>Is there a favorite moment, proudest moment that stands out?</a:t>
+              <a:t>Next, add the tags– these should be around the entire text for the page.</a:t>
             </a:r>
           </a:p>
           <a:p>
@@ -1736,10 +1712,10 @@
             <a:endParaRPr/>
           </a:p>
           <a:p>
-            <a:pPr lvl="2"/>
+            <a:pPr lvl="1"/>
             <a:r>
               <a:rPr/>
-              <a:t>What are your plans and dreams for the future?</a:t>
+              <a:t>Use h1 for your page’s top headline, the on-screen title for your story (different from the title tag)</a:t>
             </a:r>
           </a:p>
           <a:p>
@@ -1749,12 +1725,116 @@
             <a:endParaRPr/>
           </a:p>
           <a:p>
+            <a:pPr lvl="1"/>
+            <a:r>
+              <a:rPr/>
+              <a:t>Use h2 or h3 tags for section headings</a:t>
+            </a:r>
+          </a:p>
+          <a:p>
+            <a:pPr marL="0" lvl="0" indent="0">
+              <a:buNone/>
+            </a:pPr>
+            <a:endParaRPr/>
+          </a:p>
+          <a:p>
+            <a:pPr lvl="1"/>
+            <a:r>
+              <a:rPr/>
+              <a:t>Use p tags for paragraphs</a:t>
+            </a:r>
+          </a:p>
+          <a:p>
+            <a:pPr marL="0" lvl="0" indent="0">
+              <a:buNone/>
+            </a:pPr>
+            <a:endParaRPr/>
+          </a:p>
+          <a:p>
+            <a:pPr lvl="1"/>
+            <a:r>
+              <a:rPr/>
+              <a:t>Don’t forget your closing tags!</a:t>
+            </a:r>
+          </a:p>
+          <a:p>
+            <a:pPr marL="0" lvl="0" indent="0">
+              <a:buNone/>
+            </a:pPr>
+            <a:endParaRPr/>
+          </a:p>
+          <a:p>
+            <a:pPr lvl="1"/>
+            <a:r>
+              <a:rPr/>
+              <a:t>For extra credit, add links to other sites (such as a page about your hometown, your favorite sports team, artist or musician, or a favorite recipe). You can also download and add images, just make sure they are in the “xx-webpage” folder.</a:t>
+            </a:r>
+          </a:p>
+          <a:p>
+            <a:pPr marL="0" lvl="0" indent="0">
+              <a:buNone/>
+            </a:pPr>
+            <a:endParaRPr/>
+          </a:p>
+          <a:p>
+            <a:pPr lvl="1"/>
+            <a:r>
+              <a:rPr/>
+              <a:t>Finally, when you’ve added all your tags, save the page!</a:t>
+            </a:r>
+          </a:p>
+          <a:p>
+            <a:pPr marL="0" lvl="0" indent="0">
+              <a:buNone/>
+            </a:pPr>
+            <a:endParaRPr/>
+          </a:p>
+          <a:p>
+            <a:pPr lvl="1"/>
+            <a:r>
+              <a:rPr/>
+              <a:t>Now, open your favorite browser, and go to File &gt; open file. Navigate to your folder, and click on the html file you just made. How does it look? Are you seeing your content formatted for the web? Do you see your title appearing in the tab at the top of the browser bar? If things don’t look right, what might have happened?</a:t>
+            </a:r>
+          </a:p>
+          <a:p>
+            <a:pPr marL="0" lvl="0" indent="0">
+              <a:buNone/>
+            </a:pPr>
+            <a:endParaRPr/>
+          </a:p>
+          <a:p>
             <a:pPr marL="1270000" lvl="0" indent="0">
               <a:buNone/>
             </a:pPr>
             <a:r>
               <a:rPr sz="2000"/>
-              <a:t>Tip! The interviewer can ask follow-up questions to get at more details, or a fuller story. He or she can ask open-ended “why” questions about motivations, about preferences, about future plans, to help draw out more insights, or he or she can ask questions to clarify ideas in the story.</a:t>
+              <a:t>Tip! Facilitator can troubleshoot here— common problems are missing tags, especially closing tags, typos in tags, a document not saved as html, problems with image file names, etc. Facilitator can walk around and check pages, and discuss or even demo on the projected example what happens when tags are left off (for example, never closing an h1 tag is a great way to show the importance of closing tags).</a:t>
+            </a:r>
+          </a:p>
+          <a:p>
+            <a:pPr marL="0" lvl="0" indent="0">
+              <a:buNone/>
+            </a:pPr>
+            <a:endParaRPr sz="2000"/>
+          </a:p>
+          <a:p>
+            <a:pPr lvl="1"/>
+            <a:r>
+              <a:rPr/>
+              <a:t>Congratulate everyone on the pages they’ve made! They are now web designers! Remind folks that the pages are still on their local computers, and not actually on the web! But they are ready to go there.</a:t>
+            </a:r>
+          </a:p>
+          <a:p>
+            <a:pPr marL="0" lvl="0" indent="0">
+              <a:buNone/>
+            </a:pPr>
+            <a:endParaRPr/>
+          </a:p>
+          <a:p>
+            <a:pPr lvl="1"/>
+            <a:r>
+              <a:rPr/>
+              <a:t>Have a brief discussion about uploading to servers, about web hosting, what it means, how it works, how much it costs, what hosting companies do.</a:t>
             </a:r>
           </a:p>
         </p:txBody>
@@ -1783,11 +1863,6 @@
         </p:txBody>
       </p:sp>
     </p:spTree>
-    <p:extLst>
-      <p:ext uri="{BB962C8B-B14F-4D97-AF65-F5344CB8AC3E}">
-        <p14:creationId xmlns:p14="http://schemas.microsoft.com/office/powerpoint/2010/main" val="1142708569"/>
-      </p:ext>
-    </p:extLst>
   </p:cSld>
   <p:clrMapOvr>
     <a:masterClrMapping/>
@@ -1845,192 +1920,174 @@
           <a:lstStyle/>
           <a:p>
             <a:pPr marL="0" lvl="0" indent="0">
-              <a:buNone/>
-            </a:pPr>
-            <a:r>
-              <a:rPr dirty="0"/>
-              <a:t>[10 </a:t>
-            </a:r>
-            <a:r>
-              <a:rPr dirty="0" err="1"/>
-              <a:t>mins</a:t>
-            </a:r>
-            <a:r>
-              <a:rPr dirty="0"/>
-              <a:t> </a:t>
-            </a:r>
-            <a:r>
-              <a:rPr dirty="0" smtClean="0"/>
-              <a:t>]</a:t>
-            </a:r>
-            <a:endParaRPr lang="en-GB" dirty="0" smtClean="0"/>
+              <a:spcBef>
+                <a:spcPts val="3000"/>
+              </a:spcBef>
+              <a:buNone/>
+            </a:pPr>
+            <a:r>
+              <a:rPr b="1"/>
+              <a:t>Go Online!</a:t>
+            </a:r>
           </a:p>
           <a:p>
             <a:pPr marL="0" lvl="0" indent="0">
               <a:buNone/>
             </a:pPr>
-            <a:endParaRPr lang="en-GB" dirty="0" smtClean="0"/>
+            <a:endParaRPr b="1"/>
+          </a:p>
+          <a:p>
+            <a:pPr marL="0" lvl="0" indent="0">
+              <a:buNone/>
+            </a:pPr>
+            <a:r>
+              <a:rPr/>
+              <a:t>[15 mins]</a:t>
+            </a:r>
+          </a:p>
+          <a:p>
+            <a:pPr marL="0" lvl="0" indent="0">
+              <a:buNone/>
+            </a:pPr>
+            <a:endParaRPr/>
           </a:p>
           <a:p>
             <a:pPr lvl="1"/>
-            <a:endParaRPr lang="en-GB" sz="2400" dirty="0" smtClean="0">
-              <a:solidFill>
-                <a:schemeClr val="tx1"/>
-              </a:solidFill>
-              <a:latin typeface="+mn-lt"/>
-            </a:endParaRPr>
+            <a:r>
+              <a:rPr/>
+              <a:t>If your institution has server space and resources available, show participants how to use a file transfer application (such as fetch) to transfer their pages to a folder on the server. Talk about UPLOADING vs DOWNLOADING</a:t>
+            </a:r>
+          </a:p>
+          <a:p>
+            <a:pPr marL="0" lvl="0" indent="0">
+              <a:buNone/>
+            </a:pPr>
+            <a:endParaRPr/>
           </a:p>
           <a:p>
             <a:pPr lvl="1"/>
             <a:r>
-              <a:rPr lang="en-GB" sz="2400" dirty="0" smtClean="0">
-                <a:solidFill>
-                  <a:schemeClr val="tx1"/>
-                </a:solidFill>
-                <a:latin typeface="+mn-lt"/>
-              </a:rPr>
-              <a:t>Don’t forget your closing tags!</a:t>
-            </a:r>
+              <a:rPr/>
+              <a:t>Discuss how the URL will be constructed, ask users to figure out their own URLs – domain name, class folder name, personal folder name, page name.</a:t>
+            </a:r>
+          </a:p>
+          <a:p>
+            <a:pPr marL="0" lvl="0" indent="0">
+              <a:buNone/>
+            </a:pPr>
+            <a:endParaRPr/>
           </a:p>
           <a:p>
             <a:pPr lvl="1"/>
             <a:r>
-              <a:rPr lang="en-GB" sz="2400" dirty="0" smtClean="0">
-                <a:solidFill>
-                  <a:schemeClr val="tx1"/>
-                </a:solidFill>
-                <a:latin typeface="+mn-lt"/>
-              </a:rPr>
-              <a:t>For extra credit, add links to other sites (such as a page about your hometown, your </a:t>
-            </a:r>
-            <a:r>
-              <a:rPr lang="en-GB" sz="2400" dirty="0" err="1" smtClean="0">
-                <a:solidFill>
-                  <a:schemeClr val="tx1"/>
-                </a:solidFill>
-                <a:latin typeface="+mn-lt"/>
-              </a:rPr>
-              <a:t>favorite</a:t>
-            </a:r>
-            <a:r>
-              <a:rPr lang="en-GB" sz="2400" dirty="0" smtClean="0">
-                <a:solidFill>
-                  <a:schemeClr val="tx1"/>
-                </a:solidFill>
-                <a:latin typeface="+mn-lt"/>
-              </a:rPr>
-              <a:t> sports team, artist or musician, or a </a:t>
-            </a:r>
-            <a:r>
-              <a:rPr lang="en-GB" sz="2400" dirty="0" err="1" smtClean="0">
-                <a:solidFill>
-                  <a:schemeClr val="tx1"/>
-                </a:solidFill>
-                <a:latin typeface="+mn-lt"/>
-              </a:rPr>
-              <a:t>favorite</a:t>
-            </a:r>
-            <a:r>
-              <a:rPr lang="en-GB" sz="2400" dirty="0" smtClean="0">
-                <a:solidFill>
-                  <a:schemeClr val="tx1"/>
-                </a:solidFill>
-                <a:latin typeface="+mn-lt"/>
-              </a:rPr>
-              <a:t> recipe). You can also download and add images, just make sure they are in the “xx-webpage” folder.</a:t>
-            </a:r>
+              <a:rPr/>
+              <a:t>Once all the pages are on the server, have users point their browsers to the URL on the web to see their pages. You’re on the web for real! Woo-hoo!</a:t>
+            </a:r>
+          </a:p>
+          <a:p>
+            <a:pPr marL="0" lvl="0" indent="0">
+              <a:buNone/>
+            </a:pPr>
+            <a:endParaRPr/>
+          </a:p>
+          <a:p>
+            <a:pPr marL="1270000" lvl="0" indent="0">
+              <a:buNone/>
+            </a:pPr>
+            <a:r>
+              <a:rPr sz="2000"/>
+              <a:t>Tip! If time, have a brief discussion of web hosting, what it means, how it works, how much it costs, what hosting companies do.</a:t>
+            </a:r>
+          </a:p>
+          <a:p>
+            <a:pPr marL="0" lvl="0" indent="0">
+              <a:buNone/>
+            </a:pPr>
+            <a:endParaRPr sz="2000"/>
+          </a:p>
+          <a:p>
+            <a:pPr marL="0" lvl="0" indent="0">
+              <a:spcBef>
+                <a:spcPts val="3000"/>
+              </a:spcBef>
+              <a:buNone/>
+            </a:pPr>
+            <a:r>
+              <a:rPr b="1"/>
+              <a:t>Learning Experience Reflection</a:t>
+            </a:r>
+          </a:p>
+          <a:p>
+            <a:pPr marL="0" lvl="0" indent="0">
+              <a:buNone/>
+            </a:pPr>
+            <a:endParaRPr b="1"/>
+          </a:p>
+          <a:p>
+            <a:pPr marL="0" lvl="0" indent="0">
+              <a:buNone/>
+            </a:pPr>
+            <a:r>
+              <a:rPr/>
+              <a:t>[5 mins]</a:t>
+            </a:r>
+          </a:p>
+          <a:p>
+            <a:pPr marL="0" lvl="0" indent="0">
+              <a:buNone/>
+            </a:pPr>
+            <a:endParaRPr/>
           </a:p>
           <a:p>
             <a:pPr lvl="1"/>
             <a:r>
-              <a:rPr lang="en-GB" sz="2400" dirty="0" smtClean="0">
-                <a:solidFill>
-                  <a:schemeClr val="tx1"/>
-                </a:solidFill>
-                <a:latin typeface="+mn-lt"/>
-              </a:rPr>
-              <a:t>Finally, when you’ve added all your tags, save the page!</a:t>
-            </a:r>
+              <a:rPr/>
+              <a:t>What did you like about this activity?</a:t>
+            </a:r>
+          </a:p>
+          <a:p>
+            <a:pPr marL="0" lvl="0" indent="0">
+              <a:buNone/>
+            </a:pPr>
+            <a:endParaRPr/>
           </a:p>
           <a:p>
             <a:pPr lvl="1"/>
             <a:r>
-              <a:rPr lang="en-GB" sz="2400" dirty="0" smtClean="0">
-                <a:solidFill>
-                  <a:schemeClr val="tx1"/>
-                </a:solidFill>
-                <a:latin typeface="+mn-lt"/>
-              </a:rPr>
-              <a:t>Now, open your </a:t>
-            </a:r>
-            <a:r>
-              <a:rPr lang="en-GB" sz="2400" dirty="0" err="1" smtClean="0">
-                <a:solidFill>
-                  <a:schemeClr val="tx1"/>
-                </a:solidFill>
-                <a:latin typeface="+mn-lt"/>
-              </a:rPr>
-              <a:t>favorite</a:t>
-            </a:r>
-            <a:r>
-              <a:rPr lang="en-GB" sz="2400" dirty="0" smtClean="0">
-                <a:solidFill>
-                  <a:schemeClr val="tx1"/>
-                </a:solidFill>
-                <a:latin typeface="+mn-lt"/>
-              </a:rPr>
-              <a:t> browser, and go to File &gt; open file. Navigate to your folder, and click on the html file you just made. How does it look? Are you seeing your content formatted for the web? Do you see your title appearing in the tab at the top of the browser bar? If things don’t look right, what might have happened?</a:t>
-            </a:r>
-          </a:p>
-          <a:p>
-            <a:pPr marL="1270000" indent="0">
-              <a:buNone/>
-            </a:pPr>
-            <a:r>
-              <a:rPr lang="en-GB" sz="2400" dirty="0" smtClean="0">
-                <a:solidFill>
-                  <a:schemeClr val="tx1"/>
-                </a:solidFill>
-                <a:latin typeface="+mn-lt"/>
-              </a:rPr>
-              <a:t>Tip! Facilitator can troubleshoot here— common problems are missing tags, especially closing tags, typos in tags, a document not saved as html, problems with image file names, etc. Facilitator can walk around and check pages, and discuss or even demo on the projected example what happens when tags are left off (for example, never closing an h1 tag is a great way to show the importance of closing tags).</a:t>
-            </a:r>
+              <a:rPr/>
+              <a:t>If you might teach this activity to a particular audience, what might you change about the process, structure, or content to better meet the needs of that audience?</a:t>
+            </a:r>
+          </a:p>
+          <a:p>
+            <a:pPr marL="0" lvl="0" indent="0">
+              <a:buNone/>
+            </a:pPr>
+            <a:endParaRPr/>
+          </a:p>
+          <a:p>
+            <a:pPr marL="0" lvl="0" indent="0">
+              <a:spcBef>
+                <a:spcPts val="3000"/>
+              </a:spcBef>
+              <a:buNone/>
+            </a:pPr>
+            <a:r>
+              <a:rPr b="1"/>
+              <a:t>Feedback on Core Curriculum</a:t>
+            </a:r>
+          </a:p>
+          <a:p>
+            <a:pPr marL="0" lvl="0" indent="0">
+              <a:buNone/>
+            </a:pPr>
+            <a:endParaRPr b="1"/>
           </a:p>
           <a:p>
             <a:pPr lvl="1"/>
             <a:r>
-              <a:rPr lang="en-GB" sz="2400" dirty="0" smtClean="0">
-                <a:solidFill>
-                  <a:schemeClr val="tx1"/>
-                </a:solidFill>
-                <a:latin typeface="+mn-lt"/>
-              </a:rPr>
-              <a:t>Congratulate everyone on the pages they’ve made! They are now web designers! Remind folks that the pages are still on their local computers, and not actually on the web! But they are ready to go there.</a:t>
-            </a:r>
-          </a:p>
-          <a:p>
-            <a:pPr lvl="1"/>
-            <a:r>
-              <a:rPr lang="en-GB" sz="2400" dirty="0" smtClean="0">
-                <a:solidFill>
-                  <a:schemeClr val="tx1"/>
-                </a:solidFill>
-                <a:latin typeface="+mn-lt"/>
-              </a:rPr>
-              <a:t>Have a brief discussion about uploading to servers, about web hosting, what it means, how it works, how much it costs, what hosting companies do.</a:t>
-            </a:r>
-          </a:p>
-          <a:p>
-            <a:pPr marL="0" lvl="0" indent="0">
-              <a:buNone/>
-            </a:pPr>
-            <a:endParaRPr lang="en-GB" dirty="0" smtClean="0"/>
-          </a:p>
-          <a:p>
-            <a:pPr marL="0" lvl="0" indent="0">
-              <a:buNone/>
-            </a:pPr>
-            <a:endParaRPr dirty="0"/>
+              <a:rPr/>
+              <a:t>Tell us how and where you’re using the curriculum and what you’ve learned and what you might change.</a:t>
+            </a:r>
           </a:p>
         </p:txBody>
       </p:sp>
@@ -2058,466 +2115,6 @@
         </p:txBody>
       </p:sp>
     </p:spTree>
-  </p:cSld>
-  <p:clrMapOvr>
-    <a:masterClrMapping/>
-  </p:clrMapOvr>
-</p:notes>
-</file>
-
-<file path=ppt/notesSlides/notesSlide7.xml><?xml version="1.0" encoding="utf-8"?>
-<p:notes xmlns:a="http://schemas.openxmlformats.org/drawingml/2006/main" xmlns:r="http://schemas.openxmlformats.org/officeDocument/2006/relationships" xmlns:p="http://schemas.openxmlformats.org/presentationml/2006/main">
-  <p:cSld>
-    <p:spTree>
-      <p:nvGrpSpPr>
-        <p:cNvPr id="1" name=""/>
-        <p:cNvGrpSpPr/>
-        <p:nvPr/>
-      </p:nvGrpSpPr>
-      <p:grpSpPr>
-        <a:xfrm>
-          <a:off x="0" y="0"/>
-          <a:ext cx="0" cy="0"/>
-          <a:chOff x="0" y="0"/>
-          <a:chExt cx="0" cy="0"/>
-        </a:xfrm>
-      </p:grpSpPr>
-      <p:sp>
-        <p:nvSpPr>
-          <p:cNvPr id="2" name="Slide Image Placeholder 1"/>
-          <p:cNvSpPr>
-            <a:spLocks noGrp="1" noRot="1" noChangeAspect="1"/>
-          </p:cNvSpPr>
-          <p:nvPr>
-            <p:ph type="sldImg"/>
-          </p:nvPr>
-        </p:nvSpPr>
-        <p:spPr>
-          <a:xfrm>
-            <a:off x="685800" y="1143000"/>
-            <a:ext cx="5486400" cy="3086100"/>
-          </a:xfrm>
-        </p:spPr>
-      </p:sp>
-      <p:sp>
-        <p:nvSpPr>
-          <p:cNvPr id="3" name="Notes Placeholder 2"/>
-          <p:cNvSpPr>
-            <a:spLocks noGrp="1"/>
-          </p:cNvSpPr>
-          <p:nvPr>
-            <p:ph type="body" idx="1"/>
-          </p:nvPr>
-        </p:nvSpPr>
-        <p:spPr/>
-        <p:txBody>
-          <a:bodyPr/>
-          <a:lstStyle/>
-          <a:p>
-            <a:pPr marL="0" lvl="0" indent="0">
-              <a:buNone/>
-            </a:pPr>
-            <a:r>
-              <a:rPr/>
-              <a:t>[10 mins ]</a:t>
-            </a:r>
-          </a:p>
-        </p:txBody>
-      </p:sp>
-      <p:sp>
-        <p:nvSpPr>
-          <p:cNvPr id="4" name="Slide Number Placeholder 3"/>
-          <p:cNvSpPr>
-            <a:spLocks noGrp="1"/>
-          </p:cNvSpPr>
-          <p:nvPr>
-            <p:ph type="sldNum" sz="quarter" idx="10"/>
-          </p:nvPr>
-        </p:nvSpPr>
-        <p:spPr/>
-        <p:txBody>
-          <a:bodyPr/>
-          <a:lstStyle/>
-          <a:p>
-            <a:fld id="{18BDFEC3-8487-43E8-A154-7C12CBC1FFF2}" type="slidenum">
-              <a:rPr lang="en-US"/>
-              <a:t>11</a:t>
-            </a:fld>
-            <a:endParaRPr lang="en-US"/>
-          </a:p>
-        </p:txBody>
-      </p:sp>
-    </p:spTree>
-    <p:extLst>
-      <p:ext uri="{BB962C8B-B14F-4D97-AF65-F5344CB8AC3E}">
-        <p14:creationId xmlns:p14="http://schemas.microsoft.com/office/powerpoint/2010/main" val="404216726"/>
-      </p:ext>
-    </p:extLst>
-  </p:cSld>
-  <p:clrMapOvr>
-    <a:masterClrMapping/>
-  </p:clrMapOvr>
-</p:notes>
-</file>
-
-<file path=ppt/notesSlides/notesSlide8.xml><?xml version="1.0" encoding="utf-8"?>
-<p:notes xmlns:a="http://schemas.openxmlformats.org/drawingml/2006/main" xmlns:r="http://schemas.openxmlformats.org/officeDocument/2006/relationships" xmlns:p="http://schemas.openxmlformats.org/presentationml/2006/main">
-  <p:cSld>
-    <p:spTree>
-      <p:nvGrpSpPr>
-        <p:cNvPr id="1" name=""/>
-        <p:cNvGrpSpPr/>
-        <p:nvPr/>
-      </p:nvGrpSpPr>
-      <p:grpSpPr>
-        <a:xfrm>
-          <a:off x="0" y="0"/>
-          <a:ext cx="0" cy="0"/>
-          <a:chOff x="0" y="0"/>
-          <a:chExt cx="0" cy="0"/>
-        </a:xfrm>
-      </p:grpSpPr>
-      <p:sp>
-        <p:nvSpPr>
-          <p:cNvPr id="2" name="Slide Image Placeholder 1"/>
-          <p:cNvSpPr>
-            <a:spLocks noGrp="1" noRot="1" noChangeAspect="1"/>
-          </p:cNvSpPr>
-          <p:nvPr>
-            <p:ph type="sldImg"/>
-          </p:nvPr>
-        </p:nvSpPr>
-        <p:spPr>
-          <a:xfrm>
-            <a:off x="685800" y="1143000"/>
-            <a:ext cx="5486400" cy="3086100"/>
-          </a:xfrm>
-        </p:spPr>
-      </p:sp>
-      <p:sp>
-        <p:nvSpPr>
-          <p:cNvPr id="3" name="Notes Placeholder 2"/>
-          <p:cNvSpPr>
-            <a:spLocks noGrp="1"/>
-          </p:cNvSpPr>
-          <p:nvPr>
-            <p:ph type="body" idx="1"/>
-          </p:nvPr>
-        </p:nvSpPr>
-        <p:spPr/>
-        <p:txBody>
-          <a:bodyPr/>
-          <a:lstStyle/>
-          <a:p>
-            <a:pPr marL="0" lvl="0" indent="0">
-              <a:buNone/>
-            </a:pPr>
-            <a:r>
-              <a:rPr/>
-              <a:t>[15 mins]</a:t>
-            </a:r>
-          </a:p>
-          <a:p>
-            <a:pPr marL="0" lvl="0" indent="0">
-              <a:buNone/>
-            </a:pPr>
-            <a:endParaRPr/>
-          </a:p>
-          <a:p>
-            <a:pPr marL="0" lvl="0" indent="0">
-              <a:spcBef>
-                <a:spcPts val="3000"/>
-              </a:spcBef>
-              <a:buNone/>
-            </a:pPr>
-            <a:r>
-              <a:rPr b="1"/>
-              <a:t>Learning Experience Reflection</a:t>
-            </a:r>
-          </a:p>
-          <a:p>
-            <a:pPr marL="0" lvl="0" indent="0">
-              <a:buNone/>
-            </a:pPr>
-            <a:endParaRPr b="1"/>
-          </a:p>
-          <a:p>
-            <a:pPr marL="0" lvl="0" indent="0">
-              <a:buNone/>
-            </a:pPr>
-            <a:r>
-              <a:rPr/>
-              <a:t>[5 mins]</a:t>
-            </a:r>
-          </a:p>
-          <a:p>
-            <a:pPr marL="0" lvl="0" indent="0">
-              <a:buNone/>
-            </a:pPr>
-            <a:endParaRPr/>
-          </a:p>
-          <a:p>
-            <a:pPr lvl="1"/>
-            <a:r>
-              <a:rPr/>
-              <a:t>What did you like about this activity?</a:t>
-            </a:r>
-          </a:p>
-          <a:p>
-            <a:pPr marL="0" lvl="0" indent="0">
-              <a:buNone/>
-            </a:pPr>
-            <a:endParaRPr/>
-          </a:p>
-          <a:p>
-            <a:pPr lvl="1"/>
-            <a:r>
-              <a:rPr/>
-              <a:t>If you might teach this activity to a particular audience, what might you change about the process, structure, or content to better meet the needs of that audience?</a:t>
-            </a:r>
-          </a:p>
-          <a:p>
-            <a:pPr marL="0" lvl="0" indent="0">
-              <a:buNone/>
-            </a:pPr>
-            <a:endParaRPr/>
-          </a:p>
-          <a:p>
-            <a:pPr marL="0" lvl="0" indent="0">
-              <a:spcBef>
-                <a:spcPts val="3000"/>
-              </a:spcBef>
-              <a:buNone/>
-            </a:pPr>
-            <a:r>
-              <a:rPr b="1"/>
-              <a:t>Feedback on Core Curriculum</a:t>
-            </a:r>
-          </a:p>
-          <a:p>
-            <a:pPr marL="0" lvl="0" indent="0">
-              <a:buNone/>
-            </a:pPr>
-            <a:endParaRPr b="1"/>
-          </a:p>
-          <a:p>
-            <a:pPr lvl="1"/>
-            <a:r>
-              <a:rPr/>
-              <a:t>Tell us how and where you’re using the curriculum and what you’ve learned and what you might change.</a:t>
-            </a:r>
-          </a:p>
-        </p:txBody>
-      </p:sp>
-      <p:sp>
-        <p:nvSpPr>
-          <p:cNvPr id="4" name="Slide Number Placeholder 3"/>
-          <p:cNvSpPr>
-            <a:spLocks noGrp="1"/>
-          </p:cNvSpPr>
-          <p:nvPr>
-            <p:ph type="sldNum" sz="quarter" idx="10"/>
-          </p:nvPr>
-        </p:nvSpPr>
-        <p:spPr/>
-        <p:txBody>
-          <a:bodyPr/>
-          <a:lstStyle/>
-          <a:p>
-            <a:fld id="{18BDFEC3-8487-43E8-A154-7C12CBC1FFF2}" type="slidenum">
-              <a:rPr lang="en-US"/>
-              <a:t>12</a:t>
-            </a:fld>
-            <a:endParaRPr lang="en-US"/>
-          </a:p>
-        </p:txBody>
-      </p:sp>
-    </p:spTree>
-  </p:cSld>
-  <p:clrMapOvr>
-    <a:masterClrMapping/>
-  </p:clrMapOvr>
-</p:notes>
-</file>
-
-<file path=ppt/notesSlides/notesSlide9.xml><?xml version="1.0" encoding="utf-8"?>
-<p:notes xmlns:a="http://schemas.openxmlformats.org/drawingml/2006/main" xmlns:r="http://schemas.openxmlformats.org/officeDocument/2006/relationships" xmlns:p="http://schemas.openxmlformats.org/presentationml/2006/main">
-  <p:cSld>
-    <p:spTree>
-      <p:nvGrpSpPr>
-        <p:cNvPr id="1" name=""/>
-        <p:cNvGrpSpPr/>
-        <p:nvPr/>
-      </p:nvGrpSpPr>
-      <p:grpSpPr>
-        <a:xfrm>
-          <a:off x="0" y="0"/>
-          <a:ext cx="0" cy="0"/>
-          <a:chOff x="0" y="0"/>
-          <a:chExt cx="0" cy="0"/>
-        </a:xfrm>
-      </p:grpSpPr>
-      <p:sp>
-        <p:nvSpPr>
-          <p:cNvPr id="2" name="Slide Image Placeholder 1"/>
-          <p:cNvSpPr>
-            <a:spLocks noGrp="1" noRot="1" noChangeAspect="1"/>
-          </p:cNvSpPr>
-          <p:nvPr>
-            <p:ph type="sldImg"/>
-          </p:nvPr>
-        </p:nvSpPr>
-        <p:spPr>
-          <a:xfrm>
-            <a:off x="685800" y="1143000"/>
-            <a:ext cx="5486400" cy="3086100"/>
-          </a:xfrm>
-        </p:spPr>
-      </p:sp>
-      <p:sp>
-        <p:nvSpPr>
-          <p:cNvPr id="3" name="Notes Placeholder 2"/>
-          <p:cNvSpPr>
-            <a:spLocks noGrp="1"/>
-          </p:cNvSpPr>
-          <p:nvPr>
-            <p:ph type="body" idx="1"/>
-          </p:nvPr>
-        </p:nvSpPr>
-        <p:spPr/>
-        <p:txBody>
-          <a:bodyPr/>
-          <a:lstStyle/>
-          <a:p>
-            <a:pPr marL="0" lvl="0" indent="0">
-              <a:buNone/>
-            </a:pPr>
-            <a:r>
-              <a:rPr/>
-              <a:t>[15 mins]</a:t>
-            </a:r>
-          </a:p>
-          <a:p>
-            <a:pPr marL="0" lvl="0" indent="0">
-              <a:buNone/>
-            </a:pPr>
-            <a:endParaRPr/>
-          </a:p>
-          <a:p>
-            <a:pPr marL="0" lvl="0" indent="0">
-              <a:spcBef>
-                <a:spcPts val="3000"/>
-              </a:spcBef>
-              <a:buNone/>
-            </a:pPr>
-            <a:r>
-              <a:rPr b="1"/>
-              <a:t>Learning Experience Reflection</a:t>
-            </a:r>
-          </a:p>
-          <a:p>
-            <a:pPr marL="0" lvl="0" indent="0">
-              <a:buNone/>
-            </a:pPr>
-            <a:endParaRPr b="1"/>
-          </a:p>
-          <a:p>
-            <a:pPr marL="0" lvl="0" indent="0">
-              <a:buNone/>
-            </a:pPr>
-            <a:r>
-              <a:rPr/>
-              <a:t>[5 mins]</a:t>
-            </a:r>
-          </a:p>
-          <a:p>
-            <a:pPr marL="0" lvl="0" indent="0">
-              <a:buNone/>
-            </a:pPr>
-            <a:endParaRPr/>
-          </a:p>
-          <a:p>
-            <a:pPr lvl="1"/>
-            <a:r>
-              <a:rPr/>
-              <a:t>What did you like about this activity?</a:t>
-            </a:r>
-          </a:p>
-          <a:p>
-            <a:pPr marL="0" lvl="0" indent="0">
-              <a:buNone/>
-            </a:pPr>
-            <a:endParaRPr/>
-          </a:p>
-          <a:p>
-            <a:pPr lvl="1"/>
-            <a:r>
-              <a:rPr/>
-              <a:t>If you might teach this activity to a particular audience, what might you change about the process, structure, or content to better meet the needs of that audience?</a:t>
-            </a:r>
-          </a:p>
-          <a:p>
-            <a:pPr marL="0" lvl="0" indent="0">
-              <a:buNone/>
-            </a:pPr>
-            <a:endParaRPr/>
-          </a:p>
-          <a:p>
-            <a:pPr marL="0" lvl="0" indent="0">
-              <a:spcBef>
-                <a:spcPts val="3000"/>
-              </a:spcBef>
-              <a:buNone/>
-            </a:pPr>
-            <a:r>
-              <a:rPr b="1"/>
-              <a:t>Feedback on Core Curriculum</a:t>
-            </a:r>
-          </a:p>
-          <a:p>
-            <a:pPr marL="0" lvl="0" indent="0">
-              <a:buNone/>
-            </a:pPr>
-            <a:endParaRPr b="1"/>
-          </a:p>
-          <a:p>
-            <a:pPr lvl="1"/>
-            <a:r>
-              <a:rPr/>
-              <a:t>Tell us how and where you’re using the curriculum and what you’ve learned and what you might change.</a:t>
-            </a:r>
-          </a:p>
-        </p:txBody>
-      </p:sp>
-      <p:sp>
-        <p:nvSpPr>
-          <p:cNvPr id="4" name="Slide Number Placeholder 3"/>
-          <p:cNvSpPr>
-            <a:spLocks noGrp="1"/>
-          </p:cNvSpPr>
-          <p:nvPr>
-            <p:ph type="sldNum" sz="quarter" idx="10"/>
-          </p:nvPr>
-        </p:nvSpPr>
-        <p:spPr/>
-        <p:txBody>
-          <a:bodyPr/>
-          <a:lstStyle/>
-          <a:p>
-            <a:fld id="{18BDFEC3-8487-43E8-A154-7C12CBC1FFF2}" type="slidenum">
-              <a:rPr lang="en-US"/>
-              <a:t>13</a:t>
-            </a:fld>
-            <a:endParaRPr lang="en-US"/>
-          </a:p>
-        </p:txBody>
-      </p:sp>
-    </p:spTree>
-    <p:extLst>
-      <p:ext uri="{BB962C8B-B14F-4D97-AF65-F5344CB8AC3E}">
-        <p14:creationId xmlns:p14="http://schemas.microsoft.com/office/powerpoint/2010/main" val="3880685028"/>
-      </p:ext>
-    </p:extLst>
   </p:cSld>
   <p:clrMapOvr>
     <a:masterClrMapping/>
@@ -2962,7 +2559,7 @@
     </p:spTree>
     <p:extLst>
       <p:ext uri="{BB962C8B-B14F-4D97-AF65-F5344CB8AC3E}">
-        <p14:creationId xmlns:p14="http://schemas.microsoft.com/office/powerpoint/2010/main" val="936307623"/>
+        <p14:creationId xmlns:p14="http://schemas.microsoft.com/office/powerpoint/2010/main" val="1270837586"/>
       </p:ext>
     </p:extLst>
   </p:cSld>
@@ -3011,7 +2608,7 @@
     </p:spTree>
     <p:extLst>
       <p:ext uri="{BB962C8B-B14F-4D97-AF65-F5344CB8AC3E}">
-        <p14:creationId xmlns:p14="http://schemas.microsoft.com/office/powerpoint/2010/main" val="1615952006"/>
+        <p14:creationId xmlns:p14="http://schemas.microsoft.com/office/powerpoint/2010/main" val="4292972234"/>
       </p:ext>
     </p:extLst>
   </p:cSld>
@@ -3093,42 +2690,286 @@
         <p:spPr/>
         <p:txBody>
           <a:bodyPr/>
-          <a:lstStyle/>
-          <a:p>
-            <a:pPr lvl="0"/>
-            <a:r>
-              <a:rPr lang="en-US" smtClean="0"/>
-              <a:t>Click to edit Master text styles</a:t>
-            </a:r>
-          </a:p>
-          <a:p>
-            <a:pPr lvl="1"/>
-            <a:r>
-              <a:rPr lang="en-US" smtClean="0"/>
+          <a:lstStyle>
+            <a:lvl1pPr marL="0" marR="0" indent="0" algn="l" defTabSz="914400" rtl="0" eaLnBrk="1" fontAlgn="auto" latinLnBrk="0" hangingPunct="1">
+              <a:lnSpc>
+                <a:spcPct val="90000"/>
+              </a:lnSpc>
+              <a:spcBef>
+                <a:spcPts val="1000"/>
+              </a:spcBef>
+              <a:spcAft>
+                <a:spcPts val="0"/>
+              </a:spcAft>
+              <a:buClrTx/>
+              <a:buSzTx/>
+              <a:buFont typeface="Arial" panose="020B0604020202020204" pitchFamily="34" charset="0"/>
+              <a:buNone/>
+              <a:tabLst/>
+              <a:defRPr/>
+            </a:lvl1pPr>
+            <a:lvl2pPr marL="685800" marR="0" indent="-228600" algn="l" defTabSz="914400" rtl="0" eaLnBrk="1" fontAlgn="auto" latinLnBrk="0" hangingPunct="1">
+              <a:lnSpc>
+                <a:spcPct val="90000"/>
+              </a:lnSpc>
+              <a:spcBef>
+                <a:spcPts val="500"/>
+              </a:spcBef>
+              <a:spcAft>
+                <a:spcPts val="0"/>
+              </a:spcAft>
+              <a:buClrTx/>
+              <a:buSzTx/>
+              <a:buFont typeface="Arial" panose="020B0604020202020204" pitchFamily="34" charset="0"/>
+              <a:buChar char="•"/>
+              <a:tabLst/>
+              <a:defRPr/>
+            </a:lvl2pPr>
+            <a:lvl3pPr marL="1143000" marR="0" indent="-228600" algn="l" defTabSz="914400" rtl="0" eaLnBrk="1" fontAlgn="auto" latinLnBrk="0" hangingPunct="1">
+              <a:lnSpc>
+                <a:spcPct val="90000"/>
+              </a:lnSpc>
+              <a:spcBef>
+                <a:spcPts val="500"/>
+              </a:spcBef>
+              <a:spcAft>
+                <a:spcPts val="0"/>
+              </a:spcAft>
+              <a:buClrTx/>
+              <a:buSzTx/>
+              <a:buFont typeface="Arial" panose="020B0604020202020204" pitchFamily="34" charset="0"/>
+              <a:buChar char="•"/>
+              <a:tabLst/>
+              <a:defRPr/>
+            </a:lvl3pPr>
+            <a:lvl4pPr marL="1600200" marR="0" indent="-228600" algn="l" defTabSz="914400" rtl="0" eaLnBrk="1" fontAlgn="auto" latinLnBrk="0" hangingPunct="1">
+              <a:lnSpc>
+                <a:spcPct val="90000"/>
+              </a:lnSpc>
+              <a:spcBef>
+                <a:spcPts val="500"/>
+              </a:spcBef>
+              <a:spcAft>
+                <a:spcPts val="0"/>
+              </a:spcAft>
+              <a:buClrTx/>
+              <a:buSzTx/>
+              <a:buFont typeface="Arial" panose="020B0604020202020204" pitchFamily="34" charset="0"/>
+              <a:buChar char="•"/>
+              <a:tabLst/>
+              <a:defRPr/>
+            </a:lvl4pPr>
+            <a:lvl5pPr marL="2057400" marR="0" indent="-228600" algn="l" defTabSz="914400" rtl="0" eaLnBrk="1" fontAlgn="auto" latinLnBrk="0" hangingPunct="1">
+              <a:lnSpc>
+                <a:spcPct val="90000"/>
+              </a:lnSpc>
+              <a:spcBef>
+                <a:spcPts val="500"/>
+              </a:spcBef>
+              <a:spcAft>
+                <a:spcPts val="0"/>
+              </a:spcAft>
+              <a:buClrTx/>
+              <a:buSzTx/>
+              <a:buFont typeface="Arial" panose="020B0604020202020204" pitchFamily="34" charset="0"/>
+              <a:buChar char="•"/>
+              <a:tabLst/>
+              <a:defRPr/>
+            </a:lvl5pPr>
+          </a:lstStyle>
+          <a:p>
+            <a:pPr marL="0" marR="0" lvl="0" indent="0" algn="l" defTabSz="914400" rtl="0" eaLnBrk="1" fontAlgn="auto" latinLnBrk="0" hangingPunct="1">
+              <a:lnSpc>
+                <a:spcPct val="90000"/>
+              </a:lnSpc>
+              <a:spcBef>
+                <a:spcPts val="1000"/>
+              </a:spcBef>
+              <a:spcAft>
+                <a:spcPts val="0"/>
+              </a:spcAft>
+              <a:buClrTx/>
+              <a:buSzTx/>
+              <a:buFont typeface="Arial" panose="020B0604020202020204" pitchFamily="34" charset="0"/>
+              <a:buNone/>
+              <a:tabLst/>
+              <a:defRPr/>
+            </a:pPr>
+            <a:r>
+              <a:rPr kumimoji="0" lang="en-US" sz="2400" b="0" i="0" u="none" strike="noStrike" kern="1200" cap="none" spc="0" normalizeH="0" baseline="0" noProof="0" smtClean="0">
+                <a:ln>
+                  <a:noFill/>
+                </a:ln>
+                <a:solidFill>
+                  <a:prstClr val="black"/>
+                </a:solidFill>
+                <a:effectLst/>
+                <a:uLnTx/>
+                <a:uFillTx/>
+                <a:latin typeface="Arial" panose="020B0604020202020204" pitchFamily="34" charset="0"/>
+                <a:cs typeface="Arial" panose="020B0604020202020204" pitchFamily="34" charset="0"/>
+                <a:sym typeface="Roboto"/>
+              </a:rPr>
+              <a:t>Edit Master text styles</a:t>
+            </a:r>
+          </a:p>
+          <a:p>
+            <a:pPr marL="0" marR="0" lvl="1" indent="0" algn="l" defTabSz="914400" rtl="0" eaLnBrk="1" fontAlgn="auto" latinLnBrk="0" hangingPunct="1">
+              <a:lnSpc>
+                <a:spcPct val="90000"/>
+              </a:lnSpc>
+              <a:spcBef>
+                <a:spcPts val="1000"/>
+              </a:spcBef>
+              <a:spcAft>
+                <a:spcPts val="0"/>
+              </a:spcAft>
+              <a:buClrTx/>
+              <a:buSzTx/>
+              <a:buFont typeface="Arial" panose="020B0604020202020204" pitchFamily="34" charset="0"/>
+              <a:buNone/>
+              <a:tabLst/>
+              <a:defRPr/>
+            </a:pPr>
+            <a:r>
+              <a:rPr kumimoji="0" lang="en-US" sz="2400" b="0" i="0" u="none" strike="noStrike" kern="1200" cap="none" spc="0" normalizeH="0" baseline="0" noProof="0" smtClean="0">
+                <a:ln>
+                  <a:noFill/>
+                </a:ln>
+                <a:solidFill>
+                  <a:prstClr val="black"/>
+                </a:solidFill>
+                <a:effectLst/>
+                <a:uLnTx/>
+                <a:uFillTx/>
+                <a:latin typeface="Arial" panose="020B0604020202020204" pitchFamily="34" charset="0"/>
+                <a:cs typeface="Arial" panose="020B0604020202020204" pitchFamily="34" charset="0"/>
+                <a:sym typeface="Roboto"/>
+              </a:rPr>
               <a:t>Second level</a:t>
             </a:r>
           </a:p>
           <a:p>
-            <a:pPr lvl="2"/>
-            <a:r>
-              <a:rPr lang="en-US" smtClean="0"/>
+            <a:pPr marL="0" marR="0" lvl="2" indent="0" algn="l" defTabSz="914400" rtl="0" eaLnBrk="1" fontAlgn="auto" latinLnBrk="0" hangingPunct="1">
+              <a:lnSpc>
+                <a:spcPct val="90000"/>
+              </a:lnSpc>
+              <a:spcBef>
+                <a:spcPts val="1000"/>
+              </a:spcBef>
+              <a:spcAft>
+                <a:spcPts val="0"/>
+              </a:spcAft>
+              <a:buClrTx/>
+              <a:buSzTx/>
+              <a:buFont typeface="Arial" panose="020B0604020202020204" pitchFamily="34" charset="0"/>
+              <a:buNone/>
+              <a:tabLst/>
+              <a:defRPr/>
+            </a:pPr>
+            <a:r>
+              <a:rPr kumimoji="0" lang="en-US" sz="2400" b="0" i="0" u="none" strike="noStrike" kern="1200" cap="none" spc="0" normalizeH="0" baseline="0" noProof="0" smtClean="0">
+                <a:ln>
+                  <a:noFill/>
+                </a:ln>
+                <a:solidFill>
+                  <a:prstClr val="black"/>
+                </a:solidFill>
+                <a:effectLst/>
+                <a:uLnTx/>
+                <a:uFillTx/>
+                <a:latin typeface="Arial" panose="020B0604020202020204" pitchFamily="34" charset="0"/>
+                <a:cs typeface="Arial" panose="020B0604020202020204" pitchFamily="34" charset="0"/>
+                <a:sym typeface="Roboto"/>
+              </a:rPr>
               <a:t>Third level</a:t>
             </a:r>
           </a:p>
           <a:p>
-            <a:pPr lvl="3"/>
-            <a:r>
-              <a:rPr lang="en-US" smtClean="0"/>
+            <a:pPr marL="0" marR="0" lvl="3" indent="0" algn="l" defTabSz="914400" rtl="0" eaLnBrk="1" fontAlgn="auto" latinLnBrk="0" hangingPunct="1">
+              <a:lnSpc>
+                <a:spcPct val="90000"/>
+              </a:lnSpc>
+              <a:spcBef>
+                <a:spcPts val="1000"/>
+              </a:spcBef>
+              <a:spcAft>
+                <a:spcPts val="0"/>
+              </a:spcAft>
+              <a:buClrTx/>
+              <a:buSzTx/>
+              <a:buFont typeface="Arial" panose="020B0604020202020204" pitchFamily="34" charset="0"/>
+              <a:buNone/>
+              <a:tabLst/>
+              <a:defRPr/>
+            </a:pPr>
+            <a:r>
+              <a:rPr kumimoji="0" lang="en-US" sz="2400" b="0" i="0" u="none" strike="noStrike" kern="1200" cap="none" spc="0" normalizeH="0" baseline="0" noProof="0" smtClean="0">
+                <a:ln>
+                  <a:noFill/>
+                </a:ln>
+                <a:solidFill>
+                  <a:prstClr val="black"/>
+                </a:solidFill>
+                <a:effectLst/>
+                <a:uLnTx/>
+                <a:uFillTx/>
+                <a:latin typeface="Arial" panose="020B0604020202020204" pitchFamily="34" charset="0"/>
+                <a:cs typeface="Arial" panose="020B0604020202020204" pitchFamily="34" charset="0"/>
+                <a:sym typeface="Roboto"/>
+              </a:rPr>
               <a:t>Fourth level</a:t>
             </a:r>
           </a:p>
           <a:p>
-            <a:pPr lvl="4"/>
-            <a:r>
-              <a:rPr lang="en-US" smtClean="0"/>
+            <a:pPr marL="0" marR="0" lvl="4" indent="0" algn="l" defTabSz="914400" rtl="0" eaLnBrk="1" fontAlgn="auto" latinLnBrk="0" hangingPunct="1">
+              <a:lnSpc>
+                <a:spcPct val="90000"/>
+              </a:lnSpc>
+              <a:spcBef>
+                <a:spcPts val="1000"/>
+              </a:spcBef>
+              <a:spcAft>
+                <a:spcPts val="0"/>
+              </a:spcAft>
+              <a:buClrTx/>
+              <a:buSzTx/>
+              <a:buFont typeface="Arial" panose="020B0604020202020204" pitchFamily="34" charset="0"/>
+              <a:buNone/>
+              <a:tabLst/>
+              <a:defRPr/>
+            </a:pPr>
+            <a:r>
+              <a:rPr kumimoji="0" lang="en-US" sz="2400" b="0" i="0" u="none" strike="noStrike" kern="1200" cap="none" spc="0" normalizeH="0" baseline="0" noProof="0" smtClean="0">
+                <a:ln>
+                  <a:noFill/>
+                </a:ln>
+                <a:solidFill>
+                  <a:prstClr val="black"/>
+                </a:solidFill>
+                <a:effectLst/>
+                <a:uLnTx/>
+                <a:uFillTx/>
+                <a:latin typeface="Arial" panose="020B0604020202020204" pitchFamily="34" charset="0"/>
+                <a:cs typeface="Arial" panose="020B0604020202020204" pitchFamily="34" charset="0"/>
+                <a:sym typeface="Roboto"/>
+              </a:rPr>
               <a:t>Fifth level</a:t>
             </a:r>
-            <a:endParaRPr lang="en-US"/>
+            <a:endParaRPr kumimoji="0" lang="en-GB" sz="1600" b="0" i="0" u="none" strike="noStrike" kern="1200" cap="none" spc="0" normalizeH="0" baseline="0" noProof="0" dirty="0" smtClean="0">
+              <a:ln>
+                <a:noFill/>
+              </a:ln>
+              <a:solidFill>
+                <a:prstClr val="black"/>
+              </a:solidFill>
+              <a:effectLst/>
+              <a:uLnTx/>
+              <a:uFillTx/>
+              <a:latin typeface="Arial" panose="020B0604020202020204" pitchFamily="34" charset="0"/>
+              <a:cs typeface="Arial" panose="020B0604020202020204" pitchFamily="34" charset="0"/>
+              <a:sym typeface="Roboto"/>
+            </a:endParaRPr>
           </a:p>
         </p:txBody>
       </p:sp>
@@ -3149,7 +2990,7 @@
           <a:p>
             <a:fld id="{241EB5C9-1307-BA42-ABA2-0BC069CD8E7F}" type="datetimeFigureOut">
               <a:rPr lang="en-US" smtClean="0"/>
-              <a:t>9/10/2021</a:t>
+              <a:t>9/13/2021</a:t>
             </a:fld>
             <a:endParaRPr lang="en-US"/>
           </a:p>
@@ -3200,7 +3041,7 @@
     </p:spTree>
     <p:extLst>
       <p:ext uri="{BB962C8B-B14F-4D97-AF65-F5344CB8AC3E}">
-        <p14:creationId xmlns:p14="http://schemas.microsoft.com/office/powerpoint/2010/main" val="2779197610"/>
+        <p14:creationId xmlns:p14="http://schemas.microsoft.com/office/powerpoint/2010/main" val="354788558"/>
       </p:ext>
     </p:extLst>
   </p:cSld>
@@ -3470,22 +3311,180 @@
               <a:defRPr/>
             </a:pPr>
             <a:r>
-              <a:rPr kumimoji="0" lang="en-US" sz="2000" b="0" i="0" u="none" strike="noStrike" kern="0" cap="none" spc="0" normalizeH="0" baseline="0" noProof="0" smtClean="0">
+              <a:rPr kumimoji="0" lang="en-US" sz="2400" b="0" i="0" u="none" strike="noStrike" kern="1200" cap="none" spc="0" normalizeH="0" baseline="0" noProof="0" smtClean="0">
                 <a:ln>
                   <a:noFill/>
                 </a:ln>
                 <a:solidFill>
-                  <a:srgbClr val="000000"/>
+                  <a:prstClr val="black"/>
                 </a:solidFill>
                 <a:effectLst/>
                 <a:uLnTx/>
                 <a:uFillTx/>
-                <a:latin typeface="Arial"/>
-                <a:cs typeface="Arial"/>
-                <a:sym typeface="Arial"/>
+                <a:latin typeface="Arial" panose="020B0604020202020204" pitchFamily="34" charset="0"/>
+                <a:cs typeface="Arial" panose="020B0604020202020204" pitchFamily="34" charset="0"/>
+                <a:sym typeface="Roboto"/>
               </a:rPr>
               <a:t>Edit Master text styles</a:t>
             </a:r>
+          </a:p>
+          <a:p>
+            <a:pPr marL="0" marR="0" lvl="1" indent="0" algn="l" defTabSz="914400" rtl="0" eaLnBrk="1" fontAlgn="auto" latinLnBrk="0" hangingPunct="1">
+              <a:lnSpc>
+                <a:spcPct val="90000"/>
+              </a:lnSpc>
+              <a:spcBef>
+                <a:spcPts val="1000"/>
+              </a:spcBef>
+              <a:spcAft>
+                <a:spcPts val="0"/>
+              </a:spcAft>
+              <a:buClrTx/>
+              <a:buSzTx/>
+              <a:buFont typeface="Arial" panose="020B0604020202020204" pitchFamily="34" charset="0"/>
+              <a:buNone/>
+              <a:tabLst/>
+              <a:defRPr/>
+            </a:pPr>
+            <a:r>
+              <a:rPr kumimoji="0" lang="en-US" sz="2400" b="0" i="0" u="none" strike="noStrike" kern="1200" cap="none" spc="0" normalizeH="0" baseline="0" noProof="0" smtClean="0">
+                <a:ln>
+                  <a:noFill/>
+                </a:ln>
+                <a:solidFill>
+                  <a:prstClr val="black"/>
+                </a:solidFill>
+                <a:effectLst/>
+                <a:uLnTx/>
+                <a:uFillTx/>
+                <a:latin typeface="Arial" panose="020B0604020202020204" pitchFamily="34" charset="0"/>
+                <a:cs typeface="Arial" panose="020B0604020202020204" pitchFamily="34" charset="0"/>
+                <a:sym typeface="Roboto"/>
+              </a:rPr>
+              <a:t>Second level</a:t>
+            </a:r>
+          </a:p>
+          <a:p>
+            <a:pPr marL="0" marR="0" lvl="2" indent="0" algn="l" defTabSz="914400" rtl="0" eaLnBrk="1" fontAlgn="auto" latinLnBrk="0" hangingPunct="1">
+              <a:lnSpc>
+                <a:spcPct val="90000"/>
+              </a:lnSpc>
+              <a:spcBef>
+                <a:spcPts val="1000"/>
+              </a:spcBef>
+              <a:spcAft>
+                <a:spcPts val="0"/>
+              </a:spcAft>
+              <a:buClrTx/>
+              <a:buSzTx/>
+              <a:buFont typeface="Arial" panose="020B0604020202020204" pitchFamily="34" charset="0"/>
+              <a:buNone/>
+              <a:tabLst/>
+              <a:defRPr/>
+            </a:pPr>
+            <a:r>
+              <a:rPr kumimoji="0" lang="en-US" sz="2400" b="0" i="0" u="none" strike="noStrike" kern="1200" cap="none" spc="0" normalizeH="0" baseline="0" noProof="0" smtClean="0">
+                <a:ln>
+                  <a:noFill/>
+                </a:ln>
+                <a:solidFill>
+                  <a:prstClr val="black"/>
+                </a:solidFill>
+                <a:effectLst/>
+                <a:uLnTx/>
+                <a:uFillTx/>
+                <a:latin typeface="Arial" panose="020B0604020202020204" pitchFamily="34" charset="0"/>
+                <a:cs typeface="Arial" panose="020B0604020202020204" pitchFamily="34" charset="0"/>
+                <a:sym typeface="Roboto"/>
+              </a:rPr>
+              <a:t>Third level</a:t>
+            </a:r>
+          </a:p>
+          <a:p>
+            <a:pPr marL="0" marR="0" lvl="3" indent="0" algn="l" defTabSz="914400" rtl="0" eaLnBrk="1" fontAlgn="auto" latinLnBrk="0" hangingPunct="1">
+              <a:lnSpc>
+                <a:spcPct val="90000"/>
+              </a:lnSpc>
+              <a:spcBef>
+                <a:spcPts val="1000"/>
+              </a:spcBef>
+              <a:spcAft>
+                <a:spcPts val="0"/>
+              </a:spcAft>
+              <a:buClrTx/>
+              <a:buSzTx/>
+              <a:buFont typeface="Arial" panose="020B0604020202020204" pitchFamily="34" charset="0"/>
+              <a:buNone/>
+              <a:tabLst/>
+              <a:defRPr/>
+            </a:pPr>
+            <a:r>
+              <a:rPr kumimoji="0" lang="en-US" sz="2400" b="0" i="0" u="none" strike="noStrike" kern="1200" cap="none" spc="0" normalizeH="0" baseline="0" noProof="0" smtClean="0">
+                <a:ln>
+                  <a:noFill/>
+                </a:ln>
+                <a:solidFill>
+                  <a:prstClr val="black"/>
+                </a:solidFill>
+                <a:effectLst/>
+                <a:uLnTx/>
+                <a:uFillTx/>
+                <a:latin typeface="Arial" panose="020B0604020202020204" pitchFamily="34" charset="0"/>
+                <a:cs typeface="Arial" panose="020B0604020202020204" pitchFamily="34" charset="0"/>
+                <a:sym typeface="Roboto"/>
+              </a:rPr>
+              <a:t>Fourth level</a:t>
+            </a:r>
+          </a:p>
+          <a:p>
+            <a:pPr marL="0" marR="0" lvl="4" indent="0" algn="l" defTabSz="914400" rtl="0" eaLnBrk="1" fontAlgn="auto" latinLnBrk="0" hangingPunct="1">
+              <a:lnSpc>
+                <a:spcPct val="90000"/>
+              </a:lnSpc>
+              <a:spcBef>
+                <a:spcPts val="1000"/>
+              </a:spcBef>
+              <a:spcAft>
+                <a:spcPts val="0"/>
+              </a:spcAft>
+              <a:buClrTx/>
+              <a:buSzTx/>
+              <a:buFont typeface="Arial" panose="020B0604020202020204" pitchFamily="34" charset="0"/>
+              <a:buNone/>
+              <a:tabLst/>
+              <a:defRPr/>
+            </a:pPr>
+            <a:r>
+              <a:rPr kumimoji="0" lang="en-US" sz="2400" b="0" i="0" u="none" strike="noStrike" kern="1200" cap="none" spc="0" normalizeH="0" baseline="0" noProof="0" smtClean="0">
+                <a:ln>
+                  <a:noFill/>
+                </a:ln>
+                <a:solidFill>
+                  <a:prstClr val="black"/>
+                </a:solidFill>
+                <a:effectLst/>
+                <a:uLnTx/>
+                <a:uFillTx/>
+                <a:latin typeface="Arial" panose="020B0604020202020204" pitchFamily="34" charset="0"/>
+                <a:cs typeface="Arial" panose="020B0604020202020204" pitchFamily="34" charset="0"/>
+                <a:sym typeface="Roboto"/>
+              </a:rPr>
+              <a:t>Fifth level</a:t>
+            </a:r>
+            <a:endParaRPr kumimoji="0" lang="en-GB" sz="1600" b="0" i="0" u="none" strike="noStrike" kern="1200" cap="none" spc="0" normalizeH="0" baseline="0" noProof="0" dirty="0" smtClean="0">
+              <a:ln>
+                <a:noFill/>
+              </a:ln>
+              <a:solidFill>
+                <a:prstClr val="black"/>
+              </a:solidFill>
+              <a:effectLst/>
+              <a:uLnTx/>
+              <a:uFillTx/>
+              <a:latin typeface="Arial" panose="020B0604020202020204" pitchFamily="34" charset="0"/>
+              <a:cs typeface="Arial" panose="020B0604020202020204" pitchFamily="34" charset="0"/>
+              <a:sym typeface="Roboto"/>
+            </a:endParaRPr>
           </a:p>
         </p:txBody>
       </p:sp>
@@ -3725,7 +3724,7 @@
     </p:spTree>
     <p:extLst>
       <p:ext uri="{BB962C8B-B14F-4D97-AF65-F5344CB8AC3E}">
-        <p14:creationId xmlns:p14="http://schemas.microsoft.com/office/powerpoint/2010/main" val="128447276"/>
+        <p14:creationId xmlns:p14="http://schemas.microsoft.com/office/powerpoint/2010/main" val="1657065642"/>
       </p:ext>
     </p:extLst>
   </p:cSld>
@@ -3863,42 +3862,92 @@
         <p:txBody>
           <a:bodyPr lIns="91425" tIns="91425" rIns="91425" bIns="91425" anchor="t" anchorCtr="0"/>
           <a:lstStyle>
-            <a:lvl1pPr lvl="0">
-              <a:spcBef>
-                <a:spcPts val="0"/>
-              </a:spcBef>
-              <a:buSzPct val="100000"/>
+            <a:lvl1pPr marL="0" marR="0" lvl="0" indent="0" algn="l" defTabSz="914400" rtl="0" eaLnBrk="1" fontAlgn="auto" latinLnBrk="0" hangingPunct="1">
+              <a:lnSpc>
+                <a:spcPct val="90000"/>
+              </a:lnSpc>
+              <a:spcBef>
+                <a:spcPts val="1000"/>
+              </a:spcBef>
+              <a:spcAft>
+                <a:spcPts val="0"/>
+              </a:spcAft>
+              <a:buClrTx/>
+              <a:buSzTx/>
+              <a:buFont typeface="Arial" panose="020B0604020202020204" pitchFamily="34" charset="0"/>
+              <a:buNone/>
+              <a:tabLst/>
               <a:defRPr sz="2000">
                 <a:latin typeface="Arial" panose="020B0604020202020204" pitchFamily="34" charset="0"/>
                 <a:cs typeface="Arial" panose="020B0604020202020204" pitchFamily="34" charset="0"/>
               </a:defRPr>
             </a:lvl1pPr>
-            <a:lvl2pPr lvl="1">
-              <a:spcBef>
-                <a:spcPts val="0"/>
-              </a:spcBef>
-              <a:buSzPct val="100000"/>
+            <a:lvl2pPr marL="685800" marR="0" lvl="1" indent="-228600" algn="l" defTabSz="914400" rtl="0" eaLnBrk="1" fontAlgn="auto" latinLnBrk="0" hangingPunct="1">
+              <a:lnSpc>
+                <a:spcPct val="90000"/>
+              </a:lnSpc>
+              <a:spcBef>
+                <a:spcPts val="500"/>
+              </a:spcBef>
+              <a:spcAft>
+                <a:spcPts val="0"/>
+              </a:spcAft>
+              <a:buClrTx/>
+              <a:buSzTx/>
+              <a:buFont typeface="Arial" panose="020B0604020202020204" pitchFamily="34" charset="0"/>
+              <a:buChar char="•"/>
+              <a:tabLst/>
               <a:defRPr sz="1600"/>
             </a:lvl2pPr>
-            <a:lvl3pPr lvl="2">
-              <a:spcBef>
-                <a:spcPts val="0"/>
-              </a:spcBef>
-              <a:buSzPct val="100000"/>
+            <a:lvl3pPr marL="1143000" marR="0" lvl="2" indent="-228600" algn="l" defTabSz="914400" rtl="0" eaLnBrk="1" fontAlgn="auto" latinLnBrk="0" hangingPunct="1">
+              <a:lnSpc>
+                <a:spcPct val="90000"/>
+              </a:lnSpc>
+              <a:spcBef>
+                <a:spcPts val="500"/>
+              </a:spcBef>
+              <a:spcAft>
+                <a:spcPts val="0"/>
+              </a:spcAft>
+              <a:buClrTx/>
+              <a:buSzTx/>
+              <a:buFont typeface="Arial" panose="020B0604020202020204" pitchFamily="34" charset="0"/>
+              <a:buChar char="•"/>
+              <a:tabLst/>
               <a:defRPr sz="1600"/>
             </a:lvl3pPr>
-            <a:lvl4pPr lvl="3">
-              <a:spcBef>
-                <a:spcPts val="0"/>
-              </a:spcBef>
-              <a:buSzPct val="100000"/>
+            <a:lvl4pPr marL="1600200" marR="0" lvl="3" indent="-228600" algn="l" defTabSz="914400" rtl="0" eaLnBrk="1" fontAlgn="auto" latinLnBrk="0" hangingPunct="1">
+              <a:lnSpc>
+                <a:spcPct val="90000"/>
+              </a:lnSpc>
+              <a:spcBef>
+                <a:spcPts val="500"/>
+              </a:spcBef>
+              <a:spcAft>
+                <a:spcPts val="0"/>
+              </a:spcAft>
+              <a:buClrTx/>
+              <a:buSzTx/>
+              <a:buFont typeface="Arial" panose="020B0604020202020204" pitchFamily="34" charset="0"/>
+              <a:buChar char="•"/>
+              <a:tabLst/>
               <a:defRPr sz="1600"/>
             </a:lvl4pPr>
-            <a:lvl5pPr lvl="4">
-              <a:spcBef>
-                <a:spcPts val="0"/>
-              </a:spcBef>
-              <a:buSzPct val="100000"/>
+            <a:lvl5pPr marL="2057400" marR="0" lvl="4" indent="-228600" algn="l" defTabSz="914400" rtl="0" eaLnBrk="1" fontAlgn="auto" latinLnBrk="0" hangingPunct="1">
+              <a:lnSpc>
+                <a:spcPct val="90000"/>
+              </a:lnSpc>
+              <a:spcBef>
+                <a:spcPts val="500"/>
+              </a:spcBef>
+              <a:spcAft>
+                <a:spcPts val="0"/>
+              </a:spcAft>
+              <a:buClrTx/>
+              <a:buSzTx/>
+              <a:buFont typeface="Arial" panose="020B0604020202020204" pitchFamily="34" charset="0"/>
+              <a:buChar char="•"/>
+              <a:tabLst/>
               <a:defRPr sz="1600"/>
             </a:lvl5pPr>
             <a:lvl6pPr lvl="5">
@@ -3931,11 +3980,198 @@
             </a:lvl9pPr>
           </a:lstStyle>
           <a:p>
-            <a:pPr lvl="0"/>
-            <a:r>
-              <a:rPr lang="en-US" smtClean="0"/>
+            <a:pPr marL="0" marR="0" lvl="0" indent="0" algn="l" defTabSz="914400" rtl="0" eaLnBrk="1" fontAlgn="auto" latinLnBrk="0" hangingPunct="1">
+              <a:lnSpc>
+                <a:spcPct val="90000"/>
+              </a:lnSpc>
+              <a:spcBef>
+                <a:spcPts val="1000"/>
+              </a:spcBef>
+              <a:spcAft>
+                <a:spcPts val="0"/>
+              </a:spcAft>
+              <a:buClrTx/>
+              <a:buSzTx/>
+              <a:buFont typeface="Arial" panose="020B0604020202020204" pitchFamily="34" charset="0"/>
+              <a:buNone/>
+              <a:tabLst/>
+              <a:defRPr/>
+            </a:pPr>
+            <a:r>
+              <a:rPr kumimoji="0" lang="en-US" sz="2400" b="0" i="0" u="none" strike="noStrike" kern="1200" cap="none" spc="0" normalizeH="0" baseline="0" noProof="0" smtClean="0">
+                <a:ln>
+                  <a:noFill/>
+                </a:ln>
+                <a:solidFill>
+                  <a:prstClr val="black"/>
+                </a:solidFill>
+                <a:effectLst/>
+                <a:uLnTx/>
+                <a:uFillTx/>
+                <a:latin typeface="Arial" panose="020B0604020202020204" pitchFamily="34" charset="0"/>
+                <a:cs typeface="Arial" panose="020B0604020202020204" pitchFamily="34" charset="0"/>
+                <a:sym typeface="Roboto"/>
+              </a:rPr>
               <a:t>Edit Master text styles</a:t>
             </a:r>
+          </a:p>
+          <a:p>
+            <a:pPr marL="0" marR="0" lvl="1" indent="0" algn="l" defTabSz="914400" rtl="0" eaLnBrk="1" fontAlgn="auto" latinLnBrk="0" hangingPunct="1">
+              <a:lnSpc>
+                <a:spcPct val="90000"/>
+              </a:lnSpc>
+              <a:spcBef>
+                <a:spcPts val="1000"/>
+              </a:spcBef>
+              <a:spcAft>
+                <a:spcPts val="0"/>
+              </a:spcAft>
+              <a:buClrTx/>
+              <a:buSzTx/>
+              <a:buFont typeface="Arial" panose="020B0604020202020204" pitchFamily="34" charset="0"/>
+              <a:buNone/>
+              <a:tabLst/>
+              <a:defRPr/>
+            </a:pPr>
+            <a:r>
+              <a:rPr kumimoji="0" lang="en-US" sz="2400" b="0" i="0" u="none" strike="noStrike" kern="1200" cap="none" spc="0" normalizeH="0" baseline="0" noProof="0" smtClean="0">
+                <a:ln>
+                  <a:noFill/>
+                </a:ln>
+                <a:solidFill>
+                  <a:prstClr val="black"/>
+                </a:solidFill>
+                <a:effectLst/>
+                <a:uLnTx/>
+                <a:uFillTx/>
+                <a:latin typeface="Arial" panose="020B0604020202020204" pitchFamily="34" charset="0"/>
+                <a:cs typeface="Arial" panose="020B0604020202020204" pitchFamily="34" charset="0"/>
+                <a:sym typeface="Roboto"/>
+              </a:rPr>
+              <a:t>Second level</a:t>
+            </a:r>
+          </a:p>
+          <a:p>
+            <a:pPr marL="0" marR="0" lvl="2" indent="0" algn="l" defTabSz="914400" rtl="0" eaLnBrk="1" fontAlgn="auto" latinLnBrk="0" hangingPunct="1">
+              <a:lnSpc>
+                <a:spcPct val="90000"/>
+              </a:lnSpc>
+              <a:spcBef>
+                <a:spcPts val="1000"/>
+              </a:spcBef>
+              <a:spcAft>
+                <a:spcPts val="0"/>
+              </a:spcAft>
+              <a:buClrTx/>
+              <a:buSzTx/>
+              <a:buFont typeface="Arial" panose="020B0604020202020204" pitchFamily="34" charset="0"/>
+              <a:buNone/>
+              <a:tabLst/>
+              <a:defRPr/>
+            </a:pPr>
+            <a:r>
+              <a:rPr kumimoji="0" lang="en-US" sz="2400" b="0" i="0" u="none" strike="noStrike" kern="1200" cap="none" spc="0" normalizeH="0" baseline="0" noProof="0" smtClean="0">
+                <a:ln>
+                  <a:noFill/>
+                </a:ln>
+                <a:solidFill>
+                  <a:prstClr val="black"/>
+                </a:solidFill>
+                <a:effectLst/>
+                <a:uLnTx/>
+                <a:uFillTx/>
+                <a:latin typeface="Arial" panose="020B0604020202020204" pitchFamily="34" charset="0"/>
+                <a:cs typeface="Arial" panose="020B0604020202020204" pitchFamily="34" charset="0"/>
+                <a:sym typeface="Roboto"/>
+              </a:rPr>
+              <a:t>Third level</a:t>
+            </a:r>
+          </a:p>
+          <a:p>
+            <a:pPr marL="0" marR="0" lvl="3" indent="0" algn="l" defTabSz="914400" rtl="0" eaLnBrk="1" fontAlgn="auto" latinLnBrk="0" hangingPunct="1">
+              <a:lnSpc>
+                <a:spcPct val="90000"/>
+              </a:lnSpc>
+              <a:spcBef>
+                <a:spcPts val="1000"/>
+              </a:spcBef>
+              <a:spcAft>
+                <a:spcPts val="0"/>
+              </a:spcAft>
+              <a:buClrTx/>
+              <a:buSzTx/>
+              <a:buFont typeface="Arial" panose="020B0604020202020204" pitchFamily="34" charset="0"/>
+              <a:buNone/>
+              <a:tabLst/>
+              <a:defRPr/>
+            </a:pPr>
+            <a:r>
+              <a:rPr kumimoji="0" lang="en-US" sz="2400" b="0" i="0" u="none" strike="noStrike" kern="1200" cap="none" spc="0" normalizeH="0" baseline="0" noProof="0" smtClean="0">
+                <a:ln>
+                  <a:noFill/>
+                </a:ln>
+                <a:solidFill>
+                  <a:prstClr val="black"/>
+                </a:solidFill>
+                <a:effectLst/>
+                <a:uLnTx/>
+                <a:uFillTx/>
+                <a:latin typeface="Arial" panose="020B0604020202020204" pitchFamily="34" charset="0"/>
+                <a:cs typeface="Arial" panose="020B0604020202020204" pitchFamily="34" charset="0"/>
+                <a:sym typeface="Roboto"/>
+              </a:rPr>
+              <a:t>Fourth level</a:t>
+            </a:r>
+          </a:p>
+          <a:p>
+            <a:pPr marL="0" marR="0" lvl="4" indent="0" algn="l" defTabSz="914400" rtl="0" eaLnBrk="1" fontAlgn="auto" latinLnBrk="0" hangingPunct="1">
+              <a:lnSpc>
+                <a:spcPct val="90000"/>
+              </a:lnSpc>
+              <a:spcBef>
+                <a:spcPts val="1000"/>
+              </a:spcBef>
+              <a:spcAft>
+                <a:spcPts val="0"/>
+              </a:spcAft>
+              <a:buClrTx/>
+              <a:buSzTx/>
+              <a:buFont typeface="Arial" panose="020B0604020202020204" pitchFamily="34" charset="0"/>
+              <a:buNone/>
+              <a:tabLst/>
+              <a:defRPr/>
+            </a:pPr>
+            <a:r>
+              <a:rPr kumimoji="0" lang="en-US" sz="2400" b="0" i="0" u="none" strike="noStrike" kern="1200" cap="none" spc="0" normalizeH="0" baseline="0" noProof="0" smtClean="0">
+                <a:ln>
+                  <a:noFill/>
+                </a:ln>
+                <a:solidFill>
+                  <a:prstClr val="black"/>
+                </a:solidFill>
+                <a:effectLst/>
+                <a:uLnTx/>
+                <a:uFillTx/>
+                <a:latin typeface="Arial" panose="020B0604020202020204" pitchFamily="34" charset="0"/>
+                <a:cs typeface="Arial" panose="020B0604020202020204" pitchFamily="34" charset="0"/>
+                <a:sym typeface="Roboto"/>
+              </a:rPr>
+              <a:t>Fifth level</a:t>
+            </a:r>
+            <a:endParaRPr kumimoji="0" lang="en-GB" sz="1600" b="0" i="0" u="none" strike="noStrike" kern="1200" cap="none" spc="0" normalizeH="0" baseline="0" noProof="0" dirty="0" smtClean="0">
+              <a:ln>
+                <a:noFill/>
+              </a:ln>
+              <a:solidFill>
+                <a:prstClr val="black"/>
+              </a:solidFill>
+              <a:effectLst/>
+              <a:uLnTx/>
+              <a:uFillTx/>
+              <a:latin typeface="Arial" panose="020B0604020202020204" pitchFamily="34" charset="0"/>
+              <a:cs typeface="Arial" panose="020B0604020202020204" pitchFamily="34" charset="0"/>
+              <a:sym typeface="Roboto"/>
+            </a:endParaRPr>
           </a:p>
         </p:txBody>
       </p:sp>
@@ -3961,42 +4197,92 @@
         <p:txBody>
           <a:bodyPr lIns="91425" tIns="91425" rIns="91425" bIns="91425" anchor="t" anchorCtr="0"/>
           <a:lstStyle>
-            <a:lvl1pPr lvl="0">
-              <a:spcBef>
-                <a:spcPts val="0"/>
-              </a:spcBef>
-              <a:buSzPct val="100000"/>
+            <a:lvl1pPr marL="0" marR="0" lvl="0" indent="0" algn="l" defTabSz="914400" rtl="0" eaLnBrk="1" fontAlgn="auto" latinLnBrk="0" hangingPunct="1">
+              <a:lnSpc>
+                <a:spcPct val="90000"/>
+              </a:lnSpc>
+              <a:spcBef>
+                <a:spcPts val="1000"/>
+              </a:spcBef>
+              <a:spcAft>
+                <a:spcPts val="0"/>
+              </a:spcAft>
+              <a:buClrTx/>
+              <a:buSzTx/>
+              <a:buFont typeface="Arial" panose="020B0604020202020204" pitchFamily="34" charset="0"/>
+              <a:buNone/>
+              <a:tabLst/>
               <a:defRPr sz="2000">
                 <a:latin typeface="Arial" panose="020B0604020202020204" pitchFamily="34" charset="0"/>
                 <a:cs typeface="Arial" panose="020B0604020202020204" pitchFamily="34" charset="0"/>
               </a:defRPr>
             </a:lvl1pPr>
-            <a:lvl2pPr lvl="1">
-              <a:spcBef>
-                <a:spcPts val="0"/>
-              </a:spcBef>
-              <a:buSzPct val="100000"/>
+            <a:lvl2pPr marL="685800" marR="0" lvl="1" indent="-228600" algn="l" defTabSz="914400" rtl="0" eaLnBrk="1" fontAlgn="auto" latinLnBrk="0" hangingPunct="1">
+              <a:lnSpc>
+                <a:spcPct val="90000"/>
+              </a:lnSpc>
+              <a:spcBef>
+                <a:spcPts val="500"/>
+              </a:spcBef>
+              <a:spcAft>
+                <a:spcPts val="0"/>
+              </a:spcAft>
+              <a:buClrTx/>
+              <a:buSzTx/>
+              <a:buFont typeface="Arial" panose="020B0604020202020204" pitchFamily="34" charset="0"/>
+              <a:buChar char="•"/>
+              <a:tabLst/>
               <a:defRPr sz="1600"/>
             </a:lvl2pPr>
-            <a:lvl3pPr lvl="2">
-              <a:spcBef>
-                <a:spcPts val="0"/>
-              </a:spcBef>
-              <a:buSzPct val="100000"/>
+            <a:lvl3pPr marL="1143000" marR="0" lvl="2" indent="-228600" algn="l" defTabSz="914400" rtl="0" eaLnBrk="1" fontAlgn="auto" latinLnBrk="0" hangingPunct="1">
+              <a:lnSpc>
+                <a:spcPct val="90000"/>
+              </a:lnSpc>
+              <a:spcBef>
+                <a:spcPts val="500"/>
+              </a:spcBef>
+              <a:spcAft>
+                <a:spcPts val="0"/>
+              </a:spcAft>
+              <a:buClrTx/>
+              <a:buSzTx/>
+              <a:buFont typeface="Arial" panose="020B0604020202020204" pitchFamily="34" charset="0"/>
+              <a:buChar char="•"/>
+              <a:tabLst/>
               <a:defRPr sz="1600"/>
             </a:lvl3pPr>
-            <a:lvl4pPr lvl="3">
-              <a:spcBef>
-                <a:spcPts val="0"/>
-              </a:spcBef>
-              <a:buSzPct val="100000"/>
+            <a:lvl4pPr marL="1600200" marR="0" lvl="3" indent="-228600" algn="l" defTabSz="914400" rtl="0" eaLnBrk="1" fontAlgn="auto" latinLnBrk="0" hangingPunct="1">
+              <a:lnSpc>
+                <a:spcPct val="90000"/>
+              </a:lnSpc>
+              <a:spcBef>
+                <a:spcPts val="500"/>
+              </a:spcBef>
+              <a:spcAft>
+                <a:spcPts val="0"/>
+              </a:spcAft>
+              <a:buClrTx/>
+              <a:buSzTx/>
+              <a:buFont typeface="Arial" panose="020B0604020202020204" pitchFamily="34" charset="0"/>
+              <a:buChar char="•"/>
+              <a:tabLst/>
               <a:defRPr sz="1600"/>
             </a:lvl4pPr>
-            <a:lvl5pPr lvl="4">
-              <a:spcBef>
-                <a:spcPts val="0"/>
-              </a:spcBef>
-              <a:buSzPct val="100000"/>
+            <a:lvl5pPr marL="2057400" marR="0" lvl="4" indent="-228600" algn="l" defTabSz="914400" rtl="0" eaLnBrk="1" fontAlgn="auto" latinLnBrk="0" hangingPunct="1">
+              <a:lnSpc>
+                <a:spcPct val="90000"/>
+              </a:lnSpc>
+              <a:spcBef>
+                <a:spcPts val="500"/>
+              </a:spcBef>
+              <a:spcAft>
+                <a:spcPts val="0"/>
+              </a:spcAft>
+              <a:buClrTx/>
+              <a:buSzTx/>
+              <a:buFont typeface="Arial" panose="020B0604020202020204" pitchFamily="34" charset="0"/>
+              <a:buChar char="•"/>
+              <a:tabLst/>
               <a:defRPr sz="1600"/>
             </a:lvl5pPr>
             <a:lvl6pPr lvl="5">
@@ -4029,18 +4315,205 @@
             </a:lvl9pPr>
           </a:lstStyle>
           <a:p>
-            <a:pPr lvl="0"/>
-            <a:r>
-              <a:rPr lang="en-US" smtClean="0"/>
+            <a:pPr marL="0" marR="0" lvl="0" indent="0" algn="l" defTabSz="914400" rtl="0" eaLnBrk="1" fontAlgn="auto" latinLnBrk="0" hangingPunct="1">
+              <a:lnSpc>
+                <a:spcPct val="90000"/>
+              </a:lnSpc>
+              <a:spcBef>
+                <a:spcPts val="1000"/>
+              </a:spcBef>
+              <a:spcAft>
+                <a:spcPts val="0"/>
+              </a:spcAft>
+              <a:buClrTx/>
+              <a:buSzTx/>
+              <a:buFont typeface="Arial" panose="020B0604020202020204" pitchFamily="34" charset="0"/>
+              <a:buNone/>
+              <a:tabLst/>
+              <a:defRPr/>
+            </a:pPr>
+            <a:r>
+              <a:rPr kumimoji="0" lang="en-US" sz="2400" b="0" i="0" u="none" strike="noStrike" kern="1200" cap="none" spc="0" normalizeH="0" baseline="0" noProof="0" smtClean="0">
+                <a:ln>
+                  <a:noFill/>
+                </a:ln>
+                <a:solidFill>
+                  <a:prstClr val="black"/>
+                </a:solidFill>
+                <a:effectLst/>
+                <a:uLnTx/>
+                <a:uFillTx/>
+                <a:latin typeface="Arial" panose="020B0604020202020204" pitchFamily="34" charset="0"/>
+                <a:cs typeface="Arial" panose="020B0604020202020204" pitchFamily="34" charset="0"/>
+                <a:sym typeface="Roboto"/>
+              </a:rPr>
               <a:t>Edit Master text styles</a:t>
             </a:r>
+          </a:p>
+          <a:p>
+            <a:pPr marL="0" marR="0" lvl="1" indent="0" algn="l" defTabSz="914400" rtl="0" eaLnBrk="1" fontAlgn="auto" latinLnBrk="0" hangingPunct="1">
+              <a:lnSpc>
+                <a:spcPct val="90000"/>
+              </a:lnSpc>
+              <a:spcBef>
+                <a:spcPts val="1000"/>
+              </a:spcBef>
+              <a:spcAft>
+                <a:spcPts val="0"/>
+              </a:spcAft>
+              <a:buClrTx/>
+              <a:buSzTx/>
+              <a:buFont typeface="Arial" panose="020B0604020202020204" pitchFamily="34" charset="0"/>
+              <a:buNone/>
+              <a:tabLst/>
+              <a:defRPr/>
+            </a:pPr>
+            <a:r>
+              <a:rPr kumimoji="0" lang="en-US" sz="2400" b="0" i="0" u="none" strike="noStrike" kern="1200" cap="none" spc="0" normalizeH="0" baseline="0" noProof="0" smtClean="0">
+                <a:ln>
+                  <a:noFill/>
+                </a:ln>
+                <a:solidFill>
+                  <a:prstClr val="black"/>
+                </a:solidFill>
+                <a:effectLst/>
+                <a:uLnTx/>
+                <a:uFillTx/>
+                <a:latin typeface="Arial" panose="020B0604020202020204" pitchFamily="34" charset="0"/>
+                <a:cs typeface="Arial" panose="020B0604020202020204" pitchFamily="34" charset="0"/>
+                <a:sym typeface="Roboto"/>
+              </a:rPr>
+              <a:t>Second level</a:t>
+            </a:r>
+          </a:p>
+          <a:p>
+            <a:pPr marL="0" marR="0" lvl="2" indent="0" algn="l" defTabSz="914400" rtl="0" eaLnBrk="1" fontAlgn="auto" latinLnBrk="0" hangingPunct="1">
+              <a:lnSpc>
+                <a:spcPct val="90000"/>
+              </a:lnSpc>
+              <a:spcBef>
+                <a:spcPts val="1000"/>
+              </a:spcBef>
+              <a:spcAft>
+                <a:spcPts val="0"/>
+              </a:spcAft>
+              <a:buClrTx/>
+              <a:buSzTx/>
+              <a:buFont typeface="Arial" panose="020B0604020202020204" pitchFamily="34" charset="0"/>
+              <a:buNone/>
+              <a:tabLst/>
+              <a:defRPr/>
+            </a:pPr>
+            <a:r>
+              <a:rPr kumimoji="0" lang="en-US" sz="2400" b="0" i="0" u="none" strike="noStrike" kern="1200" cap="none" spc="0" normalizeH="0" baseline="0" noProof="0" smtClean="0">
+                <a:ln>
+                  <a:noFill/>
+                </a:ln>
+                <a:solidFill>
+                  <a:prstClr val="black"/>
+                </a:solidFill>
+                <a:effectLst/>
+                <a:uLnTx/>
+                <a:uFillTx/>
+                <a:latin typeface="Arial" panose="020B0604020202020204" pitchFamily="34" charset="0"/>
+                <a:cs typeface="Arial" panose="020B0604020202020204" pitchFamily="34" charset="0"/>
+                <a:sym typeface="Roboto"/>
+              </a:rPr>
+              <a:t>Third level</a:t>
+            </a:r>
+          </a:p>
+          <a:p>
+            <a:pPr marL="0" marR="0" lvl="3" indent="0" algn="l" defTabSz="914400" rtl="0" eaLnBrk="1" fontAlgn="auto" latinLnBrk="0" hangingPunct="1">
+              <a:lnSpc>
+                <a:spcPct val="90000"/>
+              </a:lnSpc>
+              <a:spcBef>
+                <a:spcPts val="1000"/>
+              </a:spcBef>
+              <a:spcAft>
+                <a:spcPts val="0"/>
+              </a:spcAft>
+              <a:buClrTx/>
+              <a:buSzTx/>
+              <a:buFont typeface="Arial" panose="020B0604020202020204" pitchFamily="34" charset="0"/>
+              <a:buNone/>
+              <a:tabLst/>
+              <a:defRPr/>
+            </a:pPr>
+            <a:r>
+              <a:rPr kumimoji="0" lang="en-US" sz="2400" b="0" i="0" u="none" strike="noStrike" kern="1200" cap="none" spc="0" normalizeH="0" baseline="0" noProof="0" smtClean="0">
+                <a:ln>
+                  <a:noFill/>
+                </a:ln>
+                <a:solidFill>
+                  <a:prstClr val="black"/>
+                </a:solidFill>
+                <a:effectLst/>
+                <a:uLnTx/>
+                <a:uFillTx/>
+                <a:latin typeface="Arial" panose="020B0604020202020204" pitchFamily="34" charset="0"/>
+                <a:cs typeface="Arial" panose="020B0604020202020204" pitchFamily="34" charset="0"/>
+                <a:sym typeface="Roboto"/>
+              </a:rPr>
+              <a:t>Fourth level</a:t>
+            </a:r>
+          </a:p>
+          <a:p>
+            <a:pPr marL="0" marR="0" lvl="4" indent="0" algn="l" defTabSz="914400" rtl="0" eaLnBrk="1" fontAlgn="auto" latinLnBrk="0" hangingPunct="1">
+              <a:lnSpc>
+                <a:spcPct val="90000"/>
+              </a:lnSpc>
+              <a:spcBef>
+                <a:spcPts val="1000"/>
+              </a:spcBef>
+              <a:spcAft>
+                <a:spcPts val="0"/>
+              </a:spcAft>
+              <a:buClrTx/>
+              <a:buSzTx/>
+              <a:buFont typeface="Arial" panose="020B0604020202020204" pitchFamily="34" charset="0"/>
+              <a:buNone/>
+              <a:tabLst/>
+              <a:defRPr/>
+            </a:pPr>
+            <a:r>
+              <a:rPr kumimoji="0" lang="en-US" sz="2400" b="0" i="0" u="none" strike="noStrike" kern="1200" cap="none" spc="0" normalizeH="0" baseline="0" noProof="0" smtClean="0">
+                <a:ln>
+                  <a:noFill/>
+                </a:ln>
+                <a:solidFill>
+                  <a:prstClr val="black"/>
+                </a:solidFill>
+                <a:effectLst/>
+                <a:uLnTx/>
+                <a:uFillTx/>
+                <a:latin typeface="Arial" panose="020B0604020202020204" pitchFamily="34" charset="0"/>
+                <a:cs typeface="Arial" panose="020B0604020202020204" pitchFamily="34" charset="0"/>
+                <a:sym typeface="Roboto"/>
+              </a:rPr>
+              <a:t>Fifth level</a:t>
+            </a:r>
+            <a:endParaRPr kumimoji="0" lang="en-GB" sz="1600" b="0" i="0" u="none" strike="noStrike" kern="1200" cap="none" spc="0" normalizeH="0" baseline="0" noProof="0" dirty="0" smtClean="0">
+              <a:ln>
+                <a:noFill/>
+              </a:ln>
+              <a:solidFill>
+                <a:prstClr val="black"/>
+              </a:solidFill>
+              <a:effectLst/>
+              <a:uLnTx/>
+              <a:uFillTx/>
+              <a:latin typeface="Arial" panose="020B0604020202020204" pitchFamily="34" charset="0"/>
+              <a:cs typeface="Arial" panose="020B0604020202020204" pitchFamily="34" charset="0"/>
+              <a:sym typeface="Roboto"/>
+            </a:endParaRPr>
           </a:p>
         </p:txBody>
       </p:sp>
     </p:spTree>
     <p:extLst>
       <p:ext uri="{BB962C8B-B14F-4D97-AF65-F5344CB8AC3E}">
-        <p14:creationId xmlns:p14="http://schemas.microsoft.com/office/powerpoint/2010/main" val="2811685651"/>
+        <p14:creationId xmlns:p14="http://schemas.microsoft.com/office/powerpoint/2010/main" val="2477550579"/>
       </p:ext>
     </p:extLst>
   </p:cSld>
@@ -4156,7 +4629,7 @@
     </p:spTree>
     <p:extLst>
       <p:ext uri="{BB962C8B-B14F-4D97-AF65-F5344CB8AC3E}">
-        <p14:creationId xmlns:p14="http://schemas.microsoft.com/office/powerpoint/2010/main" val="552997928"/>
+        <p14:creationId xmlns:p14="http://schemas.microsoft.com/office/powerpoint/2010/main" val="3757979491"/>
       </p:ext>
     </p:extLst>
   </p:cSld>
@@ -4322,42 +4795,92 @@
         <p:txBody>
           <a:bodyPr lIns="91425" tIns="91425" rIns="91425" bIns="91425" anchor="t" anchorCtr="0"/>
           <a:lstStyle>
-            <a:lvl1pPr lvl="0">
-              <a:spcBef>
-                <a:spcPts val="0"/>
-              </a:spcBef>
-              <a:buSzPct val="100000"/>
+            <a:lvl1pPr marL="0" marR="0" lvl="0" indent="0" algn="l" defTabSz="914400" rtl="0" eaLnBrk="1" fontAlgn="auto" latinLnBrk="0" hangingPunct="1">
+              <a:lnSpc>
+                <a:spcPct val="90000"/>
+              </a:lnSpc>
+              <a:spcBef>
+                <a:spcPts val="1000"/>
+              </a:spcBef>
+              <a:spcAft>
+                <a:spcPts val="0"/>
+              </a:spcAft>
+              <a:buClrTx/>
+              <a:buSzTx/>
+              <a:buFont typeface="Arial" panose="020B0604020202020204" pitchFamily="34" charset="0"/>
+              <a:buNone/>
+              <a:tabLst/>
               <a:defRPr sz="2000">
                 <a:latin typeface="Arial" panose="020B0604020202020204" pitchFamily="34" charset="0"/>
                 <a:cs typeface="Arial" panose="020B0604020202020204" pitchFamily="34" charset="0"/>
               </a:defRPr>
             </a:lvl1pPr>
-            <a:lvl2pPr lvl="1">
-              <a:spcBef>
-                <a:spcPts val="0"/>
-              </a:spcBef>
-              <a:buSzPct val="100000"/>
+            <a:lvl2pPr marL="685800" marR="0" lvl="1" indent="-228600" algn="l" defTabSz="914400" rtl="0" eaLnBrk="1" fontAlgn="auto" latinLnBrk="0" hangingPunct="1">
+              <a:lnSpc>
+                <a:spcPct val="90000"/>
+              </a:lnSpc>
+              <a:spcBef>
+                <a:spcPts val="500"/>
+              </a:spcBef>
+              <a:spcAft>
+                <a:spcPts val="0"/>
+              </a:spcAft>
+              <a:buClrTx/>
+              <a:buSzTx/>
+              <a:buFont typeface="Arial" panose="020B0604020202020204" pitchFamily="34" charset="0"/>
+              <a:buChar char="•"/>
+              <a:tabLst/>
               <a:defRPr sz="1600"/>
             </a:lvl2pPr>
-            <a:lvl3pPr lvl="2">
-              <a:spcBef>
-                <a:spcPts val="0"/>
-              </a:spcBef>
-              <a:buSzPct val="100000"/>
+            <a:lvl3pPr marL="1143000" marR="0" lvl="2" indent="-228600" algn="l" defTabSz="914400" rtl="0" eaLnBrk="1" fontAlgn="auto" latinLnBrk="0" hangingPunct="1">
+              <a:lnSpc>
+                <a:spcPct val="90000"/>
+              </a:lnSpc>
+              <a:spcBef>
+                <a:spcPts val="500"/>
+              </a:spcBef>
+              <a:spcAft>
+                <a:spcPts val="0"/>
+              </a:spcAft>
+              <a:buClrTx/>
+              <a:buSzTx/>
+              <a:buFont typeface="Arial" panose="020B0604020202020204" pitchFamily="34" charset="0"/>
+              <a:buChar char="•"/>
+              <a:tabLst/>
               <a:defRPr sz="1600"/>
             </a:lvl3pPr>
-            <a:lvl4pPr lvl="3">
-              <a:spcBef>
-                <a:spcPts val="0"/>
-              </a:spcBef>
-              <a:buSzPct val="100000"/>
+            <a:lvl4pPr marL="1600200" marR="0" lvl="3" indent="-228600" algn="l" defTabSz="914400" rtl="0" eaLnBrk="1" fontAlgn="auto" latinLnBrk="0" hangingPunct="1">
+              <a:lnSpc>
+                <a:spcPct val="90000"/>
+              </a:lnSpc>
+              <a:spcBef>
+                <a:spcPts val="500"/>
+              </a:spcBef>
+              <a:spcAft>
+                <a:spcPts val="0"/>
+              </a:spcAft>
+              <a:buClrTx/>
+              <a:buSzTx/>
+              <a:buFont typeface="Arial" panose="020B0604020202020204" pitchFamily="34" charset="0"/>
+              <a:buChar char="•"/>
+              <a:tabLst/>
               <a:defRPr sz="1600"/>
             </a:lvl4pPr>
-            <a:lvl5pPr lvl="4">
-              <a:spcBef>
-                <a:spcPts val="0"/>
-              </a:spcBef>
-              <a:buSzPct val="100000"/>
+            <a:lvl5pPr marL="2057400" marR="0" lvl="4" indent="-228600" algn="l" defTabSz="914400" rtl="0" eaLnBrk="1" fontAlgn="auto" latinLnBrk="0" hangingPunct="1">
+              <a:lnSpc>
+                <a:spcPct val="90000"/>
+              </a:lnSpc>
+              <a:spcBef>
+                <a:spcPts val="500"/>
+              </a:spcBef>
+              <a:spcAft>
+                <a:spcPts val="0"/>
+              </a:spcAft>
+              <a:buClrTx/>
+              <a:buSzTx/>
+              <a:buFont typeface="Arial" panose="020B0604020202020204" pitchFamily="34" charset="0"/>
+              <a:buChar char="•"/>
+              <a:tabLst/>
               <a:defRPr sz="1600"/>
             </a:lvl5pPr>
             <a:lvl6pPr lvl="5">
@@ -4390,18 +4913,205 @@
             </a:lvl9pPr>
           </a:lstStyle>
           <a:p>
-            <a:pPr lvl="0"/>
-            <a:r>
-              <a:rPr lang="en-US" smtClean="0"/>
+            <a:pPr marL="0" marR="0" lvl="0" indent="0" algn="l" defTabSz="914400" rtl="0" eaLnBrk="1" fontAlgn="auto" latinLnBrk="0" hangingPunct="1">
+              <a:lnSpc>
+                <a:spcPct val="90000"/>
+              </a:lnSpc>
+              <a:spcBef>
+                <a:spcPts val="1000"/>
+              </a:spcBef>
+              <a:spcAft>
+                <a:spcPts val="0"/>
+              </a:spcAft>
+              <a:buClrTx/>
+              <a:buSzTx/>
+              <a:buFont typeface="Arial" panose="020B0604020202020204" pitchFamily="34" charset="0"/>
+              <a:buNone/>
+              <a:tabLst/>
+              <a:defRPr/>
+            </a:pPr>
+            <a:r>
+              <a:rPr kumimoji="0" lang="en-US" sz="2400" b="0" i="0" u="none" strike="noStrike" kern="1200" cap="none" spc="0" normalizeH="0" baseline="0" noProof="0" smtClean="0">
+                <a:ln>
+                  <a:noFill/>
+                </a:ln>
+                <a:solidFill>
+                  <a:prstClr val="black"/>
+                </a:solidFill>
+                <a:effectLst/>
+                <a:uLnTx/>
+                <a:uFillTx/>
+                <a:latin typeface="Arial" panose="020B0604020202020204" pitchFamily="34" charset="0"/>
+                <a:cs typeface="Arial" panose="020B0604020202020204" pitchFamily="34" charset="0"/>
+                <a:sym typeface="Roboto"/>
+              </a:rPr>
               <a:t>Edit Master text styles</a:t>
             </a:r>
+          </a:p>
+          <a:p>
+            <a:pPr marL="0" marR="0" lvl="1" indent="0" algn="l" defTabSz="914400" rtl="0" eaLnBrk="1" fontAlgn="auto" latinLnBrk="0" hangingPunct="1">
+              <a:lnSpc>
+                <a:spcPct val="90000"/>
+              </a:lnSpc>
+              <a:spcBef>
+                <a:spcPts val="1000"/>
+              </a:spcBef>
+              <a:spcAft>
+                <a:spcPts val="0"/>
+              </a:spcAft>
+              <a:buClrTx/>
+              <a:buSzTx/>
+              <a:buFont typeface="Arial" panose="020B0604020202020204" pitchFamily="34" charset="0"/>
+              <a:buNone/>
+              <a:tabLst/>
+              <a:defRPr/>
+            </a:pPr>
+            <a:r>
+              <a:rPr kumimoji="0" lang="en-US" sz="2400" b="0" i="0" u="none" strike="noStrike" kern="1200" cap="none" spc="0" normalizeH="0" baseline="0" noProof="0" smtClean="0">
+                <a:ln>
+                  <a:noFill/>
+                </a:ln>
+                <a:solidFill>
+                  <a:prstClr val="black"/>
+                </a:solidFill>
+                <a:effectLst/>
+                <a:uLnTx/>
+                <a:uFillTx/>
+                <a:latin typeface="Arial" panose="020B0604020202020204" pitchFamily="34" charset="0"/>
+                <a:cs typeface="Arial" panose="020B0604020202020204" pitchFamily="34" charset="0"/>
+                <a:sym typeface="Roboto"/>
+              </a:rPr>
+              <a:t>Second level</a:t>
+            </a:r>
+          </a:p>
+          <a:p>
+            <a:pPr marL="0" marR="0" lvl="2" indent="0" algn="l" defTabSz="914400" rtl="0" eaLnBrk="1" fontAlgn="auto" latinLnBrk="0" hangingPunct="1">
+              <a:lnSpc>
+                <a:spcPct val="90000"/>
+              </a:lnSpc>
+              <a:spcBef>
+                <a:spcPts val="1000"/>
+              </a:spcBef>
+              <a:spcAft>
+                <a:spcPts val="0"/>
+              </a:spcAft>
+              <a:buClrTx/>
+              <a:buSzTx/>
+              <a:buFont typeface="Arial" panose="020B0604020202020204" pitchFamily="34" charset="0"/>
+              <a:buNone/>
+              <a:tabLst/>
+              <a:defRPr/>
+            </a:pPr>
+            <a:r>
+              <a:rPr kumimoji="0" lang="en-US" sz="2400" b="0" i="0" u="none" strike="noStrike" kern="1200" cap="none" spc="0" normalizeH="0" baseline="0" noProof="0" smtClean="0">
+                <a:ln>
+                  <a:noFill/>
+                </a:ln>
+                <a:solidFill>
+                  <a:prstClr val="black"/>
+                </a:solidFill>
+                <a:effectLst/>
+                <a:uLnTx/>
+                <a:uFillTx/>
+                <a:latin typeface="Arial" panose="020B0604020202020204" pitchFamily="34" charset="0"/>
+                <a:cs typeface="Arial" panose="020B0604020202020204" pitchFamily="34" charset="0"/>
+                <a:sym typeface="Roboto"/>
+              </a:rPr>
+              <a:t>Third level</a:t>
+            </a:r>
+          </a:p>
+          <a:p>
+            <a:pPr marL="0" marR="0" lvl="3" indent="0" algn="l" defTabSz="914400" rtl="0" eaLnBrk="1" fontAlgn="auto" latinLnBrk="0" hangingPunct="1">
+              <a:lnSpc>
+                <a:spcPct val="90000"/>
+              </a:lnSpc>
+              <a:spcBef>
+                <a:spcPts val="1000"/>
+              </a:spcBef>
+              <a:spcAft>
+                <a:spcPts val="0"/>
+              </a:spcAft>
+              <a:buClrTx/>
+              <a:buSzTx/>
+              <a:buFont typeface="Arial" panose="020B0604020202020204" pitchFamily="34" charset="0"/>
+              <a:buNone/>
+              <a:tabLst/>
+              <a:defRPr/>
+            </a:pPr>
+            <a:r>
+              <a:rPr kumimoji="0" lang="en-US" sz="2400" b="0" i="0" u="none" strike="noStrike" kern="1200" cap="none" spc="0" normalizeH="0" baseline="0" noProof="0" smtClean="0">
+                <a:ln>
+                  <a:noFill/>
+                </a:ln>
+                <a:solidFill>
+                  <a:prstClr val="black"/>
+                </a:solidFill>
+                <a:effectLst/>
+                <a:uLnTx/>
+                <a:uFillTx/>
+                <a:latin typeface="Arial" panose="020B0604020202020204" pitchFamily="34" charset="0"/>
+                <a:cs typeface="Arial" panose="020B0604020202020204" pitchFamily="34" charset="0"/>
+                <a:sym typeface="Roboto"/>
+              </a:rPr>
+              <a:t>Fourth level</a:t>
+            </a:r>
+          </a:p>
+          <a:p>
+            <a:pPr marL="0" marR="0" lvl="4" indent="0" algn="l" defTabSz="914400" rtl="0" eaLnBrk="1" fontAlgn="auto" latinLnBrk="0" hangingPunct="1">
+              <a:lnSpc>
+                <a:spcPct val="90000"/>
+              </a:lnSpc>
+              <a:spcBef>
+                <a:spcPts val="1000"/>
+              </a:spcBef>
+              <a:spcAft>
+                <a:spcPts val="0"/>
+              </a:spcAft>
+              <a:buClrTx/>
+              <a:buSzTx/>
+              <a:buFont typeface="Arial" panose="020B0604020202020204" pitchFamily="34" charset="0"/>
+              <a:buNone/>
+              <a:tabLst/>
+              <a:defRPr/>
+            </a:pPr>
+            <a:r>
+              <a:rPr kumimoji="0" lang="en-US" sz="2400" b="0" i="0" u="none" strike="noStrike" kern="1200" cap="none" spc="0" normalizeH="0" baseline="0" noProof="0" smtClean="0">
+                <a:ln>
+                  <a:noFill/>
+                </a:ln>
+                <a:solidFill>
+                  <a:prstClr val="black"/>
+                </a:solidFill>
+                <a:effectLst/>
+                <a:uLnTx/>
+                <a:uFillTx/>
+                <a:latin typeface="Arial" panose="020B0604020202020204" pitchFamily="34" charset="0"/>
+                <a:cs typeface="Arial" panose="020B0604020202020204" pitchFamily="34" charset="0"/>
+                <a:sym typeface="Roboto"/>
+              </a:rPr>
+              <a:t>Fifth level</a:t>
+            </a:r>
+            <a:endParaRPr kumimoji="0" lang="en-GB" sz="1600" b="0" i="0" u="none" strike="noStrike" kern="1200" cap="none" spc="0" normalizeH="0" baseline="0" noProof="0" dirty="0" smtClean="0">
+              <a:ln>
+                <a:noFill/>
+              </a:ln>
+              <a:solidFill>
+                <a:prstClr val="black"/>
+              </a:solidFill>
+              <a:effectLst/>
+              <a:uLnTx/>
+              <a:uFillTx/>
+              <a:latin typeface="Arial" panose="020B0604020202020204" pitchFamily="34" charset="0"/>
+              <a:cs typeface="Arial" panose="020B0604020202020204" pitchFamily="34" charset="0"/>
+              <a:sym typeface="Roboto"/>
+            </a:endParaRPr>
           </a:p>
         </p:txBody>
       </p:sp>
     </p:spTree>
     <p:extLst>
       <p:ext uri="{BB962C8B-B14F-4D97-AF65-F5344CB8AC3E}">
-        <p14:creationId xmlns:p14="http://schemas.microsoft.com/office/powerpoint/2010/main" val="2290300743"/>
+        <p14:creationId xmlns:p14="http://schemas.microsoft.com/office/powerpoint/2010/main" val="278863346"/>
       </p:ext>
     </p:extLst>
   </p:cSld>
@@ -4834,7 +5544,7 @@
     </p:spTree>
     <p:extLst>
       <p:ext uri="{BB962C8B-B14F-4D97-AF65-F5344CB8AC3E}">
-        <p14:creationId xmlns:p14="http://schemas.microsoft.com/office/powerpoint/2010/main" val="369230427"/>
+        <p14:creationId xmlns:p14="http://schemas.microsoft.com/office/powerpoint/2010/main" val="916372055"/>
       </p:ext>
     </p:extLst>
   </p:cSld>
@@ -5537,7 +6247,7 @@
     </p:spTree>
     <p:extLst>
       <p:ext uri="{BB962C8B-B14F-4D97-AF65-F5344CB8AC3E}">
-        <p14:creationId xmlns:p14="http://schemas.microsoft.com/office/powerpoint/2010/main" val="2228645578"/>
+        <p14:creationId xmlns:p14="http://schemas.microsoft.com/office/powerpoint/2010/main" val="1545804366"/>
       </p:ext>
     </p:extLst>
   </p:cSld>
@@ -5615,7 +6325,7 @@
     </p:spTree>
     <p:extLst>
       <p:ext uri="{BB962C8B-B14F-4D97-AF65-F5344CB8AC3E}">
-        <p14:creationId xmlns:p14="http://schemas.microsoft.com/office/powerpoint/2010/main" val="1498676414"/>
+        <p14:creationId xmlns:p14="http://schemas.microsoft.com/office/powerpoint/2010/main" val="3716183537"/>
       </p:ext>
     </p:extLst>
   </p:cSld>
@@ -6197,7 +6907,7 @@
     </p:spTree>
     <p:extLst>
       <p:ext uri="{BB962C8B-B14F-4D97-AF65-F5344CB8AC3E}">
-        <p14:creationId xmlns:p14="http://schemas.microsoft.com/office/powerpoint/2010/main" val="2102637945"/>
+        <p14:creationId xmlns:p14="http://schemas.microsoft.com/office/powerpoint/2010/main" val="1966869224"/>
       </p:ext>
     </p:extLst>
   </p:cSld>
@@ -7118,7 +7828,7 @@
     </p:spTree>
     <p:extLst>
       <p:ext uri="{BB962C8B-B14F-4D97-AF65-F5344CB8AC3E}">
-        <p14:creationId xmlns:p14="http://schemas.microsoft.com/office/powerpoint/2010/main" val="782115509"/>
+        <p14:creationId xmlns:p14="http://schemas.microsoft.com/office/powerpoint/2010/main" val="2107473857"/>
       </p:ext>
     </p:extLst>
   </p:cSld>
@@ -7768,10 +8478,9 @@
           <a:lstStyle/>
           <a:p>
             <a:r>
-              <a:rPr lang="en-GB" dirty="0" smtClean="0"/>
-              <a:t>Open your page.</a:t>
-            </a:r>
-            <a:endParaRPr lang="en-GB" dirty="0"/>
+              <a:rPr/>
+              <a:t>mozilla</a:t>
+            </a:r>
           </a:p>
         </p:txBody>
       </p:sp>
@@ -7790,667 +8499,15 @@
           <a:bodyPr/>
           <a:lstStyle/>
           <a:p>
-            <a:r>
-              <a:rPr lang="en-GB" dirty="0" smtClean="0"/>
-              <a:t>In the folder double click on the xx-story.html file</a:t>
-            </a:r>
-          </a:p>
-          <a:p>
-            <a:endParaRPr lang="en-GB" dirty="0"/>
-          </a:p>
-        </p:txBody>
-      </p:sp>
-    </p:spTree>
-    <p:extLst>
-      <p:ext uri="{BB962C8B-B14F-4D97-AF65-F5344CB8AC3E}">
-        <p14:creationId xmlns:p14="http://schemas.microsoft.com/office/powerpoint/2010/main" val="3894722454"/>
-      </p:ext>
-    </p:extLst>
-  </p:cSld>
-  <p:clrMapOvr>
-    <a:masterClrMapping/>
-  </p:clrMapOvr>
-</p:sld>
-</file>
-
-<file path=ppt/slides/slide11.xml><?xml version="1.0" encoding="utf-8"?>
-<p:sld xmlns:a="http://schemas.openxmlformats.org/drawingml/2006/main" xmlns:r="http://schemas.openxmlformats.org/officeDocument/2006/relationships" xmlns:p="http://schemas.openxmlformats.org/presentationml/2006/main" show="0">
-  <p:cSld>
-    <p:spTree>
-      <p:nvGrpSpPr>
-        <p:cNvPr id="1" name=""/>
-        <p:cNvGrpSpPr/>
-        <p:nvPr/>
-      </p:nvGrpSpPr>
-      <p:grpSpPr>
-        <a:xfrm>
-          <a:off x="0" y="0"/>
-          <a:ext cx="0" cy="0"/>
-          <a:chOff x="0" y="0"/>
-          <a:chExt cx="0" cy="0"/>
-        </a:xfrm>
-      </p:grpSpPr>
-      <p:sp>
-        <p:nvSpPr>
-          <p:cNvPr id="2" name="Title 1"/>
-          <p:cNvSpPr>
-            <a:spLocks noGrp="1"/>
-          </p:cNvSpPr>
-          <p:nvPr>
-            <p:ph type="title"/>
-          </p:nvPr>
-        </p:nvSpPr>
-        <p:spPr/>
-        <p:txBody>
-          <a:bodyPr/>
-          <a:lstStyle/>
-          <a:p>
+            <a:pPr marL="0" indent="0">
+              <a:buNone/>
+            </a:pPr>
             <a:r>
               <a:rPr/>
-              <a:t>Get Tagging!</a:t>
-            </a:r>
-          </a:p>
-        </p:txBody>
-      </p:sp>
-      <p:sp>
-        <p:nvSpPr>
-          <p:cNvPr id="3" name="Content Placeholder 2"/>
-          <p:cNvSpPr>
-            <a:spLocks noGrp="1"/>
-          </p:cNvSpPr>
-          <p:nvPr>
-            <p:ph idx="1"/>
-          </p:nvPr>
-        </p:nvSpPr>
-        <p:spPr/>
-        <p:txBody>
-          <a:bodyPr>
-            <a:normAutofit fontScale="25000" lnSpcReduction="20000"/>
-          </a:bodyPr>
-          <a:lstStyle/>
-          <a:p>
-            <a:pPr marL="0" indent="0">
-              <a:buNone/>
-            </a:pPr>
-            <a:r>
-              <a:rPr/>
-              <a:t>marking up their story</a:t>
-            </a:r>
-          </a:p>
-          <a:p>
-            <a:pPr marL="0" indent="0">
-              <a:buNone/>
-            </a:pPr>
-            <a:r>
-              <a:rPr/>
-              <a:t>::: notes</a:t>
-            </a:r>
-          </a:p>
-          <a:p>
-            <a:pPr lvl="1"/>
-            <a:r>
-              <a:rPr/>
-              <a:t>Explain to users that they’ll be marking up their story– the .html version– with HTML, to make it ready for display in the browser. Explain that since coding HTML and thinking of and writing content are two different ways of thinking, they should always have content written before they mark it up, rather than write and mark-up at the same time.</a:t>
-            </a:r>
-          </a:p>
-          <a:p>
-            <a:pPr marL="1270000" indent="0">
-              <a:buNone/>
-            </a:pPr>
-            <a:r>
-              <a:rPr sz="2000"/>
-              <a:t>Tip! A great way to help learners do this, if you have access to an instructor’s computer and projector, is to do the activity on your own content along with learners, and project the results so everyone can see what you’re doing.</a:t>
-            </a:r>
-          </a:p>
-          <a:p>
-            <a:pPr lvl="1"/>
-            <a:r>
-              <a:rPr/>
-              <a:t>Start the file with a doctype tag– this is one of the only tags that doesn’t have content inside, and no closing tag– it’s a lonely single tag, reminding the browser, again that we’re writing html&lt;!DOCTYPE html&gt;</a:t>
-            </a:r>
-          </a:p>
-          <a:p>
-            <a:pPr lvl="1"/>
-            <a:r>
-              <a:rPr/>
-              <a:t>Add an</a:t>
-            </a:r>
-          </a:p>
-          <a:p>
-            <a:pPr lvl="1">
-              <a:buNone/>
-            </a:pPr>
-            <a:r>
-              <a:rPr/>
-              <a:t>and</a:t>
-            </a:r>
-          </a:p>
-          <a:p>
-            <a:pPr lvl="1">
-              <a:buNone/>
-            </a:pPr>
-            <a:r>
-              <a:rPr/>
-              <a:t>tags that wrap around the ENTIRE page– so everything inside can get tagged with markup language.</a:t>
-            </a:r>
-          </a:p>
-          <a:p>
-            <a:pPr lvl="1"/>
-            <a:r>
-              <a:rPr/>
-              <a:t>After this, make a section with a set of tags called</a:t>
-            </a:r>
-          </a:p>
-          <a:p>
-            <a:pPr lvl="1">
-              <a:buNone/>
-            </a:pPr>
-            <a:r>
-              <a:rPr/>
-              <a:t>at the top of the page, before all your written content. We’ll put one bit of content in here for the browser, but we won’t see it appear on the main page itself. This is the page title, which:</a:t>
-            </a:r>
-          </a:p>
-          <a:p>
-            <a:pPr lvl="2"/>
-            <a:r>
-              <a:rPr/>
-              <a:t>defines a title in the browser tab</a:t>
-            </a:r>
-          </a:p>
-          <a:p>
-            <a:pPr lvl="2"/>
-            <a:r>
-              <a:rPr/>
-              <a:t>provides a title for the page when it is added to favorites</a:t>
-            </a:r>
-          </a:p>
-          <a:p>
-            <a:pPr lvl="2"/>
-            <a:r>
-              <a:rPr/>
-              <a:t>displays a title for the page in search engine results.</a:t>
-            </a:r>
-          </a:p>
-          <a:p>
-            <a:pPr lvl="1"/>
-            <a:r>
-              <a:rPr/>
-              <a:t>Next, add the tags– these should be around the entire text for the page.</a:t>
-            </a:r>
-          </a:p>
-          <a:p>
-            <a:pPr lvl="1"/>
-            <a:r>
-              <a:rPr/>
-              <a:t>Use h1 for your page’s top headline, the on-screen title for your story (different from the title tag)</a:t>
-            </a:r>
-          </a:p>
-          <a:p>
-            <a:pPr lvl="1"/>
-            <a:r>
-              <a:rPr/>
-              <a:t>Use h2 or h3 tags for section headings</a:t>
-            </a:r>
-          </a:p>
-          <a:p>
-            <a:pPr lvl="1"/>
-            <a:r>
-              <a:rPr/>
-              <a:t>Use p tags for paragraphs</a:t>
-            </a:r>
-          </a:p>
-          <a:p>
-            <a:pPr lvl="1"/>
-            <a:r>
-              <a:rPr/>
-              <a:t>Don’t forget your closing tags!</a:t>
-            </a:r>
-          </a:p>
-          <a:p>
-            <a:pPr lvl="1"/>
-            <a:r>
-              <a:rPr/>
-              <a:t>For extra credit, add links to other sites (such as a page about your hometown, your favorite sports team, artist or musician, or a favorite recipe). You can also download and add images, just make sure they are in the “xx-webpage” folder.</a:t>
-            </a:r>
-          </a:p>
-          <a:p>
-            <a:pPr lvl="1"/>
-            <a:r>
-              <a:rPr/>
-              <a:t>Finally, when you’ve added all your tags, save the page!</a:t>
-            </a:r>
-          </a:p>
-          <a:p>
-            <a:pPr lvl="1"/>
-            <a:r>
-              <a:rPr/>
-              <a:t>Now, open your favorite browser, and go to File &gt; open file. Navigate to your folder, and click on the html file you just made. How does it look? Are you seeing your content formatted for the web? Do you see your title appearing in the tab at the top of the browser bar? If things don’t look right, what might have happened?</a:t>
-            </a:r>
-          </a:p>
-          <a:p>
-            <a:pPr marL="1270000" indent="0">
-              <a:buNone/>
-            </a:pPr>
-            <a:r>
-              <a:rPr sz="2000"/>
-              <a:t>Tip! Facilitator can troubleshoot here— common problems are missing tags, especially closing tags, typos in tags, a document not saved as html, problems with image file names, etc. Facilitator can walk around and check pages, and discuss or even demo on the projected example what happens when tags are left off (for example, never closing an h1 tag is a great way to show the importance of closing tags).</a:t>
-            </a:r>
-          </a:p>
-          <a:p>
-            <a:pPr lvl="1"/>
-            <a:r>
-              <a:rPr/>
-              <a:t>Congratulate everyone on the pages they’ve made! They are now web designers! Remind folks that the pages are still on their local computers, and not actually on the web! But they are ready to go there.</a:t>
-            </a:r>
-          </a:p>
-          <a:p>
-            <a:pPr lvl="1"/>
-            <a:r>
-              <a:rPr/>
-              <a:t>Have a brief discussion about uploading to servers, about web hosting, what it means, how it works, how much it costs, what hosting companies do.</a:t>
-            </a:r>
-          </a:p>
-        </p:txBody>
-      </p:sp>
-    </p:spTree>
-    <p:extLst>
-      <p:ext uri="{BB962C8B-B14F-4D97-AF65-F5344CB8AC3E}">
-        <p14:creationId xmlns:p14="http://schemas.microsoft.com/office/powerpoint/2010/main" val="634822975"/>
-      </p:ext>
-    </p:extLst>
-  </p:cSld>
-  <p:clrMapOvr>
-    <a:masterClrMapping/>
-  </p:clrMapOvr>
-  <mc:AlternateContent xmlns:mc="http://schemas.openxmlformats.org/markup-compatibility/2006">
-    <mc:Choice xmlns:p14="http://schemas.microsoft.com/office/powerpoint/2010/main" Requires="p14">
-      <p:transition spd="med" p14:dur="700">
-        <p:fade/>
-      </p:transition>
-    </mc:Choice>
-    <mc:Fallback>
-      <p:transition spd="med">
-        <p:fade/>
-      </p:transition>
-    </mc:Fallback>
-  </mc:AlternateContent>
-</p:sld>
-</file>
-
-<file path=ppt/slides/slide12.xml><?xml version="1.0" encoding="utf-8"?>
-<p:sld xmlns:a="http://schemas.openxmlformats.org/drawingml/2006/main" xmlns:r="http://schemas.openxmlformats.org/officeDocument/2006/relationships" xmlns:p="http://schemas.openxmlformats.org/presentationml/2006/main" show="0">
-  <p:cSld>
-    <p:spTree>
-      <p:nvGrpSpPr>
-        <p:cNvPr id="1" name=""/>
-        <p:cNvGrpSpPr/>
-        <p:nvPr/>
-      </p:nvGrpSpPr>
-      <p:grpSpPr>
-        <a:xfrm>
-          <a:off x="0" y="0"/>
-          <a:ext cx="0" cy="0"/>
-          <a:chOff x="0" y="0"/>
-          <a:chExt cx="0" cy="0"/>
-        </a:xfrm>
-      </p:grpSpPr>
-      <p:sp>
-        <p:nvSpPr>
-          <p:cNvPr id="2" name="Title 1"/>
-          <p:cNvSpPr>
-            <a:spLocks noGrp="1"/>
-          </p:cNvSpPr>
-          <p:nvPr>
-            <p:ph type="title"/>
-          </p:nvPr>
-        </p:nvSpPr>
-        <p:spPr/>
-        <p:txBody>
-          <a:bodyPr/>
-          <a:lstStyle/>
-          <a:p>
-            <a:r>
-              <a:rPr/>
-              <a:t>Go Online!</a:t>
-            </a:r>
-          </a:p>
-        </p:txBody>
-      </p:sp>
-      <p:sp>
-        <p:nvSpPr>
-          <p:cNvPr id="3" name="Content Placeholder 2"/>
-          <p:cNvSpPr>
-            <a:spLocks noGrp="1"/>
-          </p:cNvSpPr>
-          <p:nvPr>
-            <p:ph idx="1"/>
-          </p:nvPr>
-        </p:nvSpPr>
-        <p:spPr/>
-        <p:txBody>
-          <a:bodyPr>
-            <a:normAutofit/>
-          </a:bodyPr>
-          <a:lstStyle/>
-          <a:p>
-            <a:pPr lvl="1"/>
-            <a:r>
-              <a:rPr/>
-              <a:t>If your institution has server space and resources available, show participants how to use a file transfer application (such as fetch) to transfer their pages to a folder on the server. Talk about UPLOADING vs DOWNLOADING</a:t>
-            </a:r>
-          </a:p>
-          <a:p>
-            <a:pPr lvl="1"/>
-            <a:r>
-              <a:rPr/>
-              <a:t>Discuss how the URL will be constructed, ask users to figure out their own URLs – domain name, class folder name, personal folder name, page name.</a:t>
-            </a:r>
-          </a:p>
-          <a:p>
-            <a:pPr lvl="1"/>
-            <a:r>
-              <a:rPr/>
-              <a:t>Once all the pages are on the server, have users point their browsers to the URL on the web to see their pages. You’re on the web for real! Woo-hoo!</a:t>
-            </a:r>
-          </a:p>
-          <a:p>
-            <a:pPr marL="1270000" indent="0">
-              <a:buNone/>
-            </a:pPr>
-            <a:r>
-              <a:rPr sz="2000"/>
-              <a:t>Tip! If time, have a brief discussion of web hosting, what it means, how it works, how much it costs, what hosting companies do.</a:t>
-            </a:r>
-          </a:p>
-        </p:txBody>
-      </p:sp>
-    </p:spTree>
-  </p:cSld>
-  <p:clrMapOvr>
-    <a:masterClrMapping/>
-  </p:clrMapOvr>
-  <mc:AlternateContent xmlns:mc="http://schemas.openxmlformats.org/markup-compatibility/2006">
-    <mc:Choice xmlns:p14="http://schemas.microsoft.com/office/powerpoint/2010/main" Requires="p14">
-      <p:transition spd="med" p14:dur="700">
-        <p:fade/>
-      </p:transition>
-    </mc:Choice>
-    <mc:Fallback>
-      <p:transition spd="med">
-        <p:fade/>
-      </p:transition>
-    </mc:Fallback>
-  </mc:AlternateContent>
-</p:sld>
-</file>
-
-<file path=ppt/slides/slide13.xml><?xml version="1.0" encoding="utf-8"?>
-<p:sld xmlns:a="http://schemas.openxmlformats.org/drawingml/2006/main" xmlns:r="http://schemas.openxmlformats.org/officeDocument/2006/relationships" xmlns:p="http://schemas.openxmlformats.org/presentationml/2006/main">
-  <p:cSld>
-    <p:spTree>
-      <p:nvGrpSpPr>
-        <p:cNvPr id="1" name=""/>
-        <p:cNvGrpSpPr/>
-        <p:nvPr/>
-      </p:nvGrpSpPr>
-      <p:grpSpPr>
-        <a:xfrm>
-          <a:off x="0" y="0"/>
-          <a:ext cx="0" cy="0"/>
-          <a:chOff x="0" y="0"/>
-          <a:chExt cx="0" cy="0"/>
-        </a:xfrm>
-      </p:grpSpPr>
-      <p:sp>
-        <p:nvSpPr>
-          <p:cNvPr id="2" name="Title 1"/>
-          <p:cNvSpPr>
-            <a:spLocks noGrp="1"/>
-          </p:cNvSpPr>
-          <p:nvPr>
-            <p:ph type="title"/>
-          </p:nvPr>
-        </p:nvSpPr>
-        <p:spPr/>
-        <p:txBody>
-          <a:bodyPr/>
-          <a:lstStyle/>
-          <a:p>
-            <a:r>
-              <a:rPr dirty="0"/>
-              <a:t>Go </a:t>
-            </a:r>
-            <a:r>
-              <a:rPr dirty="0" smtClean="0"/>
-              <a:t>Online</a:t>
-            </a:r>
-            <a:r>
-              <a:rPr lang="en-GB" dirty="0" smtClean="0"/>
-              <a:t> with Glitch</a:t>
-            </a:r>
-            <a:r>
-              <a:rPr dirty="0" smtClean="0"/>
-              <a:t>!</a:t>
-            </a:r>
-            <a:endParaRPr dirty="0"/>
-          </a:p>
-        </p:txBody>
-      </p:sp>
-      <p:sp>
-        <p:nvSpPr>
-          <p:cNvPr id="3" name="Content Placeholder 2"/>
-          <p:cNvSpPr>
-            <a:spLocks noGrp="1"/>
-          </p:cNvSpPr>
-          <p:nvPr>
-            <p:ph idx="1"/>
-          </p:nvPr>
-        </p:nvSpPr>
-        <p:spPr/>
-        <p:txBody>
-          <a:bodyPr>
-            <a:normAutofit fontScale="92500" lnSpcReduction="10000"/>
-          </a:bodyPr>
-          <a:lstStyle/>
-          <a:p>
-            <a:pPr lvl="1"/>
-            <a:r>
-              <a:rPr lang="en-GB" dirty="0" smtClean="0"/>
-              <a:t>Often you can upload files directly to a webserver. Today we will cheat a little and transfer to an online editor and web server called Glitch.</a:t>
-            </a:r>
-          </a:p>
-          <a:p>
-            <a:pPr lvl="1"/>
-            <a:r>
-              <a:rPr lang="en-GB" dirty="0" smtClean="0"/>
-              <a:t>We will open </a:t>
-            </a:r>
-            <a:r>
-              <a:rPr lang="en-GB" dirty="0" smtClean="0">
-                <a:hlinkClick r:id="rId3"/>
-              </a:rPr>
-              <a:t>https</a:t>
-            </a:r>
-            <a:r>
-              <a:rPr lang="en-GB" dirty="0">
-                <a:hlinkClick r:id="rId3"/>
-              </a:rPr>
-              <a:t>://glitch.com/edit/#!/</a:t>
-            </a:r>
-            <a:r>
-              <a:rPr lang="en-GB" dirty="0" smtClean="0">
-                <a:hlinkClick r:id="rId3"/>
-              </a:rPr>
-              <a:t>remix/glitch-blank-website</a:t>
-            </a:r>
-            <a:r>
-              <a:rPr lang="en-GB" dirty="0" smtClean="0"/>
-              <a:t> for you.</a:t>
-            </a:r>
-          </a:p>
-          <a:p>
-            <a:pPr lvl="1"/>
-            <a:r>
-              <a:rPr lang="en-GB" dirty="0" smtClean="0"/>
-              <a:t>Click on index.html in the left pane.</a:t>
-            </a:r>
-          </a:p>
-          <a:p>
-            <a:pPr lvl="1"/>
-            <a:r>
-              <a:rPr lang="en-GB" dirty="0" smtClean="0"/>
-              <a:t>Copy and paste your local code in to index.html</a:t>
-            </a:r>
-          </a:p>
-          <a:p>
-            <a:pPr lvl="1"/>
-            <a:endParaRPr lang="en-GB" dirty="0"/>
-          </a:p>
-          <a:p>
-            <a:pPr lvl="1"/>
-            <a:endParaRPr lang="en-GB" dirty="0" smtClean="0"/>
-          </a:p>
-          <a:p>
-            <a:pPr lvl="1"/>
-            <a:endParaRPr lang="en-GB" dirty="0" smtClean="0"/>
-          </a:p>
-          <a:p>
-            <a:pPr lvl="1"/>
-            <a:r>
-              <a:rPr lang="en-GB" dirty="0" smtClean="0"/>
-              <a:t>Copy &amp; paste the link into the Teams Channel</a:t>
-            </a:r>
-          </a:p>
-          <a:p>
-            <a:pPr lvl="1"/>
-            <a:endParaRPr lang="en-GB" dirty="0"/>
-          </a:p>
-          <a:p>
-            <a:pPr lvl="1"/>
-            <a:endParaRPr lang="en-GB" dirty="0" smtClean="0"/>
-          </a:p>
-          <a:p>
-            <a:pPr lvl="1"/>
-            <a:endParaRPr lang="en-GB" dirty="0" smtClean="0"/>
-          </a:p>
-          <a:p>
-            <a:pPr lvl="1"/>
-            <a:endParaRPr lang="en-GB" dirty="0" smtClean="0"/>
-          </a:p>
-        </p:txBody>
-      </p:sp>
-      <p:pic>
-        <p:nvPicPr>
-          <p:cNvPr id="4" name="Picture 3"/>
-          <p:cNvPicPr>
-            <a:picLocks noChangeAspect="1"/>
-          </p:cNvPicPr>
-          <p:nvPr/>
-        </p:nvPicPr>
-        <p:blipFill>
-          <a:blip r:embed="rId4"/>
-          <a:stretch>
-            <a:fillRect/>
-          </a:stretch>
-        </p:blipFill>
-        <p:spPr>
-          <a:xfrm>
-            <a:off x="1000126" y="3758912"/>
-            <a:ext cx="4001365" cy="1570629"/>
-          </a:xfrm>
-          <a:prstGeom prst="rect">
-            <a:avLst/>
-          </a:prstGeom>
-        </p:spPr>
-      </p:pic>
-    </p:spTree>
-    <p:extLst>
-      <p:ext uri="{BB962C8B-B14F-4D97-AF65-F5344CB8AC3E}">
-        <p14:creationId xmlns:p14="http://schemas.microsoft.com/office/powerpoint/2010/main" val="3993733453"/>
-      </p:ext>
-    </p:extLst>
-  </p:cSld>
-  <p:clrMapOvr>
-    <a:masterClrMapping/>
-  </p:clrMapOvr>
-  <mc:AlternateContent xmlns:mc="http://schemas.openxmlformats.org/markup-compatibility/2006">
-    <mc:Choice xmlns:p14="http://schemas.microsoft.com/office/powerpoint/2010/main" Requires="p14">
-      <p:transition spd="med" p14:dur="700">
-        <p:fade/>
-      </p:transition>
-    </mc:Choice>
-    <mc:Fallback>
-      <p:transition spd="med">
-        <p:fade/>
-      </p:transition>
-    </mc:Fallback>
-  </mc:AlternateContent>
-</p:sld>
-</file>
-
-<file path=ppt/slides/slide14.xml><?xml version="1.0" encoding="utf-8"?>
-<p:sld xmlns:a="http://schemas.openxmlformats.org/drawingml/2006/main" xmlns:r="http://schemas.openxmlformats.org/officeDocument/2006/relationships" xmlns:p="http://schemas.openxmlformats.org/presentationml/2006/main">
-  <p:cSld>
-    <p:spTree>
-      <p:nvGrpSpPr>
-        <p:cNvPr id="1" name=""/>
-        <p:cNvGrpSpPr/>
-        <p:nvPr/>
-      </p:nvGrpSpPr>
-      <p:grpSpPr>
-        <a:xfrm>
-          <a:off x="0" y="0"/>
-          <a:ext cx="0" cy="0"/>
-          <a:chOff x="0" y="0"/>
-          <a:chExt cx="0" cy="0"/>
-        </a:xfrm>
-      </p:grpSpPr>
-      <p:sp>
-        <p:nvSpPr>
-          <p:cNvPr id="2" name="Title 1"/>
-          <p:cNvSpPr>
-            <a:spLocks noGrp="1"/>
-          </p:cNvSpPr>
-          <p:nvPr>
-            <p:ph type="title"/>
-          </p:nvPr>
-        </p:nvSpPr>
-        <p:spPr/>
-        <p:txBody>
-          <a:bodyPr/>
-          <a:lstStyle/>
-          <a:p>
-            <a:r>
-              <a:rPr/>
-              <a:t>mozilla</a:t>
-            </a:r>
-          </a:p>
-        </p:txBody>
-      </p:sp>
-      <p:sp>
-        <p:nvSpPr>
-          <p:cNvPr id="3" name="Content Placeholder 2"/>
-          <p:cNvSpPr>
-            <a:spLocks noGrp="1"/>
-          </p:cNvSpPr>
-          <p:nvPr>
-            <p:ph idx="1"/>
-          </p:nvPr>
-        </p:nvSpPr>
-        <p:spPr/>
-        <p:txBody>
-          <a:bodyPr/>
-          <a:lstStyle/>
-          <a:p>
-            <a:pPr marL="0" indent="0">
-              <a:buNone/>
-            </a:pPr>
-            <a:r>
-              <a:rPr dirty="0"/>
               <a:t>Mozilla is a global non-profit dedicated to putting you in control of your online experience and shaping the future of the web for the public good. Visit us at </a:t>
             </a:r>
             <a:r>
-              <a:rPr dirty="0">
+              <a:rPr>
                 <a:hlinkClick r:id="rId2"/>
               </a:rPr>
               <a:t>mozilla.org</a:t>
@@ -8582,16 +8639,15 @@
           <a:lstStyle/>
           <a:p>
             <a:r>
-              <a:rPr lang="en-GB" smtClean="0"/>
+              <a:rPr/>
               <a:t>Learning Objectives</a:t>
             </a:r>
-            <a:endParaRPr lang="en-GB"/>
           </a:p>
         </p:txBody>
       </p:sp>
       <p:sp>
         <p:nvSpPr>
-          <p:cNvPr id="5" name="Content Placeholder 4"/>
+          <p:cNvPr id="3" name="Content Placeholder 2"/>
           <p:cNvSpPr>
             <a:spLocks noGrp="1"/>
           </p:cNvSpPr>
@@ -8604,33 +8660,10 @@
           <a:bodyPr/>
           <a:lstStyle/>
           <a:p>
-            <a:pPr marL="342900" indent="-342900">
-              <a:buFont typeface="Arial" panose="020B0604020202020204" pitchFamily="34" charset="0"/>
-              <a:buChar char="•"/>
-            </a:pPr>
-            <a:r>
-              <a:rPr lang="en-GB" sz="2400" dirty="0">
-                <a:latin typeface="+mn-lt"/>
-              </a:rPr>
+            <a:pPr lvl="1"/>
+            <a:r>
+              <a:rPr sz="2400" dirty="0"/>
               <a:t>Create a simple web page</a:t>
-            </a:r>
-          </a:p>
-          <a:p>
-            <a:pPr marL="342900" indent="-342900">
-              <a:buFont typeface="Arial" panose="020B0604020202020204" pitchFamily="34" charset="0"/>
-              <a:buChar char="•"/>
-            </a:pPr>
-            <a:r>
-              <a:rPr lang="en-GB" sz="2400" dirty="0" smtClean="0">
-                <a:latin typeface="+mn-lt"/>
-              </a:rPr>
-              <a:t>Put web </a:t>
-            </a:r>
-            <a:r>
-              <a:rPr lang="en-GB" sz="2400" dirty="0">
-                <a:latin typeface="+mn-lt"/>
-              </a:rPr>
-              <a:t>page online</a:t>
             </a:r>
           </a:p>
         </p:txBody>
@@ -8676,16 +8709,15 @@
           <a:lstStyle/>
           <a:p>
             <a:r>
-              <a:rPr lang="en-GB" smtClean="0"/>
+              <a:rPr/>
               <a:t>Introduction</a:t>
             </a:r>
-            <a:endParaRPr lang="en-GB"/>
           </a:p>
         </p:txBody>
       </p:sp>
       <p:sp>
         <p:nvSpPr>
-          <p:cNvPr id="5" name="Content Placeholder 4"/>
+          <p:cNvPr id="3" name="Content Placeholder 2"/>
           <p:cNvSpPr>
             <a:spLocks noGrp="1"/>
           </p:cNvSpPr>
@@ -8693,92 +8725,44 @@
             <p:ph idx="1"/>
           </p:nvPr>
         </p:nvSpPr>
-        <p:spPr>
-          <a:xfrm>
-            <a:off x="415601" y="1639833"/>
-            <a:ext cx="10501781" cy="4452000"/>
-          </a:xfrm>
-        </p:spPr>
+        <p:spPr/>
         <p:txBody>
           <a:bodyPr/>
           <a:lstStyle/>
           <a:p>
-            <a:pPr marL="342900" indent="-342900">
-              <a:buFont typeface="Arial" panose="020B0604020202020204" pitchFamily="34" charset="0"/>
-              <a:buChar char="•"/>
-            </a:pPr>
-            <a:r>
-              <a:rPr lang="en-GB" sz="2400" dirty="0">
-                <a:latin typeface="+mn-lt"/>
-              </a:rPr>
+            <a:pPr lvl="1"/>
+            <a:r>
+              <a:rPr sz="2400" dirty="0"/>
               <a:t>HTML files are just text and not very pretty to look at.</a:t>
             </a:r>
           </a:p>
           <a:p>
-            <a:pPr marL="342900" indent="-342900">
-              <a:buFont typeface="Arial" panose="020B0604020202020204" pitchFamily="34" charset="0"/>
-              <a:buChar char="•"/>
-            </a:pPr>
-            <a:r>
-              <a:rPr lang="en-GB" sz="2400" dirty="0">
-                <a:latin typeface="+mn-lt"/>
-              </a:rPr>
+            <a:pPr lvl="1"/>
+            <a:r>
+              <a:rPr sz="2400" dirty="0"/>
               <a:t>The browser takes them and makes them readable and more visually interesting by layering in design and pulling in images and video.</a:t>
             </a:r>
           </a:p>
           <a:p>
-            <a:pPr marL="342900" indent="-342900">
-              <a:buFont typeface="Arial" panose="020B0604020202020204" pitchFamily="34" charset="0"/>
-              <a:buChar char="•"/>
-            </a:pPr>
-            <a:r>
-              <a:rPr lang="en-GB" sz="2400" dirty="0">
-                <a:latin typeface="+mn-lt"/>
-              </a:rPr>
-              <a:t>HTML file + Browser, like </a:t>
-            </a:r>
-            <a:r>
-              <a:rPr lang="en-GB" sz="2400" dirty="0" smtClean="0">
-                <a:latin typeface="+mn-lt"/>
-              </a:rPr>
-              <a:t>Edge </a:t>
-            </a:r>
-            <a:r>
-              <a:rPr lang="en-GB" sz="2400" dirty="0">
-                <a:latin typeface="+mn-lt"/>
-              </a:rPr>
-              <a:t>= WEB PAGE AMAZINGNESS FOR YOU (hopefully</a:t>
-            </a:r>
-            <a:r>
-              <a:rPr lang="en-GB" sz="2400" dirty="0" smtClean="0">
-                <a:latin typeface="+mn-lt"/>
-              </a:rPr>
-              <a:t>).</a:t>
-            </a:r>
-          </a:p>
-          <a:p>
-            <a:pPr marL="342900" indent="-342900">
-              <a:buFont typeface="Arial" panose="020B0604020202020204" pitchFamily="34" charset="0"/>
-              <a:buChar char="•"/>
-            </a:pPr>
-            <a:endParaRPr lang="en-GB" sz="2400" dirty="0" smtClean="0">
-              <a:latin typeface="+mn-lt"/>
-            </a:endParaRPr>
-          </a:p>
-          <a:p>
-            <a:pPr marL="342900" indent="-342900">
-              <a:buFont typeface="Arial" panose="020B0604020202020204" pitchFamily="34" charset="0"/>
-              <a:buChar char="•"/>
-            </a:pPr>
-            <a:r>
-              <a:rPr lang="en-GB" sz="2400" dirty="0" smtClean="0">
-                <a:latin typeface="+mn-lt"/>
-              </a:rPr>
-              <a:t>We need CONTENT– because the web is all about communication and sharing of information and ideas. Let’s generate some content together!</a:t>
-            </a:r>
-            <a:endParaRPr lang="en-GB" sz="2400" dirty="0">
-              <a:latin typeface="+mn-lt"/>
-            </a:endParaRPr>
+            <a:pPr lvl="1"/>
+            <a:r>
+              <a:rPr sz="2400" dirty="0"/>
+              <a:t>HTML file + Browser, like Firefox / Edge = WEB PAGE AMAZINGNESS FOR YOU (hopefully).</a:t>
+            </a:r>
+          </a:p>
+          <a:p>
+            <a:pPr lvl="1"/>
+            <a:r>
+              <a:rPr sz="2400" dirty="0"/>
+              <a:t>To get started, we need CONTENT</a:t>
+            </a:r>
+          </a:p>
+          <a:p>
+            <a:pPr lvl="2"/>
+            <a:r>
+              <a:rPr sz="2400" dirty="0"/>
+              <a:t>The web is all about communication and sharing of information and ideas. Let’s generate some content together!</a:t>
+            </a:r>
           </a:p>
         </p:txBody>
       </p:sp>
@@ -8839,244 +8823,98 @@
             <p:ph idx="1"/>
           </p:nvPr>
         </p:nvSpPr>
-        <p:spPr>
-          <a:xfrm>
-            <a:off x="415601" y="1639833"/>
-            <a:ext cx="10460217" cy="4452000"/>
-          </a:xfrm>
-        </p:spPr>
+        <p:spPr/>
         <p:txBody>
           <a:bodyPr>
             <a:noAutofit/>
           </a:bodyPr>
           <a:lstStyle/>
           <a:p>
-            <a:pPr marL="285750" indent="-285750">
-              <a:lnSpc>
-                <a:spcPct val="100000"/>
-              </a:lnSpc>
-              <a:spcAft>
-                <a:spcPts val="600"/>
-              </a:spcAft>
-              <a:buFont typeface="Arial" panose="020B0604020202020204" pitchFamily="34" charset="0"/>
-              <a:buChar char="•"/>
-            </a:pPr>
-            <a:r>
-              <a:rPr sz="2400" dirty="0">
-                <a:latin typeface="+mn-lt"/>
-              </a:rPr>
-              <a:t>Write your Biography or “About” page. </a:t>
-            </a:r>
-            <a:endParaRPr lang="en-GB" sz="2400" dirty="0" smtClean="0">
-              <a:latin typeface="+mn-lt"/>
-            </a:endParaRPr>
-          </a:p>
-          <a:p>
-            <a:pPr marL="971550" lvl="1" indent="-285750">
-              <a:lnSpc>
-                <a:spcPct val="100000"/>
-              </a:lnSpc>
-              <a:spcAft>
-                <a:spcPts val="600"/>
-              </a:spcAft>
-              <a:buFont typeface="Arial" panose="020B0604020202020204" pitchFamily="34" charset="0"/>
-              <a:buChar char="•"/>
-            </a:pPr>
-            <a:r>
-              <a:rPr lang="en-GB" sz="2400" dirty="0" smtClean="0">
-                <a:latin typeface="+mn-lt"/>
-              </a:rPr>
-              <a:t>B</a:t>
-            </a:r>
-            <a:r>
-              <a:rPr sz="2400" dirty="0" err="1" smtClean="0">
-                <a:latin typeface="+mn-lt"/>
-              </a:rPr>
-              <a:t>reak</a:t>
-            </a:r>
-            <a:r>
-              <a:rPr sz="2400" dirty="0" smtClean="0">
-                <a:latin typeface="+mn-lt"/>
-              </a:rPr>
-              <a:t> </a:t>
-            </a:r>
-            <a:r>
-              <a:rPr sz="2400" dirty="0">
-                <a:latin typeface="+mn-lt"/>
-              </a:rPr>
-              <a:t>into pairs and interview each other about </a:t>
-            </a:r>
-            <a:r>
-              <a:rPr lang="en-GB" sz="2400" dirty="0" smtClean="0">
-                <a:latin typeface="+mn-lt"/>
-              </a:rPr>
-              <a:t>your</a:t>
-            </a:r>
-            <a:r>
-              <a:rPr sz="2400" dirty="0" smtClean="0">
-                <a:latin typeface="+mn-lt"/>
-              </a:rPr>
-              <a:t> </a:t>
-            </a:r>
-            <a:r>
-              <a:rPr sz="2400" dirty="0">
-                <a:latin typeface="+mn-lt"/>
-              </a:rPr>
-              <a:t>lives. </a:t>
-            </a:r>
-            <a:endParaRPr lang="en-GB" sz="2400" dirty="0" smtClean="0">
-              <a:latin typeface="+mn-lt"/>
-            </a:endParaRPr>
-          </a:p>
-          <a:p>
-            <a:pPr marL="1428750" lvl="2" indent="-285750">
-              <a:lnSpc>
-                <a:spcPct val="100000"/>
-              </a:lnSpc>
-              <a:spcAft>
-                <a:spcPts val="600"/>
-              </a:spcAft>
-              <a:buFont typeface="Arial" panose="020B0604020202020204" pitchFamily="34" charset="0"/>
-              <a:buChar char="•"/>
-            </a:pPr>
-            <a:r>
-              <a:rPr lang="en-GB" sz="2400" dirty="0" smtClean="0">
-                <a:latin typeface="+mn-lt"/>
-              </a:rPr>
-              <a:t>Early Days</a:t>
-            </a:r>
-          </a:p>
-          <a:p>
-            <a:pPr marL="1428750" lvl="2" indent="-285750">
-              <a:lnSpc>
-                <a:spcPct val="100000"/>
-              </a:lnSpc>
-              <a:spcAft>
-                <a:spcPts val="600"/>
-              </a:spcAft>
-              <a:buFont typeface="Arial" panose="020B0604020202020204" pitchFamily="34" charset="0"/>
-              <a:buChar char="•"/>
-            </a:pPr>
-            <a:r>
-              <a:rPr lang="en-GB" sz="2400" dirty="0" smtClean="0">
-                <a:latin typeface="+mn-lt"/>
-              </a:rPr>
-              <a:t>These Days</a:t>
-            </a:r>
-          </a:p>
-          <a:p>
-            <a:pPr marL="1428750" lvl="2" indent="-285750">
-              <a:lnSpc>
-                <a:spcPct val="100000"/>
-              </a:lnSpc>
-              <a:spcAft>
-                <a:spcPts val="600"/>
-              </a:spcAft>
-              <a:buFont typeface="Arial" panose="020B0604020202020204" pitchFamily="34" charset="0"/>
-              <a:buChar char="•"/>
-            </a:pPr>
-            <a:r>
-              <a:rPr lang="en-GB" sz="2400" dirty="0" smtClean="0">
-                <a:latin typeface="+mn-lt"/>
-              </a:rPr>
-              <a:t>What’s Next</a:t>
-            </a:r>
-          </a:p>
-          <a:p>
-            <a:pPr marL="1428750" lvl="2" indent="-285750">
-              <a:lnSpc>
-                <a:spcPct val="100000"/>
-              </a:lnSpc>
-              <a:spcAft>
-                <a:spcPts val="600"/>
-              </a:spcAft>
-              <a:buFont typeface="Arial" panose="020B0604020202020204" pitchFamily="34" charset="0"/>
-              <a:buChar char="•"/>
-            </a:pPr>
-            <a:r>
-              <a:rPr lang="en-GB" sz="2400" dirty="0" smtClean="0">
-                <a:latin typeface="+mn-lt"/>
-              </a:rPr>
-              <a:t>Or Favourite songs, places</a:t>
-            </a:r>
-            <a:r>
-              <a:rPr lang="en-GB" sz="2400" dirty="0">
-                <a:latin typeface="+mn-lt"/>
-              </a:rPr>
-              <a:t> </a:t>
-            </a:r>
-            <a:r>
-              <a:rPr lang="en-GB" sz="2400" dirty="0" smtClean="0">
-                <a:latin typeface="+mn-lt"/>
-              </a:rPr>
-              <a:t>etc.</a:t>
-            </a:r>
-            <a:endParaRPr sz="2400" dirty="0">
-              <a:latin typeface="+mn-lt"/>
-            </a:endParaRPr>
-          </a:p>
-          <a:p>
-            <a:pPr marL="285750" indent="-285750">
-              <a:lnSpc>
-                <a:spcPct val="100000"/>
-              </a:lnSpc>
-              <a:spcAft>
-                <a:spcPts val="600"/>
-              </a:spcAft>
-              <a:buFont typeface="Arial" panose="020B0604020202020204" pitchFamily="34" charset="0"/>
-              <a:buChar char="•"/>
-            </a:pPr>
-            <a:r>
-              <a:rPr sz="2400" dirty="0">
-                <a:latin typeface="+mn-lt"/>
-              </a:rPr>
-              <a:t>Review/Edit: </a:t>
-            </a:r>
-            <a:endParaRPr lang="en-GB" sz="2400" dirty="0" smtClean="0">
-              <a:latin typeface="+mn-lt"/>
-            </a:endParaRPr>
-          </a:p>
-          <a:p>
-            <a:pPr marL="971550" lvl="1" indent="-285750">
-              <a:lnSpc>
-                <a:spcPct val="100000"/>
-              </a:lnSpc>
-              <a:spcAft>
-                <a:spcPts val="600"/>
-              </a:spcAft>
-              <a:buFont typeface="Arial" panose="020B0604020202020204" pitchFamily="34" charset="0"/>
-              <a:buChar char="•"/>
-            </a:pPr>
-            <a:r>
-              <a:rPr sz="2466" dirty="0" smtClean="0">
-                <a:latin typeface="+mn-lt"/>
-              </a:rPr>
-              <a:t>Have </a:t>
-            </a:r>
-            <a:r>
-              <a:rPr sz="2466" dirty="0">
-                <a:latin typeface="+mn-lt"/>
-              </a:rPr>
-              <a:t>each learner take the notes from their story and review them– consider adding </a:t>
-            </a:r>
-            <a:r>
-              <a:rPr sz="2466" dirty="0" smtClean="0">
-                <a:latin typeface="+mn-lt"/>
-              </a:rPr>
-              <a:t>details</a:t>
-            </a:r>
-            <a:endParaRPr sz="2466" dirty="0">
-              <a:latin typeface="+mn-lt"/>
-            </a:endParaRPr>
+            <a:pPr lvl="1"/>
+            <a:r>
+              <a:rPr sz="2400" dirty="0"/>
+              <a:t>You will write your Biography or “About Me” article.</a:t>
+            </a:r>
+          </a:p>
+          <a:p>
+            <a:pPr lvl="1"/>
+            <a:r>
+              <a:rPr sz="2400" dirty="0"/>
+              <a:t>In pairs, interview each other about your lives.</a:t>
+            </a:r>
+          </a:p>
+          <a:p>
+            <a:pPr lvl="2"/>
+            <a:r>
+              <a:rPr sz="2400" dirty="0"/>
+              <a:t>5 </a:t>
+            </a:r>
+            <a:r>
+              <a:rPr sz="2400" dirty="0" err="1"/>
+              <a:t>mins</a:t>
+            </a:r>
+            <a:r>
+              <a:rPr sz="2400" dirty="0"/>
+              <a:t> each</a:t>
+            </a:r>
+          </a:p>
+          <a:p>
+            <a:pPr lvl="2"/>
+            <a:r>
+              <a:rPr sz="2400" dirty="0"/>
+              <a:t>If you don’t want to share personal stuff, make up a fictional character and tell that character’s story.</a:t>
+            </a:r>
+          </a:p>
+          <a:p>
+            <a:pPr lvl="2"/>
+            <a:r>
+              <a:rPr sz="2400" dirty="0"/>
+              <a:t>The listener takes notes</a:t>
+            </a:r>
+          </a:p>
+          <a:p>
+            <a:pPr lvl="3"/>
+            <a:r>
+              <a:rPr sz="2400" dirty="0"/>
+              <a:t>What’s your name?</a:t>
+            </a:r>
+          </a:p>
+          <a:p>
+            <a:pPr lvl="3"/>
+            <a:r>
+              <a:rPr sz="2400" dirty="0"/>
+              <a:t>Where were you born? Where did you grow up? What was that like?</a:t>
+            </a:r>
+          </a:p>
+          <a:p>
+            <a:pPr lvl="3"/>
+            <a:r>
+              <a:rPr sz="2400" dirty="0"/>
+              <a:t>What are you doing now? How do you spend your time? What are your favorite things to do, favorite places, foods, music, </a:t>
+            </a:r>
+            <a:r>
+              <a:rPr sz="2400" dirty="0" err="1"/>
+              <a:t>etc</a:t>
+            </a:r>
+            <a:endParaRPr sz="2400" dirty="0"/>
+          </a:p>
+          <a:p>
+            <a:pPr lvl="3"/>
+            <a:r>
+              <a:rPr sz="2400" dirty="0"/>
+              <a:t>Is there a favorite moment, proudest moment that stands out?</a:t>
+            </a:r>
+          </a:p>
+          <a:p>
+            <a:pPr lvl="3"/>
+            <a:r>
+              <a:rPr sz="2400" dirty="0"/>
+              <a:t>What are your plans and dreams for the future?</a:t>
+            </a:r>
           </a:p>
         </p:txBody>
       </p:sp>
     </p:spTree>
-    <p:extLst>
-      <p:ext uri="{BB962C8B-B14F-4D97-AF65-F5344CB8AC3E}">
-        <p14:creationId xmlns:p14="http://schemas.microsoft.com/office/powerpoint/2010/main" val="3247792549"/>
-      </p:ext>
-    </p:extLst>
   </p:cSld>
   <p:clrMapOvr>
     <a:masterClrMapping/>
@@ -9117,10 +8955,9 @@
           <a:lstStyle/>
           <a:p>
             <a:r>
-              <a:rPr lang="en-GB" sz="4800" dirty="0"/>
-              <a:t>Organize, and Type Up</a:t>
-            </a:r>
-            <a:endParaRPr dirty="0"/>
+              <a:rPr/>
+              <a:t>Review/Edit</a:t>
+            </a:r>
           </a:p>
         </p:txBody>
       </p:sp>
@@ -9137,155 +8974,64 @@
         <p:spPr/>
         <p:txBody>
           <a:bodyPr>
-            <a:noAutofit/>
+            <a:normAutofit/>
           </a:bodyPr>
           <a:lstStyle/>
           <a:p>
-            <a:pPr marL="285750" indent="-285750">
-              <a:lnSpc>
-                <a:spcPct val="100000"/>
-              </a:lnSpc>
-              <a:spcAft>
-                <a:spcPts val="600"/>
-              </a:spcAft>
-              <a:buFont typeface="Arial" panose="020B0604020202020204" pitchFamily="34" charset="0"/>
-              <a:buChar char="•"/>
-            </a:pPr>
-            <a:r>
-              <a:rPr lang="en-GB" sz="2400" dirty="0" smtClean="0">
-                <a:latin typeface="+mn-lt"/>
-              </a:rPr>
-              <a:t>Type </a:t>
-            </a:r>
-            <a:r>
-              <a:rPr sz="2400" dirty="0" smtClean="0">
-                <a:latin typeface="+mn-lt"/>
-              </a:rPr>
-              <a:t>up </a:t>
-            </a:r>
-            <a:r>
-              <a:rPr lang="en-GB" sz="2400" dirty="0" smtClean="0">
-                <a:latin typeface="+mn-lt"/>
-              </a:rPr>
-              <a:t>your </a:t>
-            </a:r>
-            <a:r>
-              <a:rPr sz="2400" dirty="0" smtClean="0">
-                <a:latin typeface="+mn-lt"/>
-              </a:rPr>
-              <a:t>stories </a:t>
-            </a:r>
-            <a:r>
-              <a:rPr sz="2400" dirty="0">
-                <a:latin typeface="+mn-lt"/>
-              </a:rPr>
-              <a:t>in a basic text editor, </a:t>
-            </a:r>
-            <a:endParaRPr lang="en-GB" sz="2400" dirty="0" smtClean="0">
-              <a:latin typeface="+mn-lt"/>
-            </a:endParaRPr>
-          </a:p>
-          <a:p>
-            <a:pPr marL="285750" indent="-285750">
-              <a:lnSpc>
-                <a:spcPct val="100000"/>
-              </a:lnSpc>
-              <a:spcAft>
-                <a:spcPts val="600"/>
-              </a:spcAft>
-              <a:buFont typeface="Arial" panose="020B0604020202020204" pitchFamily="34" charset="0"/>
-              <a:buChar char="•"/>
-            </a:pPr>
-            <a:r>
-              <a:rPr lang="en-GB" sz="2400" dirty="0" smtClean="0">
-                <a:latin typeface="+mn-lt"/>
-              </a:rPr>
-              <a:t>Consider</a:t>
-            </a:r>
-            <a:r>
-              <a:rPr sz="2400" dirty="0" smtClean="0">
-                <a:latin typeface="+mn-lt"/>
-              </a:rPr>
-              <a:t> </a:t>
-            </a:r>
-            <a:r>
-              <a:rPr sz="2400" dirty="0">
-                <a:latin typeface="+mn-lt"/>
-              </a:rPr>
-              <a:t>organizing and structuring the story into a beginning, middle, and end. </a:t>
-            </a:r>
-            <a:endParaRPr lang="en-GB" sz="2400" dirty="0" smtClean="0">
-              <a:latin typeface="+mn-lt"/>
-            </a:endParaRPr>
-          </a:p>
-          <a:p>
-            <a:pPr marL="285750" indent="-285750">
-              <a:lnSpc>
-                <a:spcPct val="100000"/>
-              </a:lnSpc>
-              <a:spcAft>
-                <a:spcPts val="600"/>
-              </a:spcAft>
-              <a:buFont typeface="Arial" panose="020B0604020202020204" pitchFamily="34" charset="0"/>
-              <a:buChar char="•"/>
-            </a:pPr>
-            <a:r>
-              <a:rPr sz="2400" dirty="0" smtClean="0">
-                <a:latin typeface="+mn-lt"/>
-              </a:rPr>
-              <a:t>Title </a:t>
-            </a:r>
-            <a:r>
-              <a:rPr sz="2400" dirty="0">
-                <a:latin typeface="+mn-lt"/>
-              </a:rPr>
-              <a:t>Your Story! Come up with a snappy title for your story or content or go with something basic</a:t>
-            </a:r>
-            <a:r>
-              <a:rPr sz="2400" dirty="0" smtClean="0">
-                <a:latin typeface="+mn-lt"/>
-              </a:rPr>
-              <a:t>.</a:t>
-            </a:r>
-            <a:endParaRPr lang="en-GB" sz="2400" dirty="0" smtClean="0">
-              <a:latin typeface="+mn-lt"/>
-            </a:endParaRPr>
-          </a:p>
-          <a:p>
-            <a:pPr marL="285750" indent="-285750">
-              <a:lnSpc>
-                <a:spcPct val="100000"/>
-              </a:lnSpc>
-              <a:spcAft>
-                <a:spcPts val="600"/>
-              </a:spcAft>
-              <a:buFont typeface="Arial" panose="020B0604020202020204" pitchFamily="34" charset="0"/>
-              <a:buChar char="•"/>
-            </a:pPr>
-            <a:endParaRPr lang="en-GB" sz="2400" dirty="0" smtClean="0">
-              <a:latin typeface="+mn-lt"/>
-            </a:endParaRPr>
-          </a:p>
-          <a:p>
-            <a:pPr marL="285750" indent="-285750">
-              <a:lnSpc>
-                <a:spcPct val="100000"/>
-              </a:lnSpc>
-              <a:spcAft>
-                <a:spcPts val="600"/>
-              </a:spcAft>
-              <a:buFont typeface="Arial" panose="020B0604020202020204" pitchFamily="34" charset="0"/>
-              <a:buChar char="•"/>
-            </a:pPr>
-            <a:r>
-              <a:rPr lang="en-GB" sz="2400" dirty="0" smtClean="0">
-                <a:latin typeface="+mn-lt"/>
-              </a:rPr>
-              <a:t>Make sure you haven’t put addresses or anything you ever use as a password in there.</a:t>
-            </a:r>
-            <a:endParaRPr sz="2400" dirty="0">
-              <a:latin typeface="+mn-lt"/>
-            </a:endParaRPr>
+            <a:pPr lvl="1"/>
+            <a:r>
+              <a:rPr sz="2400" dirty="0"/>
+              <a:t>Open Visual Studio Code / Atom / Notepad</a:t>
+            </a:r>
+          </a:p>
+          <a:p>
+            <a:pPr lvl="1"/>
+            <a:r>
+              <a:rPr sz="2400" dirty="0"/>
+              <a:t>Take the notes from your story and type them up</a:t>
+            </a:r>
+          </a:p>
+          <a:p>
+            <a:pPr lvl="2"/>
+            <a:r>
+              <a:rPr sz="2400" dirty="0"/>
+              <a:t>review them as you go</a:t>
+            </a:r>
+          </a:p>
+          <a:p>
+            <a:pPr lvl="2"/>
+            <a:r>
+              <a:rPr sz="2400" dirty="0"/>
+              <a:t>consider adding details,</a:t>
+            </a:r>
+          </a:p>
+          <a:p>
+            <a:pPr lvl="2"/>
+            <a:r>
+              <a:rPr sz="2400" dirty="0"/>
+              <a:t>think of what you left out.</a:t>
+            </a:r>
+          </a:p>
+          <a:p>
+            <a:pPr lvl="1"/>
+            <a:r>
+              <a:rPr sz="2400" dirty="0"/>
+              <a:t>Consider organizing and structuring the story into a beginning, middle, and end.</a:t>
+            </a:r>
+          </a:p>
+          <a:p>
+            <a:pPr lvl="1"/>
+            <a:r>
+              <a:rPr sz="2400" dirty="0"/>
+              <a:t>Maybe think of titles for the sections: “Early Days” “These Days” “What’s Next”. Or another way to organize the content</a:t>
+            </a:r>
+          </a:p>
+          <a:p>
+            <a:pPr lvl="1"/>
+            <a:r>
+              <a:rPr sz="2400" dirty="0"/>
+              <a:t>Title Your Story! Come up with a snappy title for your story or content or go with something basic.</a:t>
+            </a:r>
           </a:p>
         </p:txBody>
       </p:sp>
@@ -9330,10 +9076,9 @@
           <a:lstStyle/>
           <a:p>
             <a:r>
-              <a:rPr lang="en-GB" dirty="0" smtClean="0"/>
-              <a:t>Save</a:t>
-            </a:r>
-            <a:endParaRPr lang="en-GB" dirty="0"/>
+              <a:rPr/>
+              <a:t>Saving</a:t>
+            </a:r>
           </a:p>
         </p:txBody>
       </p:sp>
@@ -9349,75 +9094,43 @@
         </p:nvSpPr>
         <p:spPr/>
         <p:txBody>
-          <a:bodyPr/>
+          <a:bodyPr>
+            <a:normAutofit/>
+          </a:bodyPr>
           <a:lstStyle/>
           <a:p>
-            <a:pPr marL="285750" indent="-285750">
-              <a:lnSpc>
-                <a:spcPct val="100000"/>
-              </a:lnSpc>
-              <a:spcAft>
-                <a:spcPts val="600"/>
-              </a:spcAft>
-              <a:buFont typeface="Arial" panose="020B0604020202020204" pitchFamily="34" charset="0"/>
-              <a:buChar char="•"/>
-            </a:pPr>
-            <a:r>
-              <a:rPr lang="en-GB" sz="2400" dirty="0">
-                <a:latin typeface="+mn-lt"/>
-              </a:rPr>
+            <a:pPr lvl="1"/>
+            <a:r>
+              <a:rPr sz="2400" dirty="0"/>
               <a:t>Make a new folder on your computer and call it “xx-webpage” using your initials.</a:t>
             </a:r>
           </a:p>
           <a:p>
-            <a:pPr marL="285750" indent="-285750">
-              <a:lnSpc>
-                <a:spcPct val="100000"/>
-              </a:lnSpc>
-              <a:spcAft>
-                <a:spcPts val="600"/>
-              </a:spcAft>
-              <a:buFont typeface="Arial" panose="020B0604020202020204" pitchFamily="34" charset="0"/>
-              <a:buChar char="•"/>
-            </a:pPr>
-            <a:r>
-              <a:rPr lang="en-GB" sz="2400" dirty="0">
-                <a:latin typeface="+mn-lt"/>
-              </a:rPr>
+            <a:pPr lvl="1"/>
+            <a:r>
+              <a:rPr sz="2400" dirty="0"/>
               <a:t>Save your story in the folder with .txt as the extension– Give it a title with no spaces or punctuation other than dashes or underscores, like “about-zm.txt” This is the text version of your story, the raw content.</a:t>
             </a:r>
           </a:p>
           <a:p>
-            <a:pPr marL="285750" indent="-285750">
-              <a:lnSpc>
-                <a:spcPct val="100000"/>
-              </a:lnSpc>
-              <a:spcAft>
-                <a:spcPts val="600"/>
-              </a:spcAft>
-              <a:buFont typeface="Arial" panose="020B0604020202020204" pitchFamily="34" charset="0"/>
-              <a:buChar char="•"/>
-            </a:pPr>
-            <a:r>
-              <a:rPr lang="en-GB" sz="2400" dirty="0">
-                <a:latin typeface="+mn-lt"/>
-              </a:rPr>
+            <a:pPr lvl="1"/>
+            <a:r>
+              <a:rPr sz="2400" dirty="0"/>
               <a:t>Also, save your story in the folder with .html as the extension, instead of .txt– this will be your web version. The .html tells the browser to look for html code in the file. Give it a title with no spaces or punctuation other than dashes or underscores, like “about-zm.html”</a:t>
             </a:r>
           </a:p>
           <a:p>
-            <a:endParaRPr lang="en-GB" sz="2400" dirty="0">
-              <a:latin typeface="+mn-lt"/>
-            </a:endParaRPr>
+            <a:pPr marL="0" indent="0">
+              <a:buNone/>
+            </a:pPr>
+            <a:r>
+              <a:rPr sz="2400" dirty="0"/>
+              <a:t>Fast track : If you know html, mark up your story (in semantic html5) and then use the best css3 tricks you know to make it pretty</a:t>
+            </a:r>
           </a:p>
         </p:txBody>
       </p:sp>
     </p:spTree>
-    <p:extLst>
-      <p:ext uri="{BB962C8B-B14F-4D97-AF65-F5344CB8AC3E}">
-        <p14:creationId xmlns:p14="http://schemas.microsoft.com/office/powerpoint/2010/main" val="4097491582"/>
-      </p:ext>
-    </p:extLst>
   </p:cSld>
   <p:clrMapOvr>
     <a:masterClrMapping/>
@@ -9426,7 +9139,7 @@
 </file>
 
 <file path=ppt/slides/slide8.xml><?xml version="1.0" encoding="utf-8"?>
-<p:sld xmlns:a="http://schemas.openxmlformats.org/drawingml/2006/main" xmlns:r="http://schemas.openxmlformats.org/officeDocument/2006/relationships" xmlns:p="http://schemas.openxmlformats.org/presentationml/2006/main" show="0">
+<p:sld xmlns:a="http://schemas.openxmlformats.org/drawingml/2006/main" xmlns:r="http://schemas.openxmlformats.org/officeDocument/2006/relationships" xmlns:p="http://schemas.openxmlformats.org/presentationml/2006/main">
   <p:cSld>
     <p:spTree>
       <p:nvGrpSpPr>
@@ -9459,7 +9172,7 @@
           <a:p>
             <a:r>
               <a:rPr/>
-              <a:t>Content and Storytelling</a:t>
+              <a:t>Get Tagging!</a:t>
             </a:r>
           </a:p>
         </p:txBody>
@@ -9477,82 +9190,178 @@
         <p:spPr/>
         <p:txBody>
           <a:bodyPr>
-            <a:normAutofit fontScale="77500" lnSpcReduction="20000"/>
+            <a:noAutofit/>
           </a:bodyPr>
           <a:lstStyle/>
           <a:p>
+            <a:pPr marL="0" indent="0">
+              <a:spcBef>
+                <a:spcPts val="3000"/>
+              </a:spcBef>
+              <a:buNone/>
+            </a:pPr>
+            <a:r>
+              <a:rPr lang="en-GB" sz="2000" b="1" dirty="0"/>
+              <a:t>M</a:t>
+            </a:r>
+            <a:r>
+              <a:rPr sz="2000" b="1" dirty="0" err="1" smtClean="0"/>
+              <a:t>arking</a:t>
+            </a:r>
+            <a:r>
+              <a:rPr sz="2000" b="1" dirty="0" smtClean="0"/>
+              <a:t> </a:t>
+            </a:r>
+            <a:r>
+              <a:rPr sz="2000" b="1" dirty="0"/>
+              <a:t>up </a:t>
+            </a:r>
+            <a:r>
+              <a:rPr lang="en-GB" sz="2000" b="1" dirty="0" smtClean="0"/>
+              <a:t>your</a:t>
+            </a:r>
+            <a:r>
+              <a:rPr sz="2000" b="1" dirty="0" smtClean="0"/>
+              <a:t> </a:t>
+            </a:r>
+            <a:r>
+              <a:rPr sz="2000" b="1" dirty="0"/>
+              <a:t>story</a:t>
+            </a:r>
+          </a:p>
+          <a:p>
             <a:pPr lvl="1"/>
             <a:r>
-              <a:rPr dirty="0"/>
-              <a:t>Write your Biography or “About” page. Have participants break into pairs and interview each other about their lives. As facilitator, keep track of time to ensure that each learner has equal time for their story.</a:t>
+              <a:rPr sz="2000" dirty="0"/>
+              <a:t>Start the file </a:t>
+            </a:r>
+            <a:r>
+              <a:rPr sz="2000" dirty="0">
+                <a:latin typeface="Courier"/>
+              </a:rPr>
+              <a:t>&lt;!DOCTYPE html&gt;</a:t>
             </a:r>
           </a:p>
           <a:p>
             <a:pPr lvl="1"/>
             <a:r>
-              <a:rPr dirty="0"/>
-              <a:t>Review/Edit: Have each learner take the notes from their story and review them– consider adding details, think of what you left out.</a:t>
+              <a:rPr sz="2000" dirty="0"/>
+              <a:t>Add an </a:t>
+            </a:r>
+            <a:r>
+              <a:rPr sz="2000" dirty="0">
+                <a:latin typeface="Courier"/>
+              </a:rPr>
+              <a:t>&lt;html&gt;</a:t>
+            </a:r>
+            <a:r>
+              <a:rPr sz="2000" dirty="0"/>
+              <a:t> and </a:t>
+            </a:r>
+            <a:r>
+              <a:rPr sz="2000" dirty="0">
+                <a:latin typeface="Courier"/>
+              </a:rPr>
+              <a:t>&lt;/html&gt;</a:t>
+            </a:r>
+            <a:r>
+              <a:rPr sz="2000" dirty="0"/>
+              <a:t> tags that wrap around the ENTIRE page – so everything inside can get tagged with markup language.</a:t>
             </a:r>
           </a:p>
           <a:p>
             <a:pPr lvl="1"/>
             <a:r>
-              <a:rPr dirty="0"/>
-              <a:t>Organize, and Type Up: Have learners type up their stories in a basic text editor, being sure to use “plain text mode” (not Rich Text mode). As they type up the story, they might consider organizing and structuring the story into a beginning, middle, and end. Maybe they can think of titles for the sections: “Early Days” “These Days” “What’s Next” Or they can find ways other ways to organize the content, if they talked more about interest sections– “My favorite songs” “My favorite places” etc. Creating these sections will help structure the biography for easy reading as a web page.</a:t>
+              <a:rPr sz="2000" dirty="0"/>
+              <a:t>After this, make a section with a set of tags called </a:t>
+            </a:r>
+            <a:r>
+              <a:rPr sz="2000" dirty="0">
+                <a:latin typeface="Courier"/>
+              </a:rPr>
+              <a:t>&lt;head&gt; &lt;/head&gt;</a:t>
+            </a:r>
+            <a:r>
+              <a:rPr sz="2000" dirty="0"/>
+              <a:t> at the top of the page, before all your written content.</a:t>
+            </a:r>
+          </a:p>
+          <a:p>
+            <a:pPr lvl="2"/>
+            <a:r>
+              <a:rPr sz="2000" dirty="0"/>
+              <a:t>Put </a:t>
+            </a:r>
+            <a:r>
+              <a:rPr sz="2000" dirty="0">
+                <a:latin typeface="Courier"/>
+              </a:rPr>
+              <a:t>&lt;title&gt; Your Title&lt;/title&gt;</a:t>
+            </a:r>
+            <a:r>
+              <a:rPr sz="2000" dirty="0"/>
+              <a:t> inside the head</a:t>
             </a:r>
           </a:p>
           <a:p>
             <a:pPr lvl="1"/>
             <a:r>
-              <a:rPr dirty="0"/>
-              <a:t>Title Your Story! Come up with a snappy title for your story or content or go with something basic.</a:t>
+              <a:rPr sz="2000" dirty="0"/>
+              <a:t>Add </a:t>
+            </a:r>
+            <a:r>
+              <a:rPr sz="2000" dirty="0">
+                <a:latin typeface="Courier"/>
+              </a:rPr>
+              <a:t>&lt;body&gt;</a:t>
+            </a:r>
+            <a:r>
+              <a:rPr sz="2000" dirty="0"/>
+              <a:t> tags around the entire text for the page.</a:t>
             </a:r>
           </a:p>
           <a:p>
             <a:pPr lvl="1"/>
             <a:r>
-              <a:rPr dirty="0"/>
-              <a:t>Make a new folder on your computer and call it “xx-webpage” using your initials.</a:t>
+              <a:rPr sz="2000" dirty="0"/>
+              <a:t>Use h1 for your page’s top headline, the on-screen title for your story (different from the title tag)</a:t>
             </a:r>
           </a:p>
           <a:p>
             <a:pPr lvl="1"/>
             <a:r>
-              <a:rPr dirty="0"/>
-              <a:t>Save your story in the folder with .txt as the extension– Give it a title with no spaces or punctuation other than dashes or underscores, like “about-zm.txt” This is the text version of your story, the raw content.</a:t>
+              <a:rPr sz="2000" dirty="0"/>
+              <a:t>Use h2 or h3 tags for section headings</a:t>
             </a:r>
           </a:p>
           <a:p>
             <a:pPr lvl="1"/>
             <a:r>
-              <a:rPr dirty="0"/>
-              <a:t>Also, save your story in the folder with .html as the extension, instead of .txt– this will be your web version. The .html tells the browser to look for html code in the file. Give it a title with no spaces or punctuation other than dashes or underscores, like “about-zm.html”</a:t>
+              <a:rPr sz="2000" dirty="0"/>
+              <a:t>Use p tags for paragraphs</a:t>
+            </a:r>
+          </a:p>
+          <a:p>
+            <a:pPr lvl="1"/>
+            <a:r>
+              <a:rPr sz="2000" dirty="0"/>
+              <a:t>Don’t forget your closing tags!</a:t>
+            </a:r>
+          </a:p>
+          <a:p>
+            <a:pPr lvl="1"/>
+            <a:r>
+              <a:rPr sz="2000" dirty="0"/>
+              <a:t>Finally, when you’ve added all your tags, save the page!</a:t>
             </a:r>
           </a:p>
         </p:txBody>
       </p:sp>
     </p:spTree>
-    <p:extLst>
-      <p:ext uri="{BB962C8B-B14F-4D97-AF65-F5344CB8AC3E}">
-        <p14:creationId xmlns:p14="http://schemas.microsoft.com/office/powerpoint/2010/main" val="4249841715"/>
-      </p:ext>
-    </p:extLst>
   </p:cSld>
   <p:clrMapOvr>
     <a:masterClrMapping/>
   </p:clrMapOvr>
-  <mc:AlternateContent xmlns:mc="http://schemas.openxmlformats.org/markup-compatibility/2006">
-    <mc:Choice xmlns:p14="http://schemas.microsoft.com/office/powerpoint/2010/main" Requires="p14">
-      <p:transition spd="med" p14:dur="700">
-        <p:fade/>
-      </p:transition>
-    </mc:Choice>
-    <mc:Fallback>
-      <p:transition spd="med">
-        <p:fade/>
-      </p:transition>
-    </mc:Fallback>
-  </mc:AlternateContent>
 </p:sld>
 </file>
 
@@ -9590,7 +9399,7 @@
           <a:p>
             <a:r>
               <a:rPr/>
-              <a:t>Get Tagging!</a:t>
+              <a:t>Lets have a look</a:t>
             </a:r>
           </a:p>
         </p:txBody>
@@ -9607,302 +9416,49 @@
         </p:nvSpPr>
         <p:spPr/>
         <p:txBody>
-          <a:bodyPr>
-            <a:noAutofit/>
-          </a:bodyPr>
+          <a:bodyPr/>
           <a:lstStyle/>
           <a:p>
-            <a:pPr marL="0" indent="0">
-              <a:buNone/>
-            </a:pPr>
-            <a:r>
-              <a:rPr lang="en-GB" sz="2400" dirty="0" smtClean="0">
-                <a:solidFill>
-                  <a:schemeClr val="tx1"/>
-                </a:solidFill>
-                <a:latin typeface="+mn-lt"/>
-              </a:rPr>
-              <a:t>M</a:t>
-            </a:r>
-            <a:r>
-              <a:rPr sz="2400" dirty="0" smtClean="0">
-                <a:solidFill>
-                  <a:schemeClr val="tx1"/>
-                </a:solidFill>
-                <a:latin typeface="+mn-lt"/>
-              </a:rPr>
-              <a:t>ark</a:t>
-            </a:r>
-            <a:r>
-              <a:rPr lang="en-GB" sz="2400" dirty="0" smtClean="0">
-                <a:solidFill>
-                  <a:schemeClr val="tx1"/>
-                </a:solidFill>
-                <a:latin typeface="+mn-lt"/>
-              </a:rPr>
-              <a:t> up you </a:t>
-            </a:r>
-            <a:r>
-              <a:rPr sz="2400" dirty="0" smtClean="0">
-                <a:solidFill>
-                  <a:schemeClr val="tx1"/>
-                </a:solidFill>
-                <a:latin typeface="+mn-lt"/>
-              </a:rPr>
-              <a:t>story</a:t>
-            </a:r>
-            <a:r>
-              <a:rPr lang="en-GB" sz="2400" dirty="0" smtClean="0">
-                <a:solidFill>
-                  <a:schemeClr val="tx1"/>
-                </a:solidFill>
-                <a:latin typeface="+mn-lt"/>
-              </a:rPr>
-              <a:t> </a:t>
-            </a:r>
-            <a:r>
-              <a:rPr sz="2400" dirty="0" smtClean="0">
-                <a:solidFill>
-                  <a:schemeClr val="tx1"/>
-                </a:solidFill>
-                <a:latin typeface="+mn-lt"/>
-              </a:rPr>
-              <a:t>– the .html version</a:t>
-            </a:r>
-            <a:endParaRPr lang="en-GB" sz="2400" dirty="0" smtClean="0">
-              <a:solidFill>
-                <a:schemeClr val="tx1"/>
-              </a:solidFill>
-              <a:latin typeface="+mn-lt"/>
-            </a:endParaRPr>
-          </a:p>
-          <a:p>
-            <a:pPr marL="0" indent="0">
-              <a:buNone/>
-            </a:pPr>
-            <a:r>
-              <a:rPr lang="en-GB" sz="2400" dirty="0">
-                <a:solidFill>
-                  <a:schemeClr val="tx1"/>
-                </a:solidFill>
-                <a:latin typeface="+mn-lt"/>
-              </a:rPr>
-              <a:t>	</a:t>
-            </a:r>
-            <a:r>
-              <a:rPr lang="en-GB" sz="2400" dirty="0" smtClean="0">
-                <a:solidFill>
-                  <a:schemeClr val="tx1"/>
-                </a:solidFill>
-                <a:latin typeface="+mn-lt"/>
-              </a:rPr>
-              <a:t>C</a:t>
-            </a:r>
-            <a:r>
-              <a:rPr sz="2400" dirty="0" err="1" smtClean="0">
-                <a:solidFill>
-                  <a:schemeClr val="tx1"/>
-                </a:solidFill>
-                <a:latin typeface="+mn-lt"/>
-              </a:rPr>
-              <a:t>oding</a:t>
-            </a:r>
-            <a:r>
-              <a:rPr sz="2400" dirty="0" smtClean="0">
-                <a:solidFill>
-                  <a:schemeClr val="tx1"/>
-                </a:solidFill>
-                <a:latin typeface="+mn-lt"/>
-              </a:rPr>
-              <a:t> HTML and thinking of and writing content are two different ways of thinking, always have content written before they mark</a:t>
-            </a:r>
-            <a:r>
-              <a:rPr lang="en-GB" sz="2400" dirty="0" err="1" smtClean="0">
-                <a:solidFill>
-                  <a:schemeClr val="tx1"/>
-                </a:solidFill>
-                <a:latin typeface="+mn-lt"/>
-              </a:rPr>
-              <a:t>ing</a:t>
-            </a:r>
-            <a:r>
-              <a:rPr sz="2400" dirty="0" smtClean="0">
-                <a:solidFill>
-                  <a:schemeClr val="tx1"/>
-                </a:solidFill>
-                <a:latin typeface="+mn-lt"/>
-              </a:rPr>
-              <a:t> it up</a:t>
-            </a:r>
-          </a:p>
-          <a:p>
             <a:pPr lvl="1"/>
             <a:r>
-              <a:rPr sz="2400" dirty="0" smtClean="0">
-                <a:solidFill>
-                  <a:schemeClr val="tx1"/>
-                </a:solidFill>
-                <a:latin typeface="+mn-lt"/>
-              </a:rPr>
-              <a:t>Start the file with a &lt;!DOCTYPE html&gt;</a:t>
-            </a:r>
-            <a:r>
-              <a:rPr lang="en-GB" sz="2400" dirty="0" smtClean="0">
-                <a:solidFill>
-                  <a:schemeClr val="tx1"/>
-                </a:solidFill>
-                <a:latin typeface="+mn-lt"/>
-              </a:rPr>
-              <a:t> tag</a:t>
-            </a:r>
-            <a:r>
-              <a:rPr lang="en-GB" sz="2400" dirty="0">
-                <a:solidFill>
-                  <a:schemeClr val="tx1"/>
-                </a:solidFill>
-                <a:latin typeface="+mn-lt"/>
-              </a:rPr>
-              <a:t> </a:t>
-            </a:r>
-            <a:endParaRPr lang="en-GB" sz="2400" dirty="0" smtClean="0">
-              <a:solidFill>
-                <a:schemeClr val="tx1"/>
-              </a:solidFill>
-              <a:latin typeface="+mn-lt"/>
-            </a:endParaRPr>
+              <a:rPr sz="2400" dirty="0"/>
+              <a:t>Now, open your favorite browser</a:t>
+            </a:r>
           </a:p>
           <a:p>
             <a:pPr lvl="1"/>
             <a:r>
-              <a:rPr lang="en-GB" sz="2400" dirty="0" smtClean="0">
-                <a:solidFill>
-                  <a:schemeClr val="tx1"/>
-                </a:solidFill>
-                <a:latin typeface="+mn-lt"/>
-              </a:rPr>
-              <a:t>Put </a:t>
-            </a:r>
-            <a:r>
-              <a:rPr lang="en-GB" sz="2400" dirty="0" smtClean="0">
-                <a:solidFill>
-                  <a:schemeClr val="tx1"/>
-                </a:solidFill>
-                <a:latin typeface="+mn-lt"/>
-              </a:rPr>
-              <a:t>&lt;html&gt; tags around all your content</a:t>
-            </a:r>
-            <a:endParaRPr sz="2400" dirty="0" smtClean="0">
-              <a:solidFill>
-                <a:schemeClr val="tx1"/>
-              </a:solidFill>
-              <a:latin typeface="+mn-lt"/>
-            </a:endParaRPr>
-          </a:p>
-          <a:p>
-            <a:pPr lvl="1">
-              <a:buNone/>
-            </a:pPr>
-            <a:r>
-              <a:rPr lang="en-GB" sz="2400" dirty="0" smtClean="0">
-                <a:solidFill>
-                  <a:schemeClr val="tx1"/>
-                </a:solidFill>
-                <a:latin typeface="+mn-lt"/>
-              </a:rPr>
-              <a:t>&lt;head&gt;&lt;title&gt;Your Title here&lt;/title&gt;&lt;/head&gt;</a:t>
-            </a:r>
-          </a:p>
-          <a:p>
-            <a:pPr lvl="1">
-              <a:buNone/>
-            </a:pPr>
-            <a:r>
-              <a:rPr lang="en-GB" sz="2400" dirty="0">
-                <a:solidFill>
-                  <a:schemeClr val="tx1"/>
-                </a:solidFill>
-              </a:rPr>
-              <a:t>&lt;body</a:t>
-            </a:r>
-            <a:r>
-              <a:rPr lang="en-GB" sz="2400" dirty="0" smtClean="0">
-                <a:solidFill>
-                  <a:schemeClr val="tx1"/>
-                </a:solidFill>
-              </a:rPr>
-              <a:t>&gt; </a:t>
-            </a:r>
-            <a:r>
-              <a:rPr lang="en-GB" sz="2400" dirty="0">
-                <a:solidFill>
-                  <a:schemeClr val="tx1"/>
-                </a:solidFill>
-              </a:rPr>
-              <a:t>tags around all your content</a:t>
-            </a:r>
-            <a:endParaRPr sz="2400" dirty="0" smtClean="0">
-              <a:solidFill>
-                <a:schemeClr val="tx1"/>
-              </a:solidFill>
-              <a:latin typeface="+mn-lt"/>
-            </a:endParaRPr>
+              <a:rPr sz="2400" dirty="0"/>
+              <a:t>Go to File &gt; open file. Navigate to your folder, and click on the html file you just made.</a:t>
+            </a:r>
           </a:p>
           <a:p>
             <a:pPr lvl="1"/>
             <a:r>
-              <a:rPr sz="2400" dirty="0" smtClean="0">
-                <a:solidFill>
-                  <a:schemeClr val="tx1"/>
-                </a:solidFill>
-                <a:latin typeface="+mn-lt"/>
-              </a:rPr>
-              <a:t>h1</a:t>
-            </a:r>
-            <a:r>
-              <a:rPr lang="en-GB" sz="2400" dirty="0">
-                <a:solidFill>
-                  <a:schemeClr val="tx1"/>
-                </a:solidFill>
-                <a:latin typeface="+mn-lt"/>
-              </a:rPr>
-              <a:t> </a:t>
-            </a:r>
-            <a:r>
-              <a:rPr lang="en-GB" sz="2400" dirty="0" smtClean="0">
-                <a:solidFill>
-                  <a:schemeClr val="tx1"/>
-                </a:solidFill>
-                <a:latin typeface="+mn-lt"/>
-              </a:rPr>
-              <a:t>for the Page heading, </a:t>
-            </a:r>
-            <a:r>
-              <a:rPr sz="2400" dirty="0" smtClean="0">
-                <a:solidFill>
-                  <a:schemeClr val="tx1"/>
-                </a:solidFill>
-                <a:latin typeface="+mn-lt"/>
-              </a:rPr>
-              <a:t>h2 or h3 tags for section headings</a:t>
+              <a:rPr sz="2400" dirty="0"/>
+              <a:t>How does it look?</a:t>
             </a:r>
           </a:p>
           <a:p>
             <a:pPr lvl="1"/>
             <a:r>
-              <a:rPr sz="2400" dirty="0" smtClean="0">
-                <a:solidFill>
-                  <a:schemeClr val="tx1"/>
-                </a:solidFill>
-                <a:latin typeface="+mn-lt"/>
-              </a:rPr>
-              <a:t>Use p tags for paragraphs</a:t>
-            </a:r>
-            <a:endParaRPr sz="2400" dirty="0">
-              <a:solidFill>
-                <a:schemeClr val="tx1"/>
-              </a:solidFill>
-              <a:latin typeface="+mn-lt"/>
-            </a:endParaRPr>
+              <a:rPr sz="2400" dirty="0"/>
+              <a:t>Are you seeing your content formatted for the web?</a:t>
+            </a:r>
+          </a:p>
+          <a:p>
+            <a:pPr lvl="1"/>
+            <a:r>
+              <a:rPr sz="2400" dirty="0"/>
+              <a:t>Do you see your title appearing in the tab at the top of the browser bar?</a:t>
+            </a:r>
+          </a:p>
+          <a:p>
+            <a:pPr lvl="1"/>
+            <a:r>
+              <a:rPr sz="2400" dirty="0"/>
+              <a:t>If things don’t look right, what might have happened?</a:t>
+            </a:r>
           </a:p>
         </p:txBody>
       </p:sp>
@@ -10194,7 +9750,7 @@
   <a:extraClrSchemeLst/>
   <a:extLst>
     <a:ext uri="{05A4C25C-085E-4340-85A3-A5531E510DB2}">
-      <thm15:themeFamily xmlns:thm15="http://schemas.microsoft.com/office/thememl/2012/main" name="UTC OLP Theme" id="{C0C126D0-4F54-4769-9F75-5B4DCF4C873F}" vid="{48618548-1CAA-4A8F-A36E-70E567843DE1}"/>
+      <thm15:themeFamily xmlns:thm15="http://schemas.microsoft.com/office/thememl/2012/main" name="UTC OLP Theme" id="{2E691D27-CD38-454E-AE9A-4400F5F3A1AC}" vid="{F3F5863D-53D2-4A14-96FD-2C3F501B15D6}"/>
     </a:ext>
   </a:extLst>
 </a:theme>

</xml_diff>